<commit_message>
Authorization Servers. More info ADFS.
</commit_message>
<xml_diff>
--- a/doc/architecture-illustrations.pptx
+++ b/doc/architecture-illustrations.pptx
@@ -25,6 +25,7 @@
     <p:sldId id="275" r:id="rId19"/>
     <p:sldId id="276" r:id="rId20"/>
     <p:sldId id="277" r:id="rId21"/>
+    <p:sldId id="278" r:id="rId22"/>
   </p:sldIdLst>
   <p:sldSz cx="12192000" cy="6858000"/>
   <p:notesSz cx="6858000" cy="9144000"/>
@@ -262,7 +263,7 @@
           <a:p>
             <a:fld id="{C1D20212-1D84-1140-85B9-B9CA8444BDC5}" type="datetimeFigureOut">
               <a:rPr lang="en-US" smtClean="0"/>
-              <a:t>7/27/16</a:t>
+              <a:t>10/31/16</a:t>
             </a:fld>
             <a:endParaRPr lang="en-US" dirty="0"/>
           </a:p>
@@ -432,7 +433,7 @@
           <a:p>
             <a:fld id="{C1D20212-1D84-1140-85B9-B9CA8444BDC5}" type="datetimeFigureOut">
               <a:rPr lang="en-US" smtClean="0"/>
-              <a:t>7/27/16</a:t>
+              <a:t>10/31/16</a:t>
             </a:fld>
             <a:endParaRPr lang="en-US" dirty="0"/>
           </a:p>
@@ -612,7 +613,7 @@
           <a:p>
             <a:fld id="{C1D20212-1D84-1140-85B9-B9CA8444BDC5}" type="datetimeFigureOut">
               <a:rPr lang="en-US" smtClean="0"/>
-              <a:t>7/27/16</a:t>
+              <a:t>10/31/16</a:t>
             </a:fld>
             <a:endParaRPr lang="en-US" dirty="0"/>
           </a:p>
@@ -782,7 +783,7 @@
           <a:p>
             <a:fld id="{C1D20212-1D84-1140-85B9-B9CA8444BDC5}" type="datetimeFigureOut">
               <a:rPr lang="en-US" smtClean="0"/>
-              <a:t>7/27/16</a:t>
+              <a:t>10/31/16</a:t>
             </a:fld>
             <a:endParaRPr lang="en-US" dirty="0"/>
           </a:p>
@@ -1028,7 +1029,7 @@
           <a:p>
             <a:fld id="{C1D20212-1D84-1140-85B9-B9CA8444BDC5}" type="datetimeFigureOut">
               <a:rPr lang="en-US" smtClean="0"/>
-              <a:t>7/27/16</a:t>
+              <a:t>10/31/16</a:t>
             </a:fld>
             <a:endParaRPr lang="en-US" dirty="0"/>
           </a:p>
@@ -1260,7 +1261,7 @@
           <a:p>
             <a:fld id="{C1D20212-1D84-1140-85B9-B9CA8444BDC5}" type="datetimeFigureOut">
               <a:rPr lang="en-US" smtClean="0"/>
-              <a:t>7/27/16</a:t>
+              <a:t>10/31/16</a:t>
             </a:fld>
             <a:endParaRPr lang="en-US" dirty="0"/>
           </a:p>
@@ -1627,7 +1628,7 @@
           <a:p>
             <a:fld id="{C1D20212-1D84-1140-85B9-B9CA8444BDC5}" type="datetimeFigureOut">
               <a:rPr lang="en-US" smtClean="0"/>
-              <a:t>7/27/16</a:t>
+              <a:t>10/31/16</a:t>
             </a:fld>
             <a:endParaRPr lang="en-US" dirty="0"/>
           </a:p>
@@ -1745,7 +1746,7 @@
           <a:p>
             <a:fld id="{C1D20212-1D84-1140-85B9-B9CA8444BDC5}" type="datetimeFigureOut">
               <a:rPr lang="en-US" smtClean="0"/>
-              <a:t>7/27/16</a:t>
+              <a:t>10/31/16</a:t>
             </a:fld>
             <a:endParaRPr lang="en-US" dirty="0"/>
           </a:p>
@@ -1840,7 +1841,7 @@
           <a:p>
             <a:fld id="{C1D20212-1D84-1140-85B9-B9CA8444BDC5}" type="datetimeFigureOut">
               <a:rPr lang="en-US" smtClean="0"/>
-              <a:t>7/27/16</a:t>
+              <a:t>10/31/16</a:t>
             </a:fld>
             <a:endParaRPr lang="en-US" dirty="0"/>
           </a:p>
@@ -2117,7 +2118,7 @@
           <a:p>
             <a:fld id="{C1D20212-1D84-1140-85B9-B9CA8444BDC5}" type="datetimeFigureOut">
               <a:rPr lang="en-US" smtClean="0"/>
-              <a:t>7/27/16</a:t>
+              <a:t>10/31/16</a:t>
             </a:fld>
             <a:endParaRPr lang="en-US" dirty="0"/>
           </a:p>
@@ -2370,7 +2371,7 @@
           <a:p>
             <a:fld id="{C1D20212-1D84-1140-85B9-B9CA8444BDC5}" type="datetimeFigureOut">
               <a:rPr lang="en-US" smtClean="0"/>
-              <a:t>7/27/16</a:t>
+              <a:t>10/31/16</a:t>
             </a:fld>
             <a:endParaRPr lang="en-US" dirty="0"/>
           </a:p>
@@ -2583,7 +2584,7 @@
           <a:p>
             <a:fld id="{C1D20212-1D84-1140-85B9-B9CA8444BDC5}" type="datetimeFigureOut">
               <a:rPr lang="en-US" smtClean="0"/>
-              <a:t>7/27/16</a:t>
+              <a:t>10/31/16</a:t>
             </a:fld>
             <a:endParaRPr lang="en-US" dirty="0"/>
           </a:p>
@@ -14983,6 +14984,1662 @@
 </p:sld>
 </file>
 
+<file path=ppt/slides/slide21.xml><?xml version="1.0" encoding="utf-8"?>
+<p:sld xmlns:a="http://schemas.openxmlformats.org/drawingml/2006/main" xmlns:r="http://schemas.openxmlformats.org/officeDocument/2006/relationships" xmlns:p="http://schemas.openxmlformats.org/presentationml/2006/main">
+  <p:cSld>
+    <p:spTree>
+      <p:nvGrpSpPr>
+        <p:cNvPr id="1" name=""/>
+        <p:cNvGrpSpPr/>
+        <p:nvPr/>
+      </p:nvGrpSpPr>
+      <p:grpSpPr>
+        <a:xfrm>
+          <a:off x="0" y="0"/>
+          <a:ext cx="0" cy="0"/>
+          <a:chOff x="0" y="0"/>
+          <a:chExt cx="0" cy="0"/>
+        </a:xfrm>
+      </p:grpSpPr>
+      <p:sp>
+        <p:nvSpPr>
+          <p:cNvPr id="2" name="Abgerundetes Rechteck 1"/>
+          <p:cNvSpPr/>
+          <p:nvPr/>
+        </p:nvSpPr>
+        <p:spPr>
+          <a:xfrm>
+            <a:off x="7536268" y="3525110"/>
+            <a:ext cx="2741084" cy="1368623"/>
+          </a:xfrm>
+          <a:prstGeom prst="roundRect">
+            <a:avLst>
+              <a:gd name="adj" fmla="val 2434"/>
+            </a:avLst>
+          </a:prstGeom>
+          <a:ln w="19050">
+            <a:solidFill>
+              <a:schemeClr val="bg2"/>
+            </a:solidFill>
+          </a:ln>
+        </p:spPr>
+        <p:style>
+          <a:lnRef idx="2">
+            <a:schemeClr val="accent3"/>
+          </a:lnRef>
+          <a:fillRef idx="1">
+            <a:schemeClr val="lt1"/>
+          </a:fillRef>
+          <a:effectRef idx="0">
+            <a:schemeClr val="accent3"/>
+          </a:effectRef>
+          <a:fontRef idx="minor">
+            <a:schemeClr val="dk1"/>
+          </a:fontRef>
+        </p:style>
+        <p:txBody>
+          <a:bodyPr vert="horz" rtlCol="0" anchor="ctr"/>
+          <a:lstStyle/>
+          <a:p>
+            <a:pPr algn="ctr"/>
+            <a:endParaRPr lang="en-US" sz="1400" dirty="0">
+              <a:solidFill>
+                <a:schemeClr val="tx1">
+                  <a:lumMod val="50000"/>
+                  <a:lumOff val="50000"/>
+                </a:schemeClr>
+              </a:solidFill>
+            </a:endParaRPr>
+          </a:p>
+        </p:txBody>
+      </p:sp>
+      <p:sp>
+        <p:nvSpPr>
+          <p:cNvPr id="3" name="Abgerundetes Rechteck 2"/>
+          <p:cNvSpPr/>
+          <p:nvPr/>
+        </p:nvSpPr>
+        <p:spPr>
+          <a:xfrm>
+            <a:off x="7879166" y="3867570"/>
+            <a:ext cx="2292352" cy="391584"/>
+          </a:xfrm>
+          <a:prstGeom prst="roundRect">
+            <a:avLst>
+              <a:gd name="adj" fmla="val 5119"/>
+            </a:avLst>
+          </a:prstGeom>
+          <a:ln w="19050">
+            <a:solidFill>
+              <a:schemeClr val="bg2"/>
+            </a:solidFill>
+          </a:ln>
+        </p:spPr>
+        <p:style>
+          <a:lnRef idx="2">
+            <a:schemeClr val="accent3"/>
+          </a:lnRef>
+          <a:fillRef idx="1">
+            <a:schemeClr val="lt1"/>
+          </a:fillRef>
+          <a:effectRef idx="0">
+            <a:schemeClr val="accent3"/>
+          </a:effectRef>
+          <a:fontRef idx="minor">
+            <a:schemeClr val="dk1"/>
+          </a:fontRef>
+        </p:style>
+        <p:txBody>
+          <a:bodyPr vert="horz" rtlCol="0" anchor="ctr"/>
+          <a:lstStyle/>
+          <a:p>
+            <a:pPr algn="ctr"/>
+            <a:r>
+              <a:rPr lang="en-US" sz="1400" smtClean="0">
+                <a:solidFill>
+                  <a:schemeClr val="tx1">
+                    <a:lumMod val="50000"/>
+                    <a:lumOff val="50000"/>
+                  </a:schemeClr>
+                </a:solidFill>
+              </a:rPr>
+              <a:t>KONG</a:t>
+            </a:r>
+            <a:endParaRPr lang="en-US" sz="1400" dirty="0">
+              <a:solidFill>
+                <a:schemeClr val="tx1">
+                  <a:lumMod val="50000"/>
+                  <a:lumOff val="50000"/>
+                </a:schemeClr>
+              </a:solidFill>
+            </a:endParaRPr>
+          </a:p>
+        </p:txBody>
+      </p:sp>
+      <p:sp>
+        <p:nvSpPr>
+          <p:cNvPr id="4" name="Abgerundetes Rechteck 3"/>
+          <p:cNvSpPr/>
+          <p:nvPr/>
+        </p:nvSpPr>
+        <p:spPr>
+          <a:xfrm>
+            <a:off x="7777566" y="3760059"/>
+            <a:ext cx="2292352" cy="391584"/>
+          </a:xfrm>
+          <a:prstGeom prst="roundRect">
+            <a:avLst>
+              <a:gd name="adj" fmla="val 5119"/>
+            </a:avLst>
+          </a:prstGeom>
+          <a:ln w="19050">
+            <a:solidFill>
+              <a:schemeClr val="bg2"/>
+            </a:solidFill>
+          </a:ln>
+        </p:spPr>
+        <p:style>
+          <a:lnRef idx="2">
+            <a:schemeClr val="accent3"/>
+          </a:lnRef>
+          <a:fillRef idx="1">
+            <a:schemeClr val="lt1"/>
+          </a:fillRef>
+          <a:effectRef idx="0">
+            <a:schemeClr val="accent3"/>
+          </a:effectRef>
+          <a:fontRef idx="minor">
+            <a:schemeClr val="dk1"/>
+          </a:fontRef>
+        </p:style>
+        <p:txBody>
+          <a:bodyPr vert="horz" rtlCol="0" anchor="ctr"/>
+          <a:lstStyle/>
+          <a:p>
+            <a:pPr algn="ctr"/>
+            <a:r>
+              <a:rPr lang="en-US" sz="1400" smtClean="0">
+                <a:solidFill>
+                  <a:schemeClr val="tx1">
+                    <a:lumMod val="50000"/>
+                    <a:lumOff val="50000"/>
+                  </a:schemeClr>
+                </a:solidFill>
+              </a:rPr>
+              <a:t>KONG</a:t>
+            </a:r>
+            <a:endParaRPr lang="en-US" sz="1400" dirty="0">
+              <a:solidFill>
+                <a:schemeClr val="tx1">
+                  <a:lumMod val="50000"/>
+                  <a:lumOff val="50000"/>
+                </a:schemeClr>
+              </a:solidFill>
+            </a:endParaRPr>
+          </a:p>
+        </p:txBody>
+      </p:sp>
+      <p:sp>
+        <p:nvSpPr>
+          <p:cNvPr id="5" name="Abgerundetes Rechteck 4"/>
+          <p:cNvSpPr/>
+          <p:nvPr/>
+        </p:nvSpPr>
+        <p:spPr>
+          <a:xfrm>
+            <a:off x="1539502" y="1528104"/>
+            <a:ext cx="3521596" cy="2161394"/>
+          </a:xfrm>
+          <a:prstGeom prst="roundRect">
+            <a:avLst>
+              <a:gd name="adj" fmla="val 2434"/>
+            </a:avLst>
+          </a:prstGeom>
+          <a:ln w="19050">
+            <a:solidFill>
+              <a:schemeClr val="bg2"/>
+            </a:solidFill>
+          </a:ln>
+        </p:spPr>
+        <p:style>
+          <a:lnRef idx="2">
+            <a:schemeClr val="accent3"/>
+          </a:lnRef>
+          <a:fillRef idx="1">
+            <a:schemeClr val="lt1"/>
+          </a:fillRef>
+          <a:effectRef idx="0">
+            <a:schemeClr val="accent3"/>
+          </a:effectRef>
+          <a:fontRef idx="minor">
+            <a:schemeClr val="dk1"/>
+          </a:fontRef>
+        </p:style>
+        <p:txBody>
+          <a:bodyPr vert="horz" rtlCol="0" anchor="ctr"/>
+          <a:lstStyle/>
+          <a:p>
+            <a:pPr algn="ctr"/>
+            <a:endParaRPr lang="en-US" sz="1400" dirty="0">
+              <a:solidFill>
+                <a:schemeClr val="tx1">
+                  <a:lumMod val="50000"/>
+                  <a:lumOff val="50000"/>
+                </a:schemeClr>
+              </a:solidFill>
+            </a:endParaRPr>
+          </a:p>
+        </p:txBody>
+      </p:sp>
+      <p:sp>
+        <p:nvSpPr>
+          <p:cNvPr id="7" name="Abgerundetes Rechteck 6"/>
+          <p:cNvSpPr/>
+          <p:nvPr/>
+        </p:nvSpPr>
+        <p:spPr>
+          <a:xfrm>
+            <a:off x="8207145" y="1699683"/>
+            <a:ext cx="444607" cy="1402291"/>
+          </a:xfrm>
+          <a:prstGeom prst="roundRect">
+            <a:avLst>
+              <a:gd name="adj" fmla="val 5119"/>
+            </a:avLst>
+          </a:prstGeom>
+          <a:ln w="19050"/>
+        </p:spPr>
+        <p:style>
+          <a:lnRef idx="2">
+            <a:schemeClr val="accent3"/>
+          </a:lnRef>
+          <a:fillRef idx="1">
+            <a:schemeClr val="lt1"/>
+          </a:fillRef>
+          <a:effectRef idx="0">
+            <a:schemeClr val="accent3"/>
+          </a:effectRef>
+          <a:fontRef idx="minor">
+            <a:schemeClr val="dk1"/>
+          </a:fontRef>
+        </p:style>
+        <p:txBody>
+          <a:bodyPr vert="vert270" rtlCol="0" anchor="ctr"/>
+          <a:lstStyle/>
+          <a:p>
+            <a:pPr algn="ctr"/>
+            <a:r>
+              <a:rPr lang="en-US" sz="1400" dirty="0" smtClean="0">
+                <a:solidFill>
+                  <a:schemeClr val="tx1">
+                    <a:lumMod val="50000"/>
+                    <a:lumOff val="50000"/>
+                  </a:schemeClr>
+                </a:solidFill>
+              </a:rPr>
+              <a:t>PORTAL-API</a:t>
+            </a:r>
+            <a:endParaRPr lang="en-US" sz="1400" dirty="0">
+              <a:solidFill>
+                <a:schemeClr val="tx1">
+                  <a:lumMod val="50000"/>
+                  <a:lumOff val="50000"/>
+                </a:schemeClr>
+              </a:solidFill>
+            </a:endParaRPr>
+          </a:p>
+        </p:txBody>
+      </p:sp>
+      <p:sp>
+        <p:nvSpPr>
+          <p:cNvPr id="8" name="Abgerundetes Rechteck 7"/>
+          <p:cNvSpPr/>
+          <p:nvPr/>
+        </p:nvSpPr>
+        <p:spPr>
+          <a:xfrm>
+            <a:off x="8765945" y="1699683"/>
+            <a:ext cx="1401343" cy="391584"/>
+          </a:xfrm>
+          <a:prstGeom prst="roundRect">
+            <a:avLst>
+              <a:gd name="adj" fmla="val 5119"/>
+            </a:avLst>
+          </a:prstGeom>
+          <a:ln w="19050"/>
+        </p:spPr>
+        <p:style>
+          <a:lnRef idx="2">
+            <a:schemeClr val="accent3"/>
+          </a:lnRef>
+          <a:fillRef idx="1">
+            <a:schemeClr val="lt1"/>
+          </a:fillRef>
+          <a:effectRef idx="0">
+            <a:schemeClr val="accent3"/>
+          </a:effectRef>
+          <a:fontRef idx="minor">
+            <a:schemeClr val="dk1"/>
+          </a:fontRef>
+        </p:style>
+        <p:txBody>
+          <a:bodyPr vert="horz" rtlCol="0" anchor="ctr"/>
+          <a:lstStyle/>
+          <a:p>
+            <a:pPr algn="ctr"/>
+            <a:r>
+              <a:rPr lang="en-US" sz="1400" smtClean="0">
+                <a:solidFill>
+                  <a:schemeClr val="tx1">
+                    <a:lumMod val="50000"/>
+                    <a:lumOff val="50000"/>
+                  </a:schemeClr>
+                </a:solidFill>
+              </a:rPr>
+              <a:t>MAILER</a:t>
+            </a:r>
+            <a:endParaRPr lang="en-US" sz="1400" dirty="0">
+              <a:solidFill>
+                <a:schemeClr val="tx1">
+                  <a:lumMod val="50000"/>
+                  <a:lumOff val="50000"/>
+                </a:schemeClr>
+              </a:solidFill>
+            </a:endParaRPr>
+          </a:p>
+        </p:txBody>
+      </p:sp>
+      <p:sp>
+        <p:nvSpPr>
+          <p:cNvPr id="9" name="Abgerundetes Rechteck 8"/>
+          <p:cNvSpPr/>
+          <p:nvPr/>
+        </p:nvSpPr>
+        <p:spPr>
+          <a:xfrm>
+            <a:off x="8765944" y="2199216"/>
+            <a:ext cx="1401343" cy="391584"/>
+          </a:xfrm>
+          <a:prstGeom prst="roundRect">
+            <a:avLst>
+              <a:gd name="adj" fmla="val 5119"/>
+            </a:avLst>
+          </a:prstGeom>
+          <a:ln w="19050"/>
+        </p:spPr>
+        <p:style>
+          <a:lnRef idx="2">
+            <a:schemeClr val="accent3"/>
+          </a:lnRef>
+          <a:fillRef idx="1">
+            <a:schemeClr val="lt1"/>
+          </a:fillRef>
+          <a:effectRef idx="0">
+            <a:schemeClr val="accent3"/>
+          </a:effectRef>
+          <a:fontRef idx="minor">
+            <a:schemeClr val="dk1"/>
+          </a:fontRef>
+        </p:style>
+        <p:txBody>
+          <a:bodyPr vert="horz" rtlCol="0" anchor="ctr"/>
+          <a:lstStyle/>
+          <a:p>
+            <a:pPr algn="ctr"/>
+            <a:r>
+              <a:rPr lang="en-US" sz="1400" dirty="0" smtClean="0">
+                <a:solidFill>
+                  <a:schemeClr val="tx1">
+                    <a:lumMod val="50000"/>
+                    <a:lumOff val="50000"/>
+                  </a:schemeClr>
+                </a:solidFill>
+              </a:rPr>
+              <a:t>CHATBOT</a:t>
+            </a:r>
+            <a:endParaRPr lang="en-US" sz="1400" dirty="0">
+              <a:solidFill>
+                <a:schemeClr val="tx1">
+                  <a:lumMod val="50000"/>
+                  <a:lumOff val="50000"/>
+                </a:schemeClr>
+              </a:solidFill>
+            </a:endParaRPr>
+          </a:p>
+        </p:txBody>
+      </p:sp>
+      <p:sp>
+        <p:nvSpPr>
+          <p:cNvPr id="10" name="Abgerundetes Rechteck 9"/>
+          <p:cNvSpPr/>
+          <p:nvPr/>
+        </p:nvSpPr>
+        <p:spPr>
+          <a:xfrm>
+            <a:off x="8765943" y="2710390"/>
+            <a:ext cx="1401343" cy="391584"/>
+          </a:xfrm>
+          <a:prstGeom prst="roundRect">
+            <a:avLst>
+              <a:gd name="adj" fmla="val 5119"/>
+            </a:avLst>
+          </a:prstGeom>
+          <a:ln w="19050"/>
+        </p:spPr>
+        <p:style>
+          <a:lnRef idx="2">
+            <a:schemeClr val="accent3"/>
+          </a:lnRef>
+          <a:fillRef idx="1">
+            <a:schemeClr val="lt1"/>
+          </a:fillRef>
+          <a:effectRef idx="0">
+            <a:schemeClr val="accent3"/>
+          </a:effectRef>
+          <a:fontRef idx="minor">
+            <a:schemeClr val="dk1"/>
+          </a:fontRef>
+        </p:style>
+        <p:txBody>
+          <a:bodyPr vert="horz" rtlCol="0" anchor="ctr"/>
+          <a:lstStyle/>
+          <a:p>
+            <a:pPr algn="ctr"/>
+            <a:r>
+              <a:rPr lang="en-US" sz="1400" dirty="0" smtClean="0">
+                <a:solidFill>
+                  <a:schemeClr val="tx1">
+                    <a:lumMod val="50000"/>
+                    <a:lumOff val="50000"/>
+                  </a:schemeClr>
+                </a:solidFill>
+              </a:rPr>
+              <a:t>KONG-ADAPTER</a:t>
+            </a:r>
+            <a:endParaRPr lang="en-US" sz="1400" dirty="0">
+              <a:solidFill>
+                <a:schemeClr val="tx1">
+                  <a:lumMod val="50000"/>
+                  <a:lumOff val="50000"/>
+                </a:schemeClr>
+              </a:solidFill>
+            </a:endParaRPr>
+          </a:p>
+        </p:txBody>
+      </p:sp>
+      <p:sp>
+        <p:nvSpPr>
+          <p:cNvPr id="11" name="Textfeld 10"/>
+          <p:cNvSpPr txBox="1"/>
+          <p:nvPr/>
+        </p:nvSpPr>
+        <p:spPr>
+          <a:xfrm>
+            <a:off x="7536268" y="1284803"/>
+            <a:ext cx="2707217" cy="307777"/>
+          </a:xfrm>
+          <a:prstGeom prst="rect">
+            <a:avLst/>
+          </a:prstGeom>
+          <a:noFill/>
+          <a:ln w="19050">
+            <a:noFill/>
+          </a:ln>
+        </p:spPr>
+        <p:txBody>
+          <a:bodyPr wrap="square" rtlCol="0">
+            <a:spAutoFit/>
+          </a:bodyPr>
+          <a:lstStyle/>
+          <a:p>
+            <a:pPr algn="ctr"/>
+            <a:r>
+              <a:rPr lang="en-US" sz="1400" dirty="0" smtClean="0">
+                <a:solidFill>
+                  <a:schemeClr val="accent3"/>
+                </a:solidFill>
+              </a:rPr>
+              <a:t>PORTAL COMPONENTS</a:t>
+            </a:r>
+            <a:endParaRPr lang="en-US" sz="1400" dirty="0">
+              <a:solidFill>
+                <a:schemeClr val="accent3"/>
+              </a:solidFill>
+            </a:endParaRPr>
+          </a:p>
+        </p:txBody>
+      </p:sp>
+      <p:sp>
+        <p:nvSpPr>
+          <p:cNvPr id="13" name="Textfeld 12"/>
+          <p:cNvSpPr txBox="1"/>
+          <p:nvPr/>
+        </p:nvSpPr>
+        <p:spPr>
+          <a:xfrm>
+            <a:off x="7536268" y="3217333"/>
+            <a:ext cx="2707217" cy="307777"/>
+          </a:xfrm>
+          <a:prstGeom prst="rect">
+            <a:avLst/>
+          </a:prstGeom>
+          <a:noFill/>
+          <a:ln w="19050">
+            <a:noFill/>
+          </a:ln>
+        </p:spPr>
+        <p:txBody>
+          <a:bodyPr wrap="square" rtlCol="0">
+            <a:spAutoFit/>
+          </a:bodyPr>
+          <a:lstStyle/>
+          <a:p>
+            <a:pPr algn="ctr"/>
+            <a:r>
+              <a:rPr lang="en-US" sz="1400" dirty="0" smtClean="0">
+                <a:solidFill>
+                  <a:schemeClr val="accent3"/>
+                </a:solidFill>
+              </a:rPr>
+              <a:t>KONG COMPONENTS</a:t>
+            </a:r>
+            <a:endParaRPr lang="en-US" sz="1400" dirty="0">
+              <a:solidFill>
+                <a:schemeClr val="accent3"/>
+              </a:solidFill>
+            </a:endParaRPr>
+          </a:p>
+        </p:txBody>
+      </p:sp>
+      <p:sp>
+        <p:nvSpPr>
+          <p:cNvPr id="14" name="Abgerundetes Rechteck 13"/>
+          <p:cNvSpPr/>
+          <p:nvPr/>
+        </p:nvSpPr>
+        <p:spPr>
+          <a:xfrm>
+            <a:off x="7644002" y="4383597"/>
+            <a:ext cx="2523284" cy="391584"/>
+          </a:xfrm>
+          <a:prstGeom prst="roundRect">
+            <a:avLst>
+              <a:gd name="adj" fmla="val 5119"/>
+            </a:avLst>
+          </a:prstGeom>
+          <a:ln w="19050"/>
+        </p:spPr>
+        <p:style>
+          <a:lnRef idx="2">
+            <a:schemeClr val="accent3"/>
+          </a:lnRef>
+          <a:fillRef idx="1">
+            <a:schemeClr val="lt1"/>
+          </a:fillRef>
+          <a:effectRef idx="0">
+            <a:schemeClr val="accent3"/>
+          </a:effectRef>
+          <a:fontRef idx="minor">
+            <a:schemeClr val="dk1"/>
+          </a:fontRef>
+        </p:style>
+        <p:txBody>
+          <a:bodyPr vert="horz" rtlCol="0" anchor="ctr"/>
+          <a:lstStyle/>
+          <a:p>
+            <a:pPr algn="ctr"/>
+            <a:r>
+              <a:rPr lang="en-US" sz="1400" dirty="0" smtClean="0">
+                <a:solidFill>
+                  <a:schemeClr val="tx1">
+                    <a:lumMod val="50000"/>
+                    <a:lumOff val="50000"/>
+                  </a:schemeClr>
+                </a:solidFill>
+              </a:rPr>
+              <a:t>POSTGRES</a:t>
+            </a:r>
+            <a:endParaRPr lang="en-US" sz="1400" dirty="0">
+              <a:solidFill>
+                <a:schemeClr val="tx1">
+                  <a:lumMod val="50000"/>
+                  <a:lumOff val="50000"/>
+                </a:schemeClr>
+              </a:solidFill>
+            </a:endParaRPr>
+          </a:p>
+        </p:txBody>
+      </p:sp>
+      <p:sp>
+        <p:nvSpPr>
+          <p:cNvPr id="15" name="Abgerundetes Rechteck 14"/>
+          <p:cNvSpPr/>
+          <p:nvPr/>
+        </p:nvSpPr>
+        <p:spPr>
+          <a:xfrm rot="5400000">
+            <a:off x="3104353" y="168920"/>
+            <a:ext cx="399837" cy="3301153"/>
+          </a:xfrm>
+          <a:prstGeom prst="roundRect">
+            <a:avLst>
+              <a:gd name="adj" fmla="val 13388"/>
+            </a:avLst>
+          </a:prstGeom>
+          <a:ln w="19050"/>
+        </p:spPr>
+        <p:style>
+          <a:lnRef idx="2">
+            <a:schemeClr val="accent3"/>
+          </a:lnRef>
+          <a:fillRef idx="1">
+            <a:schemeClr val="lt1"/>
+          </a:fillRef>
+          <a:effectRef idx="0">
+            <a:schemeClr val="accent3"/>
+          </a:effectRef>
+          <a:fontRef idx="minor">
+            <a:schemeClr val="dk1"/>
+          </a:fontRef>
+        </p:style>
+        <p:txBody>
+          <a:bodyPr vert="vert270" rtlCol="0" anchor="ctr"/>
+          <a:lstStyle/>
+          <a:p>
+            <a:pPr algn="ctr"/>
+            <a:r>
+              <a:rPr lang="en-US" sz="1400" dirty="0" smtClean="0">
+                <a:solidFill>
+                  <a:schemeClr val="tx1">
+                    <a:lumMod val="50000"/>
+                    <a:lumOff val="50000"/>
+                  </a:schemeClr>
+                </a:solidFill>
+              </a:rPr>
+              <a:t>HAPROXY</a:t>
+            </a:r>
+            <a:endParaRPr lang="en-US" sz="1400" dirty="0">
+              <a:solidFill>
+                <a:schemeClr val="tx1">
+                  <a:lumMod val="50000"/>
+                  <a:lumOff val="50000"/>
+                </a:schemeClr>
+              </a:solidFill>
+            </a:endParaRPr>
+          </a:p>
+        </p:txBody>
+      </p:sp>
+      <p:cxnSp>
+        <p:nvCxnSpPr>
+          <p:cNvPr id="17" name="Gerade Verbindung mit Pfeil 16"/>
+          <p:cNvCxnSpPr/>
+          <p:nvPr/>
+        </p:nvCxnSpPr>
+        <p:spPr>
+          <a:xfrm>
+            <a:off x="10421286" y="3818466"/>
+            <a:ext cx="414866" cy="0"/>
+          </a:xfrm>
+          <a:prstGeom prst="straightConnector1">
+            <a:avLst/>
+          </a:prstGeom>
+          <a:ln w="19050">
+            <a:tailEnd type="triangle"/>
+          </a:ln>
+        </p:spPr>
+        <p:style>
+          <a:lnRef idx="1">
+            <a:schemeClr val="accent1"/>
+          </a:lnRef>
+          <a:fillRef idx="0">
+            <a:schemeClr val="accent1"/>
+          </a:fillRef>
+          <a:effectRef idx="0">
+            <a:schemeClr val="accent1"/>
+          </a:effectRef>
+          <a:fontRef idx="minor">
+            <a:schemeClr val="tx1"/>
+          </a:fontRef>
+        </p:style>
+      </p:cxnSp>
+      <p:sp>
+        <p:nvSpPr>
+          <p:cNvPr id="19" name="Abgerundetes Rechteck 18"/>
+          <p:cNvSpPr/>
+          <p:nvPr/>
+        </p:nvSpPr>
+        <p:spPr>
+          <a:xfrm rot="5400000">
+            <a:off x="2244830" y="1549427"/>
+            <a:ext cx="399837" cy="1582108"/>
+          </a:xfrm>
+          <a:prstGeom prst="roundRect">
+            <a:avLst>
+              <a:gd name="adj" fmla="val 13388"/>
+            </a:avLst>
+          </a:prstGeom>
+          <a:ln w="19050"/>
+        </p:spPr>
+        <p:style>
+          <a:lnRef idx="2">
+            <a:schemeClr val="accent3"/>
+          </a:lnRef>
+          <a:fillRef idx="1">
+            <a:schemeClr val="lt1"/>
+          </a:fillRef>
+          <a:effectRef idx="0">
+            <a:schemeClr val="accent3"/>
+          </a:effectRef>
+          <a:fontRef idx="minor">
+            <a:schemeClr val="dk1"/>
+          </a:fontRef>
+        </p:style>
+        <p:txBody>
+          <a:bodyPr vert="vert270" rtlCol="0" anchor="ctr"/>
+          <a:lstStyle/>
+          <a:p>
+            <a:pPr algn="ctr"/>
+            <a:r>
+              <a:rPr lang="en-US" sz="1400" dirty="0" smtClean="0">
+                <a:solidFill>
+                  <a:schemeClr val="tx1">
+                    <a:lumMod val="50000"/>
+                    <a:lumOff val="50000"/>
+                  </a:schemeClr>
+                </a:solidFill>
+              </a:rPr>
+              <a:t>KONG</a:t>
+            </a:r>
+            <a:endParaRPr lang="en-US" sz="1400" dirty="0">
+              <a:solidFill>
+                <a:schemeClr val="tx1">
+                  <a:lumMod val="50000"/>
+                  <a:lumOff val="50000"/>
+                </a:schemeClr>
+              </a:solidFill>
+            </a:endParaRPr>
+          </a:p>
+        </p:txBody>
+      </p:sp>
+      <p:sp>
+        <p:nvSpPr>
+          <p:cNvPr id="22" name="Abgerundetes Rechteck 21"/>
+          <p:cNvSpPr/>
+          <p:nvPr/>
+        </p:nvSpPr>
+        <p:spPr>
+          <a:xfrm rot="5400000">
+            <a:off x="3963875" y="1549428"/>
+            <a:ext cx="399837" cy="1582108"/>
+          </a:xfrm>
+          <a:prstGeom prst="roundRect">
+            <a:avLst>
+              <a:gd name="adj" fmla="val 13388"/>
+            </a:avLst>
+          </a:prstGeom>
+          <a:ln w="19050"/>
+        </p:spPr>
+        <p:style>
+          <a:lnRef idx="2">
+            <a:schemeClr val="accent3"/>
+          </a:lnRef>
+          <a:fillRef idx="1">
+            <a:schemeClr val="lt1"/>
+          </a:fillRef>
+          <a:effectRef idx="0">
+            <a:schemeClr val="accent3"/>
+          </a:effectRef>
+          <a:fontRef idx="minor">
+            <a:schemeClr val="dk1"/>
+          </a:fontRef>
+        </p:style>
+        <p:txBody>
+          <a:bodyPr vert="vert270" rtlCol="0" anchor="ctr"/>
+          <a:lstStyle/>
+          <a:p>
+            <a:pPr algn="ctr"/>
+            <a:r>
+              <a:rPr lang="en-US" sz="1400" dirty="0" smtClean="0">
+                <a:solidFill>
+                  <a:schemeClr val="tx1">
+                    <a:lumMod val="50000"/>
+                    <a:lumOff val="50000"/>
+                  </a:schemeClr>
+                </a:solidFill>
+              </a:rPr>
+              <a:t>PORTAL-API</a:t>
+            </a:r>
+            <a:endParaRPr lang="en-US" sz="1400" dirty="0">
+              <a:solidFill>
+                <a:schemeClr val="tx1">
+                  <a:lumMod val="50000"/>
+                  <a:lumOff val="50000"/>
+                </a:schemeClr>
+              </a:solidFill>
+            </a:endParaRPr>
+          </a:p>
+        </p:txBody>
+      </p:sp>
+      <p:sp>
+        <p:nvSpPr>
+          <p:cNvPr id="24" name="Abgerundetes Rechteck 23"/>
+          <p:cNvSpPr/>
+          <p:nvPr/>
+        </p:nvSpPr>
+        <p:spPr>
+          <a:xfrm rot="5400000">
+            <a:off x="3963874" y="2070414"/>
+            <a:ext cx="399837" cy="1582108"/>
+          </a:xfrm>
+          <a:prstGeom prst="roundRect">
+            <a:avLst>
+              <a:gd name="adj" fmla="val 13388"/>
+            </a:avLst>
+          </a:prstGeom>
+          <a:ln w="19050"/>
+        </p:spPr>
+        <p:style>
+          <a:lnRef idx="2">
+            <a:schemeClr val="accent3"/>
+          </a:lnRef>
+          <a:fillRef idx="1">
+            <a:schemeClr val="lt1"/>
+          </a:fillRef>
+          <a:effectRef idx="0">
+            <a:schemeClr val="accent3"/>
+          </a:effectRef>
+          <a:fontRef idx="minor">
+            <a:schemeClr val="dk1"/>
+          </a:fontRef>
+        </p:style>
+        <p:txBody>
+          <a:bodyPr vert="vert270" rtlCol="0" anchor="ctr"/>
+          <a:lstStyle/>
+          <a:p>
+            <a:pPr algn="ctr"/>
+            <a:r>
+              <a:rPr lang="en-US" sz="1400" smtClean="0">
+                <a:solidFill>
+                  <a:schemeClr val="tx1">
+                    <a:lumMod val="50000"/>
+                    <a:lumOff val="50000"/>
+                  </a:schemeClr>
+                </a:solidFill>
+              </a:rPr>
+              <a:t>KONG-ADAPTER</a:t>
+            </a:r>
+            <a:endParaRPr lang="en-US" sz="1400" dirty="0">
+              <a:solidFill>
+                <a:schemeClr val="tx1">
+                  <a:lumMod val="50000"/>
+                  <a:lumOff val="50000"/>
+                </a:schemeClr>
+              </a:solidFill>
+            </a:endParaRPr>
+          </a:p>
+        </p:txBody>
+      </p:sp>
+      <p:sp>
+        <p:nvSpPr>
+          <p:cNvPr id="26" name="Abgerundetes Rechteck 25"/>
+          <p:cNvSpPr/>
+          <p:nvPr/>
+        </p:nvSpPr>
+        <p:spPr>
+          <a:xfrm rot="5400000">
+            <a:off x="3963874" y="2593863"/>
+            <a:ext cx="399837" cy="1582108"/>
+          </a:xfrm>
+          <a:prstGeom prst="roundRect">
+            <a:avLst>
+              <a:gd name="adj" fmla="val 13388"/>
+            </a:avLst>
+          </a:prstGeom>
+          <a:ln w="19050"/>
+        </p:spPr>
+        <p:style>
+          <a:lnRef idx="2">
+            <a:schemeClr val="accent3"/>
+          </a:lnRef>
+          <a:fillRef idx="1">
+            <a:schemeClr val="lt1"/>
+          </a:fillRef>
+          <a:effectRef idx="0">
+            <a:schemeClr val="accent3"/>
+          </a:effectRef>
+          <a:fontRef idx="minor">
+            <a:schemeClr val="dk1"/>
+          </a:fontRef>
+        </p:style>
+        <p:txBody>
+          <a:bodyPr vert="vert270" rtlCol="0" anchor="ctr"/>
+          <a:lstStyle/>
+          <a:p>
+            <a:pPr algn="ctr"/>
+            <a:r>
+              <a:rPr lang="en-US" sz="1400" dirty="0" smtClean="0">
+                <a:solidFill>
+                  <a:schemeClr val="tx1">
+                    <a:lumMod val="50000"/>
+                    <a:lumOff val="50000"/>
+                  </a:schemeClr>
+                </a:solidFill>
+              </a:rPr>
+              <a:t>AUTH-SERVER</a:t>
+            </a:r>
+            <a:endParaRPr lang="en-US" sz="1400" dirty="0">
+              <a:solidFill>
+                <a:schemeClr val="tx1">
+                  <a:lumMod val="50000"/>
+                  <a:lumOff val="50000"/>
+                </a:schemeClr>
+              </a:solidFill>
+            </a:endParaRPr>
+          </a:p>
+        </p:txBody>
+      </p:sp>
+      <p:sp>
+        <p:nvSpPr>
+          <p:cNvPr id="27" name="Abgerundetes Rechteck 26"/>
+          <p:cNvSpPr/>
+          <p:nvPr/>
+        </p:nvSpPr>
+        <p:spPr>
+          <a:xfrm>
+            <a:off x="1649723" y="4063362"/>
+            <a:ext cx="3301153" cy="391584"/>
+          </a:xfrm>
+          <a:prstGeom prst="roundRect">
+            <a:avLst>
+              <a:gd name="adj" fmla="val 5119"/>
+            </a:avLst>
+          </a:prstGeom>
+          <a:ln w="19050">
+            <a:solidFill>
+              <a:schemeClr val="bg2"/>
+            </a:solidFill>
+          </a:ln>
+        </p:spPr>
+        <p:style>
+          <a:lnRef idx="2">
+            <a:schemeClr val="accent3"/>
+          </a:lnRef>
+          <a:fillRef idx="1">
+            <a:schemeClr val="lt1"/>
+          </a:fillRef>
+          <a:effectRef idx="0">
+            <a:schemeClr val="accent3"/>
+          </a:effectRef>
+          <a:fontRef idx="minor">
+            <a:schemeClr val="dk1"/>
+          </a:fontRef>
+        </p:style>
+        <p:txBody>
+          <a:bodyPr vert="horz" rtlCol="0" anchor="ctr"/>
+          <a:lstStyle/>
+          <a:p>
+            <a:pPr algn="ctr"/>
+            <a:r>
+              <a:rPr lang="en-US" sz="1400" dirty="0" smtClean="0">
+                <a:solidFill>
+                  <a:schemeClr val="tx1">
+                    <a:lumMod val="50000"/>
+                    <a:lumOff val="50000"/>
+                  </a:schemeClr>
+                </a:solidFill>
+              </a:rPr>
+              <a:t>BACKEND API</a:t>
+            </a:r>
+            <a:endParaRPr lang="en-US" sz="1400" dirty="0">
+              <a:solidFill>
+                <a:schemeClr val="tx1">
+                  <a:lumMod val="50000"/>
+                  <a:lumOff val="50000"/>
+                </a:schemeClr>
+              </a:solidFill>
+            </a:endParaRPr>
+          </a:p>
+        </p:txBody>
+      </p:sp>
+      <p:sp>
+        <p:nvSpPr>
+          <p:cNvPr id="28" name="Abgerundetes Rechteck 27"/>
+          <p:cNvSpPr/>
+          <p:nvPr/>
+        </p:nvSpPr>
+        <p:spPr>
+          <a:xfrm>
+            <a:off x="5262031" y="3184998"/>
+            <a:ext cx="1032443" cy="391584"/>
+          </a:xfrm>
+          <a:prstGeom prst="roundRect">
+            <a:avLst>
+              <a:gd name="adj" fmla="val 5119"/>
+            </a:avLst>
+          </a:prstGeom>
+          <a:ln w="19050">
+            <a:solidFill>
+              <a:schemeClr val="bg2"/>
+            </a:solidFill>
+          </a:ln>
+        </p:spPr>
+        <p:style>
+          <a:lnRef idx="2">
+            <a:schemeClr val="accent3"/>
+          </a:lnRef>
+          <a:fillRef idx="1">
+            <a:schemeClr val="lt1"/>
+          </a:fillRef>
+          <a:effectRef idx="0">
+            <a:schemeClr val="accent3"/>
+          </a:effectRef>
+          <a:fontRef idx="minor">
+            <a:schemeClr val="dk1"/>
+          </a:fontRef>
+        </p:style>
+        <p:txBody>
+          <a:bodyPr vert="horz" rtlCol="0" anchor="ctr"/>
+          <a:lstStyle/>
+          <a:p>
+            <a:pPr algn="ctr"/>
+            <a:r>
+              <a:rPr lang="en-US" sz="1400" dirty="0" smtClean="0">
+                <a:solidFill>
+                  <a:schemeClr val="tx1">
+                    <a:lumMod val="50000"/>
+                    <a:lumOff val="50000"/>
+                  </a:schemeClr>
+                </a:solidFill>
+              </a:rPr>
+              <a:t>IDP</a:t>
+            </a:r>
+            <a:endParaRPr lang="en-US" sz="1400" dirty="0">
+              <a:solidFill>
+                <a:schemeClr val="tx1">
+                  <a:lumMod val="50000"/>
+                  <a:lumOff val="50000"/>
+                </a:schemeClr>
+              </a:solidFill>
+            </a:endParaRPr>
+          </a:p>
+        </p:txBody>
+      </p:sp>
+      <p:sp>
+        <p:nvSpPr>
+          <p:cNvPr id="29" name="Freihandform 28"/>
+          <p:cNvSpPr/>
+          <p:nvPr/>
+        </p:nvSpPr>
+        <p:spPr>
+          <a:xfrm>
+            <a:off x="2832193" y="946298"/>
+            <a:ext cx="697816" cy="2563327"/>
+          </a:xfrm>
+          <a:custGeom>
+            <a:avLst/>
+            <a:gdLst>
+              <a:gd name="connsiteX0" fmla="*/ 6700 w 697816"/>
+              <a:gd name="connsiteY0" fmla="*/ 0 h 2393206"/>
+              <a:gd name="connsiteX1" fmla="*/ 27965 w 697816"/>
+              <a:gd name="connsiteY1" fmla="*/ 1286539 h 2393206"/>
+              <a:gd name="connsiteX2" fmla="*/ 229984 w 697816"/>
+              <a:gd name="connsiteY2" fmla="*/ 2286000 h 2393206"/>
+              <a:gd name="connsiteX3" fmla="*/ 697816 w 697816"/>
+              <a:gd name="connsiteY3" fmla="*/ 2317897 h 2393206"/>
+            </a:gdLst>
+            <a:ahLst/>
+            <a:cxnLst>
+              <a:cxn ang="0">
+                <a:pos x="connsiteX0" y="connsiteY0"/>
+              </a:cxn>
+              <a:cxn ang="0">
+                <a:pos x="connsiteX1" y="connsiteY1"/>
+              </a:cxn>
+              <a:cxn ang="0">
+                <a:pos x="connsiteX2" y="connsiteY2"/>
+              </a:cxn>
+              <a:cxn ang="0">
+                <a:pos x="connsiteX3" y="connsiteY3"/>
+              </a:cxn>
+            </a:cxnLst>
+            <a:rect l="l" t="t" r="r" b="b"/>
+            <a:pathLst>
+              <a:path w="697816" h="2393206">
+                <a:moveTo>
+                  <a:pt x="6700" y="0"/>
+                </a:moveTo>
+                <a:cubicBezTo>
+                  <a:pt x="-1275" y="452769"/>
+                  <a:pt x="-9249" y="905539"/>
+                  <a:pt x="27965" y="1286539"/>
+                </a:cubicBezTo>
+                <a:cubicBezTo>
+                  <a:pt x="65179" y="1667539"/>
+                  <a:pt x="118342" y="2114107"/>
+                  <a:pt x="229984" y="2286000"/>
+                </a:cubicBezTo>
+                <a:cubicBezTo>
+                  <a:pt x="341626" y="2457893"/>
+                  <a:pt x="519721" y="2387895"/>
+                  <a:pt x="697816" y="2317897"/>
+                </a:cubicBezTo>
+              </a:path>
+            </a:pathLst>
+          </a:custGeom>
+          <a:ln w="76200">
+            <a:solidFill>
+              <a:schemeClr val="accent1">
+                <a:alpha val="41000"/>
+              </a:schemeClr>
+            </a:solidFill>
+            <a:tailEnd type="triangle"/>
+          </a:ln>
+        </p:spPr>
+        <p:style>
+          <a:lnRef idx="1">
+            <a:schemeClr val="accent1"/>
+          </a:lnRef>
+          <a:fillRef idx="0">
+            <a:schemeClr val="accent1"/>
+          </a:fillRef>
+          <a:effectRef idx="0">
+            <a:schemeClr val="accent1"/>
+          </a:effectRef>
+          <a:fontRef idx="minor">
+            <a:schemeClr val="tx1"/>
+          </a:fontRef>
+        </p:style>
+        <p:txBody>
+          <a:bodyPr rtlCol="0" anchor="ctr"/>
+          <a:lstStyle/>
+          <a:p>
+            <a:pPr algn="ctr"/>
+            <a:endParaRPr lang="en-US"/>
+          </a:p>
+        </p:txBody>
+      </p:sp>
+      <p:sp>
+        <p:nvSpPr>
+          <p:cNvPr id="30" name="Freihandform 29"/>
+          <p:cNvSpPr/>
+          <p:nvPr/>
+        </p:nvSpPr>
+        <p:spPr>
+          <a:xfrm>
+            <a:off x="2032804" y="946298"/>
+            <a:ext cx="274461" cy="3338623"/>
+          </a:xfrm>
+          <a:custGeom>
+            <a:avLst/>
+            <a:gdLst>
+              <a:gd name="connsiteX0" fmla="*/ 8647 w 274461"/>
+              <a:gd name="connsiteY0" fmla="*/ 0 h 3125972"/>
+              <a:gd name="connsiteX1" fmla="*/ 19280 w 274461"/>
+              <a:gd name="connsiteY1" fmla="*/ 1169581 h 3125972"/>
+              <a:gd name="connsiteX2" fmla="*/ 178768 w 274461"/>
+              <a:gd name="connsiteY2" fmla="*/ 2753832 h 3125972"/>
+              <a:gd name="connsiteX3" fmla="*/ 274461 w 274461"/>
+              <a:gd name="connsiteY3" fmla="*/ 3125972 h 3125972"/>
+            </a:gdLst>
+            <a:ahLst/>
+            <a:cxnLst>
+              <a:cxn ang="0">
+                <a:pos x="connsiteX0" y="connsiteY0"/>
+              </a:cxn>
+              <a:cxn ang="0">
+                <a:pos x="connsiteX1" y="connsiteY1"/>
+              </a:cxn>
+              <a:cxn ang="0">
+                <a:pos x="connsiteX2" y="connsiteY2"/>
+              </a:cxn>
+              <a:cxn ang="0">
+                <a:pos x="connsiteX3" y="connsiteY3"/>
+              </a:cxn>
+            </a:cxnLst>
+            <a:rect l="l" t="t" r="r" b="b"/>
+            <a:pathLst>
+              <a:path w="274461" h="3125972">
+                <a:moveTo>
+                  <a:pt x="8647" y="0"/>
+                </a:moveTo>
+                <a:cubicBezTo>
+                  <a:pt x="-214" y="355304"/>
+                  <a:pt x="-9074" y="710609"/>
+                  <a:pt x="19280" y="1169581"/>
+                </a:cubicBezTo>
+                <a:cubicBezTo>
+                  <a:pt x="47634" y="1628553"/>
+                  <a:pt x="136238" y="2427767"/>
+                  <a:pt x="178768" y="2753832"/>
+                </a:cubicBezTo>
+                <a:cubicBezTo>
+                  <a:pt x="221298" y="3079897"/>
+                  <a:pt x="247879" y="3102934"/>
+                  <a:pt x="274461" y="3125972"/>
+                </a:cubicBezTo>
+              </a:path>
+            </a:pathLst>
+          </a:custGeom>
+          <a:ln w="76200">
+            <a:solidFill>
+              <a:schemeClr val="accent1">
+                <a:alpha val="41000"/>
+              </a:schemeClr>
+            </a:solidFill>
+            <a:tailEnd type="triangle"/>
+          </a:ln>
+        </p:spPr>
+        <p:style>
+          <a:lnRef idx="1">
+            <a:schemeClr val="accent1"/>
+          </a:lnRef>
+          <a:fillRef idx="0">
+            <a:schemeClr val="accent1"/>
+          </a:fillRef>
+          <a:effectRef idx="0">
+            <a:schemeClr val="accent1"/>
+          </a:effectRef>
+          <a:fontRef idx="minor">
+            <a:schemeClr val="tx1"/>
+          </a:fontRef>
+        </p:style>
+        <p:txBody>
+          <a:bodyPr rtlCol="0" anchor="ctr"/>
+          <a:lstStyle/>
+          <a:p>
+            <a:pPr algn="ctr"/>
+            <a:endParaRPr lang="en-US">
+              <a:solidFill>
+                <a:schemeClr val="tx1"/>
+              </a:solidFill>
+            </a:endParaRPr>
+          </a:p>
+        </p:txBody>
+      </p:sp>
+      <p:cxnSp>
+        <p:nvCxnSpPr>
+          <p:cNvPr id="32" name="Gerade Verbindung 31"/>
+          <p:cNvCxnSpPr/>
+          <p:nvPr/>
+        </p:nvCxnSpPr>
+        <p:spPr>
+          <a:xfrm flipV="1">
+            <a:off x="4821828" y="3413052"/>
+            <a:ext cx="590144" cy="75259"/>
+          </a:xfrm>
+          <a:prstGeom prst="line">
+            <a:avLst/>
+          </a:prstGeom>
+          <a:ln w="76200">
+            <a:solidFill>
+              <a:schemeClr val="accent1">
+                <a:alpha val="41000"/>
+              </a:schemeClr>
+            </a:solidFill>
+            <a:tailEnd type="triangle"/>
+          </a:ln>
+        </p:spPr>
+        <p:style>
+          <a:lnRef idx="1">
+            <a:schemeClr val="accent1"/>
+          </a:lnRef>
+          <a:fillRef idx="0">
+            <a:schemeClr val="accent1"/>
+          </a:fillRef>
+          <a:effectRef idx="0">
+            <a:schemeClr val="accent1"/>
+          </a:effectRef>
+          <a:fontRef idx="minor">
+            <a:schemeClr val="tx1"/>
+          </a:fontRef>
+        </p:style>
+      </p:cxnSp>
+      <p:sp>
+        <p:nvSpPr>
+          <p:cNvPr id="34" name="Freihandform 33"/>
+          <p:cNvSpPr/>
+          <p:nvPr/>
+        </p:nvSpPr>
+        <p:spPr>
+          <a:xfrm>
+            <a:off x="4752753" y="2934586"/>
+            <a:ext cx="170804" cy="404037"/>
+          </a:xfrm>
+          <a:custGeom>
+            <a:avLst/>
+            <a:gdLst>
+              <a:gd name="connsiteX0" fmla="*/ 0 w 170804"/>
+              <a:gd name="connsiteY0" fmla="*/ 404037 h 404037"/>
+              <a:gd name="connsiteX1" fmla="*/ 170121 w 170804"/>
+              <a:gd name="connsiteY1" fmla="*/ 255181 h 404037"/>
+              <a:gd name="connsiteX2" fmla="*/ 63796 w 170804"/>
+              <a:gd name="connsiteY2" fmla="*/ 0 h 404037"/>
+            </a:gdLst>
+            <a:ahLst/>
+            <a:cxnLst>
+              <a:cxn ang="0">
+                <a:pos x="connsiteX0" y="connsiteY0"/>
+              </a:cxn>
+              <a:cxn ang="0">
+                <a:pos x="connsiteX1" y="connsiteY1"/>
+              </a:cxn>
+              <a:cxn ang="0">
+                <a:pos x="connsiteX2" y="connsiteY2"/>
+              </a:cxn>
+            </a:cxnLst>
+            <a:rect l="l" t="t" r="r" b="b"/>
+            <a:pathLst>
+              <a:path w="170804" h="404037">
+                <a:moveTo>
+                  <a:pt x="0" y="404037"/>
+                </a:moveTo>
+                <a:cubicBezTo>
+                  <a:pt x="79744" y="363278"/>
+                  <a:pt x="159488" y="322520"/>
+                  <a:pt x="170121" y="255181"/>
+                </a:cubicBezTo>
+                <a:cubicBezTo>
+                  <a:pt x="180754" y="187841"/>
+                  <a:pt x="63796" y="0"/>
+                  <a:pt x="63796" y="0"/>
+                </a:cubicBezTo>
+              </a:path>
+            </a:pathLst>
+          </a:custGeom>
+          <a:ln w="76200">
+            <a:solidFill>
+              <a:schemeClr val="accent1">
+                <a:alpha val="41000"/>
+              </a:schemeClr>
+            </a:solidFill>
+            <a:tailEnd type="triangle"/>
+          </a:ln>
+        </p:spPr>
+        <p:style>
+          <a:lnRef idx="1">
+            <a:schemeClr val="accent1"/>
+          </a:lnRef>
+          <a:fillRef idx="0">
+            <a:schemeClr val="accent1"/>
+          </a:fillRef>
+          <a:effectRef idx="0">
+            <a:schemeClr val="accent1"/>
+          </a:effectRef>
+          <a:fontRef idx="minor">
+            <a:schemeClr val="tx1"/>
+          </a:fontRef>
+        </p:style>
+        <p:txBody>
+          <a:bodyPr rtlCol="0" anchor="ctr"/>
+          <a:lstStyle/>
+          <a:p>
+            <a:pPr algn="ctr"/>
+            <a:endParaRPr lang="en-US">
+              <a:solidFill>
+                <a:schemeClr val="tx1"/>
+              </a:solidFill>
+            </a:endParaRPr>
+          </a:p>
+        </p:txBody>
+      </p:sp>
+      <p:sp>
+        <p:nvSpPr>
+          <p:cNvPr id="35" name="Freihandform 34"/>
+          <p:cNvSpPr/>
+          <p:nvPr/>
+        </p:nvSpPr>
+        <p:spPr>
+          <a:xfrm>
+            <a:off x="3062177" y="2360428"/>
+            <a:ext cx="606056" cy="531628"/>
+          </a:xfrm>
+          <a:custGeom>
+            <a:avLst/>
+            <a:gdLst>
+              <a:gd name="connsiteX0" fmla="*/ 606056 w 606056"/>
+              <a:gd name="connsiteY0" fmla="*/ 531628 h 531628"/>
+              <a:gd name="connsiteX1" fmla="*/ 138223 w 606056"/>
+              <a:gd name="connsiteY1" fmla="*/ 372139 h 531628"/>
+              <a:gd name="connsiteX2" fmla="*/ 0 w 606056"/>
+              <a:gd name="connsiteY2" fmla="*/ 0 h 531628"/>
+            </a:gdLst>
+            <a:ahLst/>
+            <a:cxnLst>
+              <a:cxn ang="0">
+                <a:pos x="connsiteX0" y="connsiteY0"/>
+              </a:cxn>
+              <a:cxn ang="0">
+                <a:pos x="connsiteX1" y="connsiteY1"/>
+              </a:cxn>
+              <a:cxn ang="0">
+                <a:pos x="connsiteX2" y="connsiteY2"/>
+              </a:cxn>
+            </a:cxnLst>
+            <a:rect l="l" t="t" r="r" b="b"/>
+            <a:pathLst>
+              <a:path w="606056" h="531628">
+                <a:moveTo>
+                  <a:pt x="606056" y="531628"/>
+                </a:moveTo>
+                <a:cubicBezTo>
+                  <a:pt x="422644" y="496186"/>
+                  <a:pt x="239232" y="460744"/>
+                  <a:pt x="138223" y="372139"/>
+                </a:cubicBezTo>
+                <a:cubicBezTo>
+                  <a:pt x="37214" y="283534"/>
+                  <a:pt x="0" y="0"/>
+                  <a:pt x="0" y="0"/>
+                </a:cubicBezTo>
+              </a:path>
+            </a:pathLst>
+          </a:custGeom>
+          <a:ln w="76200">
+            <a:solidFill>
+              <a:schemeClr val="accent1">
+                <a:alpha val="41000"/>
+              </a:schemeClr>
+            </a:solidFill>
+            <a:tailEnd type="triangle"/>
+          </a:ln>
+        </p:spPr>
+        <p:style>
+          <a:lnRef idx="1">
+            <a:schemeClr val="accent1"/>
+          </a:lnRef>
+          <a:fillRef idx="0">
+            <a:schemeClr val="accent1"/>
+          </a:fillRef>
+          <a:effectRef idx="0">
+            <a:schemeClr val="accent1"/>
+          </a:effectRef>
+          <a:fontRef idx="minor">
+            <a:schemeClr val="tx1"/>
+          </a:fontRef>
+        </p:style>
+        <p:txBody>
+          <a:bodyPr rtlCol="0" anchor="ctr"/>
+          <a:lstStyle/>
+          <a:p>
+            <a:pPr algn="ctr"/>
+            <a:endParaRPr lang="en-US">
+              <a:solidFill>
+                <a:schemeClr val="tx1"/>
+              </a:solidFill>
+            </a:endParaRPr>
+          </a:p>
+        </p:txBody>
+      </p:sp>
+      <p:sp>
+        <p:nvSpPr>
+          <p:cNvPr id="36" name="Freihandform 35"/>
+          <p:cNvSpPr/>
+          <p:nvPr/>
+        </p:nvSpPr>
+        <p:spPr>
+          <a:xfrm>
+            <a:off x="4763386" y="2328530"/>
+            <a:ext cx="465769" cy="1084521"/>
+          </a:xfrm>
+          <a:custGeom>
+            <a:avLst/>
+            <a:gdLst>
+              <a:gd name="connsiteX0" fmla="*/ 0 w 465769"/>
+              <a:gd name="connsiteY0" fmla="*/ 1084521 h 1084521"/>
+              <a:gd name="connsiteX1" fmla="*/ 372140 w 465769"/>
+              <a:gd name="connsiteY1" fmla="*/ 850605 h 1084521"/>
+              <a:gd name="connsiteX2" fmla="*/ 446567 w 465769"/>
+              <a:gd name="connsiteY2" fmla="*/ 350875 h 1084521"/>
+              <a:gd name="connsiteX3" fmla="*/ 85061 w 465769"/>
+              <a:gd name="connsiteY3" fmla="*/ 0 h 1084521"/>
+            </a:gdLst>
+            <a:ahLst/>
+            <a:cxnLst>
+              <a:cxn ang="0">
+                <a:pos x="connsiteX0" y="connsiteY0"/>
+              </a:cxn>
+              <a:cxn ang="0">
+                <a:pos x="connsiteX1" y="connsiteY1"/>
+              </a:cxn>
+              <a:cxn ang="0">
+                <a:pos x="connsiteX2" y="connsiteY2"/>
+              </a:cxn>
+              <a:cxn ang="0">
+                <a:pos x="connsiteX3" y="connsiteY3"/>
+              </a:cxn>
+            </a:cxnLst>
+            <a:rect l="l" t="t" r="r" b="b"/>
+            <a:pathLst>
+              <a:path w="465769" h="1084521">
+                <a:moveTo>
+                  <a:pt x="0" y="1084521"/>
+                </a:moveTo>
+                <a:cubicBezTo>
+                  <a:pt x="148856" y="1028700"/>
+                  <a:pt x="297712" y="972879"/>
+                  <a:pt x="372140" y="850605"/>
+                </a:cubicBezTo>
+                <a:cubicBezTo>
+                  <a:pt x="446568" y="728331"/>
+                  <a:pt x="494414" y="492642"/>
+                  <a:pt x="446567" y="350875"/>
+                </a:cubicBezTo>
+                <a:cubicBezTo>
+                  <a:pt x="398721" y="209107"/>
+                  <a:pt x="85061" y="0"/>
+                  <a:pt x="85061" y="0"/>
+                </a:cubicBezTo>
+              </a:path>
+            </a:pathLst>
+          </a:custGeom>
+          <a:ln w="76200">
+            <a:solidFill>
+              <a:schemeClr val="accent1">
+                <a:alpha val="41000"/>
+              </a:schemeClr>
+            </a:solidFill>
+            <a:tailEnd type="triangle"/>
+          </a:ln>
+        </p:spPr>
+        <p:style>
+          <a:lnRef idx="1">
+            <a:schemeClr val="accent1"/>
+          </a:lnRef>
+          <a:fillRef idx="0">
+            <a:schemeClr val="accent1"/>
+          </a:fillRef>
+          <a:effectRef idx="0">
+            <a:schemeClr val="accent1"/>
+          </a:effectRef>
+          <a:fontRef idx="minor">
+            <a:schemeClr val="tx1"/>
+          </a:fontRef>
+        </p:style>
+        <p:txBody>
+          <a:bodyPr rtlCol="0" anchor="ctr"/>
+          <a:lstStyle/>
+          <a:p>
+            <a:pPr algn="ctr"/>
+            <a:endParaRPr lang="en-US"/>
+          </a:p>
+        </p:txBody>
+      </p:sp>
+      <p:sp>
+        <p:nvSpPr>
+          <p:cNvPr id="38" name="Abgerundetes Rechteck 37"/>
+          <p:cNvSpPr/>
+          <p:nvPr/>
+        </p:nvSpPr>
+        <p:spPr>
+          <a:xfrm>
+            <a:off x="1537002" y="630847"/>
+            <a:ext cx="3301153" cy="391584"/>
+          </a:xfrm>
+          <a:prstGeom prst="roundRect">
+            <a:avLst>
+              <a:gd name="adj" fmla="val 5119"/>
+            </a:avLst>
+          </a:prstGeom>
+          <a:ln w="19050">
+            <a:solidFill>
+              <a:schemeClr val="bg2"/>
+            </a:solidFill>
+          </a:ln>
+        </p:spPr>
+        <p:style>
+          <a:lnRef idx="2">
+            <a:schemeClr val="accent3"/>
+          </a:lnRef>
+          <a:fillRef idx="1">
+            <a:schemeClr val="lt1"/>
+          </a:fillRef>
+          <a:effectRef idx="0">
+            <a:schemeClr val="accent3"/>
+          </a:effectRef>
+          <a:fontRef idx="minor">
+            <a:schemeClr val="dk1"/>
+          </a:fontRef>
+        </p:style>
+        <p:txBody>
+          <a:bodyPr vert="horz" rtlCol="0" anchor="ctr"/>
+          <a:lstStyle/>
+          <a:p>
+            <a:pPr algn="ctr"/>
+            <a:r>
+              <a:rPr lang="en-US" sz="1400" dirty="0" smtClean="0">
+                <a:solidFill>
+                  <a:schemeClr val="tx1">
+                    <a:lumMod val="50000"/>
+                    <a:lumOff val="50000"/>
+                  </a:schemeClr>
+                </a:solidFill>
+              </a:rPr>
+              <a:t>CLIENT APPLICATION</a:t>
+            </a:r>
+            <a:endParaRPr lang="en-US" sz="1400" dirty="0">
+              <a:solidFill>
+                <a:schemeClr val="tx1">
+                  <a:lumMod val="50000"/>
+                  <a:lumOff val="50000"/>
+                </a:schemeClr>
+              </a:solidFill>
+            </a:endParaRPr>
+          </a:p>
+        </p:txBody>
+      </p:sp>
+    </p:spTree>
+    <p:extLst>
+      <p:ext uri="{BB962C8B-B14F-4D97-AF65-F5344CB8AC3E}">
+        <p14:creationId xmlns:p14="http://schemas.microsoft.com/office/powerpoint/2010/main" val="775840392"/>
+      </p:ext>
+    </p:extLst>
+  </p:cSld>
+  <p:clrMapOvr>
+    <a:masterClrMapping/>
+  </p:clrMapOvr>
+</p:sld>
+</file>
+
 <file path=ppt/slides/slide3.xml><?xml version="1.0" encoding="utf-8"?>
 <p:sld xmlns:a="http://schemas.openxmlformats.org/drawingml/2006/main" xmlns:r="http://schemas.openxmlformats.org/officeDocument/2006/relationships" xmlns:p="http://schemas.openxmlformats.org/presentationml/2006/main">
   <p:cSld>
@@ -15735,7 +17392,7 @@
         </p:nvSpPr>
         <p:spPr>
           <a:xfrm>
-            <a:off x="3104354" y="1592579"/>
+            <a:off x="3104354" y="1592580"/>
             <a:ext cx="399837" cy="3301153"/>
           </a:xfrm>
           <a:prstGeom prst="roundRect">

</xml_diff>

<commit_message>
Documentation revamp for 0.11
</commit_message>
<xml_diff>
--- a/doc/architecture-illustrations.pptx
+++ b/doc/architecture-illustrations.pptx
@@ -263,7 +263,7 @@
           <a:p>
             <a:fld id="{C1D20212-1D84-1140-85B9-B9CA8444BDC5}" type="datetimeFigureOut">
               <a:rPr lang="en-US" smtClean="0"/>
-              <a:t>10/31/16</a:t>
+              <a:t>12/8/16</a:t>
             </a:fld>
             <a:endParaRPr lang="en-US" dirty="0"/>
           </a:p>
@@ -433,7 +433,7 @@
           <a:p>
             <a:fld id="{C1D20212-1D84-1140-85B9-B9CA8444BDC5}" type="datetimeFigureOut">
               <a:rPr lang="en-US" smtClean="0"/>
-              <a:t>10/31/16</a:t>
+              <a:t>12/8/16</a:t>
             </a:fld>
             <a:endParaRPr lang="en-US" dirty="0"/>
           </a:p>
@@ -613,7 +613,7 @@
           <a:p>
             <a:fld id="{C1D20212-1D84-1140-85B9-B9CA8444BDC5}" type="datetimeFigureOut">
               <a:rPr lang="en-US" smtClean="0"/>
-              <a:t>10/31/16</a:t>
+              <a:t>12/8/16</a:t>
             </a:fld>
             <a:endParaRPr lang="en-US" dirty="0"/>
           </a:p>
@@ -783,7 +783,7 @@
           <a:p>
             <a:fld id="{C1D20212-1D84-1140-85B9-B9CA8444BDC5}" type="datetimeFigureOut">
               <a:rPr lang="en-US" smtClean="0"/>
-              <a:t>10/31/16</a:t>
+              <a:t>12/8/16</a:t>
             </a:fld>
             <a:endParaRPr lang="en-US" dirty="0"/>
           </a:p>
@@ -1029,7 +1029,7 @@
           <a:p>
             <a:fld id="{C1D20212-1D84-1140-85B9-B9CA8444BDC5}" type="datetimeFigureOut">
               <a:rPr lang="en-US" smtClean="0"/>
-              <a:t>10/31/16</a:t>
+              <a:t>12/8/16</a:t>
             </a:fld>
             <a:endParaRPr lang="en-US" dirty="0"/>
           </a:p>
@@ -1261,7 +1261,7 @@
           <a:p>
             <a:fld id="{C1D20212-1D84-1140-85B9-B9CA8444BDC5}" type="datetimeFigureOut">
               <a:rPr lang="en-US" smtClean="0"/>
-              <a:t>10/31/16</a:t>
+              <a:t>12/8/16</a:t>
             </a:fld>
             <a:endParaRPr lang="en-US" dirty="0"/>
           </a:p>
@@ -1628,7 +1628,7 @@
           <a:p>
             <a:fld id="{C1D20212-1D84-1140-85B9-B9CA8444BDC5}" type="datetimeFigureOut">
               <a:rPr lang="en-US" smtClean="0"/>
-              <a:t>10/31/16</a:t>
+              <a:t>12/8/16</a:t>
             </a:fld>
             <a:endParaRPr lang="en-US" dirty="0"/>
           </a:p>
@@ -1746,7 +1746,7 @@
           <a:p>
             <a:fld id="{C1D20212-1D84-1140-85B9-B9CA8444BDC5}" type="datetimeFigureOut">
               <a:rPr lang="en-US" smtClean="0"/>
-              <a:t>10/31/16</a:t>
+              <a:t>12/8/16</a:t>
             </a:fld>
             <a:endParaRPr lang="en-US" dirty="0"/>
           </a:p>
@@ -1841,7 +1841,7 @@
           <a:p>
             <a:fld id="{C1D20212-1D84-1140-85B9-B9CA8444BDC5}" type="datetimeFigureOut">
               <a:rPr lang="en-US" smtClean="0"/>
-              <a:t>10/31/16</a:t>
+              <a:t>12/8/16</a:t>
             </a:fld>
             <a:endParaRPr lang="en-US" dirty="0"/>
           </a:p>
@@ -2118,7 +2118,7 @@
           <a:p>
             <a:fld id="{C1D20212-1D84-1140-85B9-B9CA8444BDC5}" type="datetimeFigureOut">
               <a:rPr lang="en-US" smtClean="0"/>
-              <a:t>10/31/16</a:t>
+              <a:t>12/8/16</a:t>
             </a:fld>
             <a:endParaRPr lang="en-US" dirty="0"/>
           </a:p>
@@ -2371,7 +2371,7 @@
           <a:p>
             <a:fld id="{C1D20212-1D84-1140-85B9-B9CA8444BDC5}" type="datetimeFigureOut">
               <a:rPr lang="en-US" smtClean="0"/>
-              <a:t>10/31/16</a:t>
+              <a:t>12/8/16</a:t>
             </a:fld>
             <a:endParaRPr lang="en-US" dirty="0"/>
           </a:p>
@@ -2584,7 +2584,7 @@
           <a:p>
             <a:fld id="{C1D20212-1D84-1140-85B9-B9CA8444BDC5}" type="datetimeFigureOut">
               <a:rPr lang="en-US" smtClean="0"/>
-              <a:t>10/31/16</a:t>
+              <a:t>12/8/16</a:t>
             </a:fld>
             <a:endParaRPr lang="en-US" dirty="0"/>
           </a:p>
@@ -17821,48 +17821,6 @@
       </p:cxnSp>
       <p:cxnSp>
         <p:nvCxnSpPr>
-          <p:cNvPr id="26" name="Gerade Verbindung mit Pfeil 25"/>
-          <p:cNvCxnSpPr>
-            <a:stCxn id="7" idx="2"/>
-            <a:endCxn id="10" idx="1"/>
-          </p:cNvCxnSpPr>
-          <p:nvPr/>
-        </p:nvCxnSpPr>
-        <p:spPr>
-          <a:xfrm flipH="1">
-            <a:off x="2005762" y="4049390"/>
-            <a:ext cx="749479" cy="840224"/>
-          </a:xfrm>
-          <a:prstGeom prst="straightConnector1">
-            <a:avLst/>
-          </a:prstGeom>
-          <a:ln w="76200">
-            <a:solidFill>
-              <a:schemeClr val="accent1">
-                <a:alpha val="41000"/>
-              </a:schemeClr>
-            </a:solidFill>
-            <a:headEnd type="none" w="med" len="med"/>
-            <a:tailEnd type="none" w="med" len="med"/>
-          </a:ln>
-        </p:spPr>
-        <p:style>
-          <a:lnRef idx="1">
-            <a:schemeClr val="accent1"/>
-          </a:lnRef>
-          <a:fillRef idx="0">
-            <a:schemeClr val="accent1"/>
-          </a:fillRef>
-          <a:effectRef idx="0">
-            <a:schemeClr val="accent1"/>
-          </a:effectRef>
-          <a:fontRef idx="minor">
-            <a:schemeClr val="tx1"/>
-          </a:fontRef>
-        </p:style>
-      </p:cxnSp>
-      <p:cxnSp>
-        <p:nvCxnSpPr>
           <p:cNvPr id="29" name="Gerade Verbindung mit Pfeil 28"/>
           <p:cNvCxnSpPr>
             <a:stCxn id="7" idx="2"/>
@@ -17871,9 +17829,9 @@
           <p:nvPr/>
         </p:nvCxnSpPr>
         <p:spPr>
-          <a:xfrm>
-            <a:off x="2755241" y="4049390"/>
-            <a:ext cx="785793" cy="840224"/>
+          <a:xfrm flipH="1">
+            <a:off x="2755240" y="4049390"/>
+            <a:ext cx="1" cy="840224"/>
           </a:xfrm>
           <a:prstGeom prst="straightConnector1">
             <a:avLst/>
@@ -18897,7 +18855,7 @@
         </p:nvSpPr>
         <p:spPr>
           <a:xfrm>
-            <a:off x="2909855" y="4889614"/>
+            <a:off x="2124061" y="4889614"/>
             <a:ext cx="1262357" cy="1068148"/>
           </a:xfrm>
           <a:prstGeom prst="can">
@@ -18934,91 +18892,6 @@
                 </a:solidFill>
               </a:rPr>
               <a:t>DYNAMIC CONFIG</a:t>
-            </a:r>
-          </a:p>
-          <a:p>
-            <a:pPr algn="ctr"/>
-            <a:r>
-              <a:rPr lang="en-US" sz="1400" dirty="0" smtClean="0">
-                <a:solidFill>
-                  <a:schemeClr val="tx1">
-                    <a:lumMod val="50000"/>
-                    <a:lumOff val="50000"/>
-                  </a:schemeClr>
-                </a:solidFill>
-              </a:rPr>
-              <a:t>(VOLUME)</a:t>
-            </a:r>
-            <a:endParaRPr lang="en-US" sz="1400" dirty="0">
-              <a:solidFill>
-                <a:schemeClr val="tx1">
-                  <a:lumMod val="50000"/>
-                  <a:lumOff val="50000"/>
-                </a:schemeClr>
-              </a:solidFill>
-            </a:endParaRPr>
-          </a:p>
-        </p:txBody>
-      </p:sp>
-      <p:sp>
-        <p:nvSpPr>
-          <p:cNvPr id="10" name="Zylinder 9"/>
-          <p:cNvSpPr/>
-          <p:nvPr/>
-        </p:nvSpPr>
-        <p:spPr>
-          <a:xfrm>
-            <a:off x="1374583" y="4889614"/>
-            <a:ext cx="1262357" cy="1068148"/>
-          </a:xfrm>
-          <a:prstGeom prst="can">
-            <a:avLst/>
-          </a:prstGeom>
-          <a:ln w="19050"/>
-        </p:spPr>
-        <p:style>
-          <a:lnRef idx="2">
-            <a:schemeClr val="accent3"/>
-          </a:lnRef>
-          <a:fillRef idx="1">
-            <a:schemeClr val="lt1"/>
-          </a:fillRef>
-          <a:effectRef idx="0">
-            <a:schemeClr val="accent3"/>
-          </a:effectRef>
-          <a:fontRef idx="minor">
-            <a:schemeClr val="dk1"/>
-          </a:fontRef>
-        </p:style>
-        <p:txBody>
-          <a:bodyPr vert="horz" rtlCol="0" anchor="ctr"/>
-          <a:lstStyle/>
-          <a:p>
-            <a:pPr algn="ctr"/>
-            <a:r>
-              <a:rPr lang="en-US" sz="1400" dirty="0" smtClean="0">
-                <a:solidFill>
-                  <a:schemeClr val="tx1">
-                    <a:lumMod val="50000"/>
-                    <a:lumOff val="50000"/>
-                  </a:schemeClr>
-                </a:solidFill>
-              </a:rPr>
-              <a:t>STATIC</a:t>
-            </a:r>
-          </a:p>
-          <a:p>
-            <a:pPr algn="ctr"/>
-            <a:r>
-              <a:rPr lang="en-US" sz="1400" dirty="0" smtClean="0">
-                <a:solidFill>
-                  <a:schemeClr val="tx1">
-                    <a:lumMod val="50000"/>
-                    <a:lumOff val="50000"/>
-                  </a:schemeClr>
-                </a:solidFill>
-              </a:rPr>
-              <a:t>CONFIG</a:t>
             </a:r>
           </a:p>
           <a:p>

</xml_diff>

<commit_message>
Finished first draft of Kubernetes deployment docs
</commit_message>
<xml_diff>
--- a/doc/architecture-illustrations.pptx
+++ b/doc/architecture-illustrations.pptx
@@ -26,6 +26,7 @@
     <p:sldId id="276" r:id="rId20"/>
     <p:sldId id="277" r:id="rId21"/>
     <p:sldId id="278" r:id="rId22"/>
+    <p:sldId id="280" r:id="rId23"/>
   </p:sldIdLst>
   <p:sldSz cx="12192000" cy="6858000"/>
   <p:notesSz cx="6858000" cy="9144000"/>
@@ -263,7 +264,7 @@
           <a:p>
             <a:fld id="{C1D20212-1D84-1140-85B9-B9CA8444BDC5}" type="datetimeFigureOut">
               <a:rPr lang="en-US" smtClean="0"/>
-              <a:t>12/8/16</a:t>
+              <a:t>1/12/17</a:t>
             </a:fld>
             <a:endParaRPr lang="en-US" dirty="0"/>
           </a:p>
@@ -433,7 +434,7 @@
           <a:p>
             <a:fld id="{C1D20212-1D84-1140-85B9-B9CA8444BDC5}" type="datetimeFigureOut">
               <a:rPr lang="en-US" smtClean="0"/>
-              <a:t>12/8/16</a:t>
+              <a:t>1/12/17</a:t>
             </a:fld>
             <a:endParaRPr lang="en-US" dirty="0"/>
           </a:p>
@@ -613,7 +614,7 @@
           <a:p>
             <a:fld id="{C1D20212-1D84-1140-85B9-B9CA8444BDC5}" type="datetimeFigureOut">
               <a:rPr lang="en-US" smtClean="0"/>
-              <a:t>12/8/16</a:t>
+              <a:t>1/12/17</a:t>
             </a:fld>
             <a:endParaRPr lang="en-US" dirty="0"/>
           </a:p>
@@ -783,7 +784,7 @@
           <a:p>
             <a:fld id="{C1D20212-1D84-1140-85B9-B9CA8444BDC5}" type="datetimeFigureOut">
               <a:rPr lang="en-US" smtClean="0"/>
-              <a:t>12/8/16</a:t>
+              <a:t>1/12/17</a:t>
             </a:fld>
             <a:endParaRPr lang="en-US" dirty="0"/>
           </a:p>
@@ -1029,7 +1030,7 @@
           <a:p>
             <a:fld id="{C1D20212-1D84-1140-85B9-B9CA8444BDC5}" type="datetimeFigureOut">
               <a:rPr lang="en-US" smtClean="0"/>
-              <a:t>12/8/16</a:t>
+              <a:t>1/12/17</a:t>
             </a:fld>
             <a:endParaRPr lang="en-US" dirty="0"/>
           </a:p>
@@ -1261,7 +1262,7 @@
           <a:p>
             <a:fld id="{C1D20212-1D84-1140-85B9-B9CA8444BDC5}" type="datetimeFigureOut">
               <a:rPr lang="en-US" smtClean="0"/>
-              <a:t>12/8/16</a:t>
+              <a:t>1/12/17</a:t>
             </a:fld>
             <a:endParaRPr lang="en-US" dirty="0"/>
           </a:p>
@@ -1628,7 +1629,7 @@
           <a:p>
             <a:fld id="{C1D20212-1D84-1140-85B9-B9CA8444BDC5}" type="datetimeFigureOut">
               <a:rPr lang="en-US" smtClean="0"/>
-              <a:t>12/8/16</a:t>
+              <a:t>1/12/17</a:t>
             </a:fld>
             <a:endParaRPr lang="en-US" dirty="0"/>
           </a:p>
@@ -1746,7 +1747,7 @@
           <a:p>
             <a:fld id="{C1D20212-1D84-1140-85B9-B9CA8444BDC5}" type="datetimeFigureOut">
               <a:rPr lang="en-US" smtClean="0"/>
-              <a:t>12/8/16</a:t>
+              <a:t>1/12/17</a:t>
             </a:fld>
             <a:endParaRPr lang="en-US" dirty="0"/>
           </a:p>
@@ -1841,7 +1842,7 @@
           <a:p>
             <a:fld id="{C1D20212-1D84-1140-85B9-B9CA8444BDC5}" type="datetimeFigureOut">
               <a:rPr lang="en-US" smtClean="0"/>
-              <a:t>12/8/16</a:t>
+              <a:t>1/12/17</a:t>
             </a:fld>
             <a:endParaRPr lang="en-US" dirty="0"/>
           </a:p>
@@ -2118,7 +2119,7 @@
           <a:p>
             <a:fld id="{C1D20212-1D84-1140-85B9-B9CA8444BDC5}" type="datetimeFigureOut">
               <a:rPr lang="en-US" smtClean="0"/>
-              <a:t>12/8/16</a:t>
+              <a:t>1/12/17</a:t>
             </a:fld>
             <a:endParaRPr lang="en-US" dirty="0"/>
           </a:p>
@@ -2371,7 +2372,7 @@
           <a:p>
             <a:fld id="{C1D20212-1D84-1140-85B9-B9CA8444BDC5}" type="datetimeFigureOut">
               <a:rPr lang="en-US" smtClean="0"/>
-              <a:t>12/8/16</a:t>
+              <a:t>1/12/17</a:t>
             </a:fld>
             <a:endParaRPr lang="en-US" dirty="0"/>
           </a:p>
@@ -2584,7 +2585,7 @@
           <a:p>
             <a:fld id="{C1D20212-1D84-1140-85B9-B9CA8444BDC5}" type="datetimeFigureOut">
               <a:rPr lang="en-US" smtClean="0"/>
-              <a:t>12/8/16</a:t>
+              <a:t>1/12/17</a:t>
             </a:fld>
             <a:endParaRPr lang="en-US" dirty="0"/>
           </a:p>
@@ -16640,6 +16641,2076 @@
 </p:sld>
 </file>
 
+<file path=ppt/slides/slide22.xml><?xml version="1.0" encoding="utf-8"?>
+<p:sld xmlns:a="http://schemas.openxmlformats.org/drawingml/2006/main" xmlns:r="http://schemas.openxmlformats.org/officeDocument/2006/relationships" xmlns:p="http://schemas.openxmlformats.org/presentationml/2006/main">
+  <p:cSld>
+    <p:spTree>
+      <p:nvGrpSpPr>
+        <p:cNvPr id="1" name=""/>
+        <p:cNvGrpSpPr/>
+        <p:nvPr/>
+      </p:nvGrpSpPr>
+      <p:grpSpPr>
+        <a:xfrm>
+          <a:off x="0" y="0"/>
+          <a:ext cx="0" cy="0"/>
+          <a:chOff x="0" y="0"/>
+          <a:chExt cx="0" cy="0"/>
+        </a:xfrm>
+      </p:grpSpPr>
+      <p:sp>
+        <p:nvSpPr>
+          <p:cNvPr id="51" name="Rechteck 50"/>
+          <p:cNvSpPr/>
+          <p:nvPr/>
+        </p:nvSpPr>
+        <p:spPr>
+          <a:xfrm>
+            <a:off x="4348121" y="1181746"/>
+            <a:ext cx="3518611" cy="4210202"/>
+          </a:xfrm>
+          <a:prstGeom prst="rect">
+            <a:avLst/>
+          </a:prstGeom>
+          <a:solidFill>
+            <a:schemeClr val="bg1">
+              <a:lumMod val="85000"/>
+            </a:schemeClr>
+          </a:solidFill>
+        </p:spPr>
+        <p:style>
+          <a:lnRef idx="2">
+            <a:schemeClr val="accent3"/>
+          </a:lnRef>
+          <a:fillRef idx="1">
+            <a:schemeClr val="lt1"/>
+          </a:fillRef>
+          <a:effectRef idx="0">
+            <a:schemeClr val="accent3"/>
+          </a:effectRef>
+          <a:fontRef idx="minor">
+            <a:schemeClr val="dk1"/>
+          </a:fontRef>
+        </p:style>
+        <p:txBody>
+          <a:bodyPr rtlCol="0" anchor="ctr"/>
+          <a:lstStyle/>
+          <a:p>
+            <a:pPr algn="ctr"/>
+            <a:endParaRPr lang="en-US" noProof="1"/>
+          </a:p>
+        </p:txBody>
+      </p:sp>
+      <p:sp>
+        <p:nvSpPr>
+          <p:cNvPr id="15" name="Rechteck 14"/>
+          <p:cNvSpPr/>
+          <p:nvPr/>
+        </p:nvSpPr>
+        <p:spPr>
+          <a:xfrm>
+            <a:off x="4663324" y="2591884"/>
+            <a:ext cx="1047262" cy="828431"/>
+          </a:xfrm>
+          <a:prstGeom prst="rect">
+            <a:avLst/>
+          </a:prstGeom>
+        </p:spPr>
+        <p:style>
+          <a:lnRef idx="0">
+            <a:schemeClr val="accent5"/>
+          </a:lnRef>
+          <a:fillRef idx="3">
+            <a:schemeClr val="accent5"/>
+          </a:fillRef>
+          <a:effectRef idx="3">
+            <a:schemeClr val="accent5"/>
+          </a:effectRef>
+          <a:fontRef idx="minor">
+            <a:schemeClr val="lt1"/>
+          </a:fontRef>
+        </p:style>
+        <p:txBody>
+          <a:bodyPr rtlCol="0" anchor="t"/>
+          <a:lstStyle/>
+          <a:p>
+            <a:pPr algn="ctr"/>
+            <a:r>
+              <a:rPr lang="en-US" sz="1000" noProof="1" smtClean="0"/>
+              <a:t>auth-server</a:t>
+            </a:r>
+            <a:endParaRPr lang="en-US" sz="1000" noProof="1"/>
+          </a:p>
+        </p:txBody>
+      </p:sp>
+      <p:sp>
+        <p:nvSpPr>
+          <p:cNvPr id="79" name="Pfeil nach rechts 78"/>
+          <p:cNvSpPr/>
+          <p:nvPr/>
+        </p:nvSpPr>
+        <p:spPr>
+          <a:xfrm>
+            <a:off x="5343180" y="2754815"/>
+            <a:ext cx="2836344" cy="428980"/>
+          </a:xfrm>
+          <a:prstGeom prst="rightArrow">
+            <a:avLst/>
+          </a:prstGeom>
+          <a:solidFill>
+            <a:schemeClr val="accent1">
+              <a:alpha val="41000"/>
+            </a:schemeClr>
+          </a:solidFill>
+        </p:spPr>
+        <p:style>
+          <a:lnRef idx="0">
+            <a:schemeClr val="accent1"/>
+          </a:lnRef>
+          <a:fillRef idx="3">
+            <a:schemeClr val="accent1"/>
+          </a:fillRef>
+          <a:effectRef idx="3">
+            <a:schemeClr val="accent1"/>
+          </a:effectRef>
+          <a:fontRef idx="minor">
+            <a:schemeClr val="lt1"/>
+          </a:fontRef>
+        </p:style>
+        <p:txBody>
+          <a:bodyPr rtlCol="0" anchor="ctr"/>
+          <a:lstStyle/>
+          <a:p>
+            <a:pPr algn="ctr"/>
+            <a:endParaRPr lang="en-US" noProof="1"/>
+          </a:p>
+        </p:txBody>
+      </p:sp>
+      <p:sp>
+        <p:nvSpPr>
+          <p:cNvPr id="22" name="Rechteck 21"/>
+          <p:cNvSpPr/>
+          <p:nvPr/>
+        </p:nvSpPr>
+        <p:spPr>
+          <a:xfrm>
+            <a:off x="4081083" y="3498469"/>
+            <a:ext cx="519716" cy="1735019"/>
+          </a:xfrm>
+          <a:prstGeom prst="rect">
+            <a:avLst/>
+          </a:prstGeom>
+        </p:spPr>
+        <p:style>
+          <a:lnRef idx="0">
+            <a:schemeClr val="accent6"/>
+          </a:lnRef>
+          <a:fillRef idx="3">
+            <a:schemeClr val="accent6"/>
+          </a:fillRef>
+          <a:effectRef idx="3">
+            <a:schemeClr val="accent6"/>
+          </a:effectRef>
+          <a:fontRef idx="minor">
+            <a:schemeClr val="lt1"/>
+          </a:fontRef>
+        </p:style>
+        <p:txBody>
+          <a:bodyPr vert="vert270" rtlCol="0" anchor="ctr"/>
+          <a:lstStyle/>
+          <a:p>
+            <a:pPr algn="ctr"/>
+            <a:r>
+              <a:rPr lang="en-US" sz="1000" noProof="1" smtClean="0"/>
+              <a:t>kong-gw:8000</a:t>
+            </a:r>
+            <a:endParaRPr lang="en-US" sz="1000" noProof="1" smtClean="0"/>
+          </a:p>
+        </p:txBody>
+      </p:sp>
+      <p:sp>
+        <p:nvSpPr>
+          <p:cNvPr id="19" name="Rechteck 18"/>
+          <p:cNvSpPr/>
+          <p:nvPr/>
+        </p:nvSpPr>
+        <p:spPr>
+          <a:xfrm>
+            <a:off x="4663324" y="3498474"/>
+            <a:ext cx="1047262" cy="1735014"/>
+          </a:xfrm>
+          <a:prstGeom prst="rect">
+            <a:avLst/>
+          </a:prstGeom>
+        </p:spPr>
+        <p:style>
+          <a:lnRef idx="0">
+            <a:schemeClr val="accent5"/>
+          </a:lnRef>
+          <a:fillRef idx="3">
+            <a:schemeClr val="accent5"/>
+          </a:fillRef>
+          <a:effectRef idx="3">
+            <a:schemeClr val="accent5"/>
+          </a:effectRef>
+          <a:fontRef idx="minor">
+            <a:schemeClr val="lt1"/>
+          </a:fontRef>
+        </p:style>
+        <p:txBody>
+          <a:bodyPr rtlCol="0" anchor="t"/>
+          <a:lstStyle/>
+          <a:p>
+            <a:pPr algn="ctr"/>
+            <a:r>
+              <a:rPr lang="en-US" sz="1000" noProof="1" smtClean="0"/>
+              <a:t>kong</a:t>
+            </a:r>
+            <a:endParaRPr lang="en-US" sz="1000" noProof="1"/>
+          </a:p>
+        </p:txBody>
+      </p:sp>
+      <p:sp>
+        <p:nvSpPr>
+          <p:cNvPr id="72" name="Pfeil nach rechts 71"/>
+          <p:cNvSpPr/>
+          <p:nvPr/>
+        </p:nvSpPr>
+        <p:spPr>
+          <a:xfrm>
+            <a:off x="5344631" y="3692469"/>
+            <a:ext cx="2836344" cy="428980"/>
+          </a:xfrm>
+          <a:prstGeom prst="rightArrow">
+            <a:avLst/>
+          </a:prstGeom>
+          <a:solidFill>
+            <a:schemeClr val="accent1">
+              <a:alpha val="41000"/>
+            </a:schemeClr>
+          </a:solidFill>
+        </p:spPr>
+        <p:style>
+          <a:lnRef idx="0">
+            <a:schemeClr val="accent1"/>
+          </a:lnRef>
+          <a:fillRef idx="3">
+            <a:schemeClr val="accent1"/>
+          </a:fillRef>
+          <a:effectRef idx="3">
+            <a:schemeClr val="accent1"/>
+          </a:effectRef>
+          <a:fontRef idx="minor">
+            <a:schemeClr val="lt1"/>
+          </a:fontRef>
+        </p:style>
+        <p:txBody>
+          <a:bodyPr rtlCol="0" anchor="ctr"/>
+          <a:lstStyle/>
+          <a:p>
+            <a:pPr algn="ctr"/>
+            <a:endParaRPr lang="en-US" noProof="1"/>
+          </a:p>
+        </p:txBody>
+      </p:sp>
+      <p:sp>
+        <p:nvSpPr>
+          <p:cNvPr id="36" name="Rechteck 35"/>
+          <p:cNvSpPr/>
+          <p:nvPr/>
+        </p:nvSpPr>
+        <p:spPr>
+          <a:xfrm>
+            <a:off x="8180975" y="1689641"/>
+            <a:ext cx="1555611" cy="828432"/>
+          </a:xfrm>
+          <a:prstGeom prst="rect">
+            <a:avLst/>
+          </a:prstGeom>
+        </p:spPr>
+        <p:style>
+          <a:lnRef idx="0">
+            <a:schemeClr val="dk1"/>
+          </a:lnRef>
+          <a:fillRef idx="3">
+            <a:schemeClr val="dk1"/>
+          </a:fillRef>
+          <a:effectRef idx="3">
+            <a:schemeClr val="dk1"/>
+          </a:effectRef>
+          <a:fontRef idx="minor">
+            <a:schemeClr val="lt1"/>
+          </a:fontRef>
+        </p:style>
+        <p:txBody>
+          <a:bodyPr rtlCol="0" anchor="ctr"/>
+          <a:lstStyle/>
+          <a:p>
+            <a:pPr algn="ctr"/>
+            <a:endParaRPr lang="en-US" noProof="1">
+              <a:solidFill>
+                <a:schemeClr val="bg1"/>
+              </a:solidFill>
+            </a:endParaRPr>
+          </a:p>
+        </p:txBody>
+      </p:sp>
+      <p:sp>
+        <p:nvSpPr>
+          <p:cNvPr id="5" name="Rechteck 4"/>
+          <p:cNvSpPr/>
+          <p:nvPr/>
+        </p:nvSpPr>
+        <p:spPr>
+          <a:xfrm>
+            <a:off x="6671878" y="1685305"/>
+            <a:ext cx="1047262" cy="828431"/>
+          </a:xfrm>
+          <a:prstGeom prst="rect">
+            <a:avLst/>
+          </a:prstGeom>
+        </p:spPr>
+        <p:style>
+          <a:lnRef idx="0">
+            <a:schemeClr val="accent5"/>
+          </a:lnRef>
+          <a:fillRef idx="3">
+            <a:schemeClr val="accent5"/>
+          </a:fillRef>
+          <a:effectRef idx="3">
+            <a:schemeClr val="accent5"/>
+          </a:effectRef>
+          <a:fontRef idx="minor">
+            <a:schemeClr val="lt1"/>
+          </a:fontRef>
+        </p:style>
+        <p:txBody>
+          <a:bodyPr rtlCol="0" anchor="t"/>
+          <a:lstStyle/>
+          <a:p>
+            <a:pPr algn="ctr"/>
+            <a:r>
+              <a:rPr lang="en-US" sz="1000" noProof="1" smtClean="0"/>
+              <a:t>portal-api</a:t>
+            </a:r>
+            <a:endParaRPr lang="en-US" sz="1000" noProof="1"/>
+          </a:p>
+        </p:txBody>
+      </p:sp>
+      <p:sp>
+        <p:nvSpPr>
+          <p:cNvPr id="4" name="Rechteck 3"/>
+          <p:cNvSpPr/>
+          <p:nvPr/>
+        </p:nvSpPr>
+        <p:spPr>
+          <a:xfrm>
+            <a:off x="6734401" y="1935397"/>
+            <a:ext cx="922215" cy="523631"/>
+          </a:xfrm>
+          <a:prstGeom prst="rect">
+            <a:avLst/>
+          </a:prstGeom>
+        </p:spPr>
+        <p:style>
+          <a:lnRef idx="0">
+            <a:schemeClr val="accent1"/>
+          </a:lnRef>
+          <a:fillRef idx="3">
+            <a:schemeClr val="accent1"/>
+          </a:fillRef>
+          <a:effectRef idx="3">
+            <a:schemeClr val="accent1"/>
+          </a:effectRef>
+          <a:fontRef idx="minor">
+            <a:schemeClr val="lt1"/>
+          </a:fontRef>
+        </p:style>
+        <p:txBody>
+          <a:bodyPr rtlCol="0" anchor="ctr"/>
+          <a:lstStyle/>
+          <a:p>
+            <a:pPr algn="ctr"/>
+            <a:r>
+              <a:rPr lang="en-US" sz="1000" noProof="1" smtClean="0"/>
+              <a:t>portal-api</a:t>
+            </a:r>
+            <a:endParaRPr lang="en-US" sz="1000" noProof="1"/>
+          </a:p>
+        </p:txBody>
+      </p:sp>
+      <p:sp>
+        <p:nvSpPr>
+          <p:cNvPr id="6" name="Rechteck 5"/>
+          <p:cNvSpPr/>
+          <p:nvPr/>
+        </p:nvSpPr>
+        <p:spPr>
+          <a:xfrm>
+            <a:off x="4663327" y="1685306"/>
+            <a:ext cx="1047262" cy="828431"/>
+          </a:xfrm>
+          <a:prstGeom prst="rect">
+            <a:avLst/>
+          </a:prstGeom>
+        </p:spPr>
+        <p:style>
+          <a:lnRef idx="0">
+            <a:schemeClr val="accent5"/>
+          </a:lnRef>
+          <a:fillRef idx="3">
+            <a:schemeClr val="accent5"/>
+          </a:fillRef>
+          <a:effectRef idx="3">
+            <a:schemeClr val="accent5"/>
+          </a:effectRef>
+          <a:fontRef idx="minor">
+            <a:schemeClr val="lt1"/>
+          </a:fontRef>
+        </p:style>
+        <p:txBody>
+          <a:bodyPr rtlCol="0" anchor="t"/>
+          <a:lstStyle/>
+          <a:p>
+            <a:pPr algn="ctr"/>
+            <a:r>
+              <a:rPr lang="en-US" sz="1000" noProof="1" smtClean="0"/>
+              <a:t>portal</a:t>
+            </a:r>
+            <a:endParaRPr lang="en-US" sz="1000" noProof="1"/>
+          </a:p>
+        </p:txBody>
+      </p:sp>
+      <p:sp>
+        <p:nvSpPr>
+          <p:cNvPr id="7" name="Rechteck 6"/>
+          <p:cNvSpPr/>
+          <p:nvPr/>
+        </p:nvSpPr>
+        <p:spPr>
+          <a:xfrm>
+            <a:off x="4725850" y="1935398"/>
+            <a:ext cx="922215" cy="523631"/>
+          </a:xfrm>
+          <a:prstGeom prst="rect">
+            <a:avLst/>
+          </a:prstGeom>
+        </p:spPr>
+        <p:style>
+          <a:lnRef idx="0">
+            <a:schemeClr val="accent1"/>
+          </a:lnRef>
+          <a:fillRef idx="3">
+            <a:schemeClr val="accent1"/>
+          </a:fillRef>
+          <a:effectRef idx="3">
+            <a:schemeClr val="accent1"/>
+          </a:effectRef>
+          <a:fontRef idx="minor">
+            <a:schemeClr val="lt1"/>
+          </a:fontRef>
+        </p:style>
+        <p:txBody>
+          <a:bodyPr rtlCol="0" anchor="ctr"/>
+          <a:lstStyle/>
+          <a:p>
+            <a:pPr algn="ctr"/>
+            <a:r>
+              <a:rPr lang="en-US" sz="1000" noProof="1" smtClean="0"/>
+              <a:t>portal</a:t>
+            </a:r>
+            <a:endParaRPr lang="en-US" sz="1000" noProof="1"/>
+          </a:p>
+        </p:txBody>
+      </p:sp>
+      <p:sp>
+        <p:nvSpPr>
+          <p:cNvPr id="8" name="Rechteck 7"/>
+          <p:cNvSpPr/>
+          <p:nvPr/>
+        </p:nvSpPr>
+        <p:spPr>
+          <a:xfrm>
+            <a:off x="6671878" y="2591885"/>
+            <a:ext cx="1047262" cy="828431"/>
+          </a:xfrm>
+          <a:prstGeom prst="rect">
+            <a:avLst/>
+          </a:prstGeom>
+        </p:spPr>
+        <p:style>
+          <a:lnRef idx="0">
+            <a:schemeClr val="accent5"/>
+          </a:lnRef>
+          <a:fillRef idx="3">
+            <a:schemeClr val="accent5"/>
+          </a:fillRef>
+          <a:effectRef idx="3">
+            <a:schemeClr val="accent5"/>
+          </a:effectRef>
+          <a:fontRef idx="minor">
+            <a:schemeClr val="lt1"/>
+          </a:fontRef>
+        </p:style>
+        <p:txBody>
+          <a:bodyPr rtlCol="0" anchor="t"/>
+          <a:lstStyle/>
+          <a:p>
+            <a:pPr algn="ctr"/>
+            <a:r>
+              <a:rPr lang="en-US" sz="800" noProof="1" smtClean="0"/>
+              <a:t>portal-kong-adapter</a:t>
+            </a:r>
+            <a:endParaRPr lang="en-US" sz="800" noProof="1"/>
+          </a:p>
+        </p:txBody>
+      </p:sp>
+      <p:sp>
+        <p:nvSpPr>
+          <p:cNvPr id="9" name="Rechteck 8"/>
+          <p:cNvSpPr/>
+          <p:nvPr/>
+        </p:nvSpPr>
+        <p:spPr>
+          <a:xfrm>
+            <a:off x="6734401" y="2841977"/>
+            <a:ext cx="922215" cy="523631"/>
+          </a:xfrm>
+          <a:prstGeom prst="rect">
+            <a:avLst/>
+          </a:prstGeom>
+        </p:spPr>
+        <p:style>
+          <a:lnRef idx="0">
+            <a:schemeClr val="accent1"/>
+          </a:lnRef>
+          <a:fillRef idx="3">
+            <a:schemeClr val="accent1"/>
+          </a:fillRef>
+          <a:effectRef idx="3">
+            <a:schemeClr val="accent1"/>
+          </a:effectRef>
+          <a:fontRef idx="minor">
+            <a:schemeClr val="lt1"/>
+          </a:fontRef>
+        </p:style>
+        <p:txBody>
+          <a:bodyPr rtlCol="0" anchor="ctr"/>
+          <a:lstStyle/>
+          <a:p>
+            <a:pPr algn="ctr"/>
+            <a:r>
+              <a:rPr lang="en-US" sz="1000" noProof="1" smtClean="0"/>
+              <a:t>portal-</a:t>
+            </a:r>
+            <a:r>
+              <a:rPr lang="en-US" sz="1000" noProof="1" smtClean="0"/>
+              <a:t>kong-adapter</a:t>
+            </a:r>
+            <a:endParaRPr lang="en-US" sz="1000" noProof="1"/>
+          </a:p>
+        </p:txBody>
+      </p:sp>
+      <p:sp>
+        <p:nvSpPr>
+          <p:cNvPr id="10" name="Rechteck 9"/>
+          <p:cNvSpPr/>
+          <p:nvPr/>
+        </p:nvSpPr>
+        <p:spPr>
+          <a:xfrm>
+            <a:off x="6671878" y="3498469"/>
+            <a:ext cx="1047262" cy="828431"/>
+          </a:xfrm>
+          <a:prstGeom prst="rect">
+            <a:avLst/>
+          </a:prstGeom>
+        </p:spPr>
+        <p:style>
+          <a:lnRef idx="0">
+            <a:schemeClr val="accent5"/>
+          </a:lnRef>
+          <a:fillRef idx="3">
+            <a:schemeClr val="accent5"/>
+          </a:fillRef>
+          <a:effectRef idx="3">
+            <a:schemeClr val="accent5"/>
+          </a:effectRef>
+          <a:fontRef idx="minor">
+            <a:schemeClr val="lt1"/>
+          </a:fontRef>
+        </p:style>
+        <p:txBody>
+          <a:bodyPr rtlCol="0" anchor="t"/>
+          <a:lstStyle/>
+          <a:p>
+            <a:pPr algn="ctr"/>
+            <a:r>
+              <a:rPr lang="en-US" sz="1000" noProof="1" smtClean="0"/>
+              <a:t>portal-mailer</a:t>
+            </a:r>
+            <a:endParaRPr lang="en-US" sz="1000" noProof="1"/>
+          </a:p>
+        </p:txBody>
+      </p:sp>
+      <p:sp>
+        <p:nvSpPr>
+          <p:cNvPr id="11" name="Rechteck 10"/>
+          <p:cNvSpPr/>
+          <p:nvPr/>
+        </p:nvSpPr>
+        <p:spPr>
+          <a:xfrm>
+            <a:off x="6734401" y="3748561"/>
+            <a:ext cx="922215" cy="523631"/>
+          </a:xfrm>
+          <a:prstGeom prst="rect">
+            <a:avLst/>
+          </a:prstGeom>
+        </p:spPr>
+        <p:style>
+          <a:lnRef idx="0">
+            <a:schemeClr val="accent1"/>
+          </a:lnRef>
+          <a:fillRef idx="3">
+            <a:schemeClr val="accent1"/>
+          </a:fillRef>
+          <a:effectRef idx="3">
+            <a:schemeClr val="accent1"/>
+          </a:effectRef>
+          <a:fontRef idx="minor">
+            <a:schemeClr val="lt1"/>
+          </a:fontRef>
+        </p:style>
+        <p:txBody>
+          <a:bodyPr rtlCol="0" anchor="ctr"/>
+          <a:lstStyle/>
+          <a:p>
+            <a:pPr algn="ctr"/>
+            <a:r>
+              <a:rPr lang="en-US" sz="1000" noProof="1" smtClean="0"/>
+              <a:t>portal-mailer</a:t>
+            </a:r>
+            <a:endParaRPr lang="en-US" sz="1000" noProof="1"/>
+          </a:p>
+        </p:txBody>
+      </p:sp>
+      <p:sp>
+        <p:nvSpPr>
+          <p:cNvPr id="12" name="Rechteck 11"/>
+          <p:cNvSpPr/>
+          <p:nvPr/>
+        </p:nvSpPr>
+        <p:spPr>
+          <a:xfrm>
+            <a:off x="6226400" y="1685305"/>
+            <a:ext cx="382953" cy="828431"/>
+          </a:xfrm>
+          <a:prstGeom prst="rect">
+            <a:avLst/>
+          </a:prstGeom>
+        </p:spPr>
+        <p:style>
+          <a:lnRef idx="0">
+            <a:schemeClr val="accent2"/>
+          </a:lnRef>
+          <a:fillRef idx="3">
+            <a:schemeClr val="accent2"/>
+          </a:fillRef>
+          <a:effectRef idx="3">
+            <a:schemeClr val="accent2"/>
+          </a:effectRef>
+          <a:fontRef idx="minor">
+            <a:schemeClr val="lt1"/>
+          </a:fontRef>
+        </p:style>
+        <p:txBody>
+          <a:bodyPr vert="vert270" rtlCol="0" anchor="ctr"/>
+          <a:lstStyle/>
+          <a:p>
+            <a:pPr algn="ctr"/>
+            <a:r>
+              <a:rPr lang="en-US" sz="1000" noProof="1" smtClean="0"/>
+              <a:t>portal-api:3001</a:t>
+            </a:r>
+            <a:endParaRPr lang="en-US" sz="1000" noProof="1"/>
+          </a:p>
+        </p:txBody>
+      </p:sp>
+      <p:sp>
+        <p:nvSpPr>
+          <p:cNvPr id="13" name="Rechteck 12"/>
+          <p:cNvSpPr/>
+          <p:nvPr/>
+        </p:nvSpPr>
+        <p:spPr>
+          <a:xfrm>
+            <a:off x="4081086" y="1685305"/>
+            <a:ext cx="519716" cy="828431"/>
+          </a:xfrm>
+          <a:prstGeom prst="rect">
+            <a:avLst/>
+          </a:prstGeom>
+        </p:spPr>
+        <p:style>
+          <a:lnRef idx="0">
+            <a:schemeClr val="accent6"/>
+          </a:lnRef>
+          <a:fillRef idx="3">
+            <a:schemeClr val="accent6"/>
+          </a:fillRef>
+          <a:effectRef idx="3">
+            <a:schemeClr val="accent6"/>
+          </a:effectRef>
+          <a:fontRef idx="minor">
+            <a:schemeClr val="lt1"/>
+          </a:fontRef>
+        </p:style>
+        <p:txBody>
+          <a:bodyPr vert="vert270" rtlCol="0" anchor="ctr"/>
+          <a:lstStyle/>
+          <a:p>
+            <a:pPr algn="ctr"/>
+            <a:r>
+              <a:rPr lang="en-US" sz="1000" noProof="1" smtClean="0"/>
+              <a:t>portal:3000</a:t>
+            </a:r>
+            <a:endParaRPr lang="en-US" sz="1000" noProof="1" smtClean="0"/>
+          </a:p>
+        </p:txBody>
+      </p:sp>
+      <p:sp>
+        <p:nvSpPr>
+          <p:cNvPr id="14" name="Rechteck 13"/>
+          <p:cNvSpPr/>
+          <p:nvPr/>
+        </p:nvSpPr>
+        <p:spPr>
+          <a:xfrm>
+            <a:off x="6226398" y="2591885"/>
+            <a:ext cx="382953" cy="828431"/>
+          </a:xfrm>
+          <a:prstGeom prst="rect">
+            <a:avLst/>
+          </a:prstGeom>
+        </p:spPr>
+        <p:style>
+          <a:lnRef idx="0">
+            <a:schemeClr val="accent2"/>
+          </a:lnRef>
+          <a:fillRef idx="3">
+            <a:schemeClr val="accent2"/>
+          </a:fillRef>
+          <a:effectRef idx="3">
+            <a:schemeClr val="accent2"/>
+          </a:effectRef>
+          <a:fontRef idx="minor">
+            <a:schemeClr val="lt1"/>
+          </a:fontRef>
+        </p:style>
+        <p:txBody>
+          <a:bodyPr vert="vert270" rtlCol="0" anchor="ctr"/>
+          <a:lstStyle/>
+          <a:p>
+            <a:pPr algn="ctr"/>
+            <a:r>
+              <a:rPr lang="en-US" sz="1000" noProof="1" smtClean="0"/>
+              <a:t>portal-kong-adapter:3002</a:t>
+            </a:r>
+            <a:endParaRPr lang="en-US" sz="1000" noProof="1"/>
+          </a:p>
+        </p:txBody>
+      </p:sp>
+      <p:sp>
+        <p:nvSpPr>
+          <p:cNvPr id="16" name="Rechteck 15"/>
+          <p:cNvSpPr/>
+          <p:nvPr/>
+        </p:nvSpPr>
+        <p:spPr>
+          <a:xfrm>
+            <a:off x="4725847" y="2841976"/>
+            <a:ext cx="922215" cy="523631"/>
+          </a:xfrm>
+          <a:prstGeom prst="rect">
+            <a:avLst/>
+          </a:prstGeom>
+        </p:spPr>
+        <p:style>
+          <a:lnRef idx="0">
+            <a:schemeClr val="accent1"/>
+          </a:lnRef>
+          <a:fillRef idx="3">
+            <a:schemeClr val="accent1"/>
+          </a:fillRef>
+          <a:effectRef idx="3">
+            <a:schemeClr val="accent1"/>
+          </a:effectRef>
+          <a:fontRef idx="minor">
+            <a:schemeClr val="lt1"/>
+          </a:fontRef>
+        </p:style>
+        <p:txBody>
+          <a:bodyPr rtlCol="0" anchor="ctr"/>
+          <a:lstStyle/>
+          <a:p>
+            <a:pPr algn="ctr"/>
+            <a:r>
+              <a:rPr lang="en-US" sz="1000" noProof="1" smtClean="0"/>
+              <a:t>auth-server</a:t>
+            </a:r>
+            <a:endParaRPr lang="en-US" sz="1000" noProof="1"/>
+          </a:p>
+        </p:txBody>
+      </p:sp>
+      <p:sp>
+        <p:nvSpPr>
+          <p:cNvPr id="17" name="Rechteck 16"/>
+          <p:cNvSpPr/>
+          <p:nvPr/>
+        </p:nvSpPr>
+        <p:spPr>
+          <a:xfrm>
+            <a:off x="6222488" y="3498468"/>
+            <a:ext cx="382953" cy="828431"/>
+          </a:xfrm>
+          <a:prstGeom prst="rect">
+            <a:avLst/>
+          </a:prstGeom>
+        </p:spPr>
+        <p:style>
+          <a:lnRef idx="0">
+            <a:schemeClr val="accent2"/>
+          </a:lnRef>
+          <a:fillRef idx="3">
+            <a:schemeClr val="accent2"/>
+          </a:fillRef>
+          <a:effectRef idx="3">
+            <a:schemeClr val="accent2"/>
+          </a:effectRef>
+          <a:fontRef idx="minor">
+            <a:schemeClr val="lt1"/>
+          </a:fontRef>
+        </p:style>
+        <p:txBody>
+          <a:bodyPr vert="vert270" rtlCol="0" anchor="ctr"/>
+          <a:lstStyle/>
+          <a:p>
+            <a:pPr algn="ctr"/>
+            <a:r>
+              <a:rPr lang="en-US" sz="1000" noProof="1" smtClean="0"/>
+              <a:t>portal-mailer:3003</a:t>
+            </a:r>
+            <a:endParaRPr lang="en-US" sz="1000" noProof="1"/>
+          </a:p>
+        </p:txBody>
+      </p:sp>
+      <p:sp>
+        <p:nvSpPr>
+          <p:cNvPr id="18" name="Rechteck 17"/>
+          <p:cNvSpPr/>
+          <p:nvPr/>
+        </p:nvSpPr>
+        <p:spPr>
+          <a:xfrm>
+            <a:off x="5767240" y="2591884"/>
+            <a:ext cx="382953" cy="828431"/>
+          </a:xfrm>
+          <a:prstGeom prst="rect">
+            <a:avLst/>
+          </a:prstGeom>
+        </p:spPr>
+        <p:style>
+          <a:lnRef idx="0">
+            <a:schemeClr val="accent2"/>
+          </a:lnRef>
+          <a:fillRef idx="3">
+            <a:schemeClr val="accent2"/>
+          </a:fillRef>
+          <a:effectRef idx="3">
+            <a:schemeClr val="accent2"/>
+          </a:effectRef>
+          <a:fontRef idx="minor">
+            <a:schemeClr val="lt1"/>
+          </a:fontRef>
+        </p:style>
+        <p:txBody>
+          <a:bodyPr vert="vert270" rtlCol="0" anchor="ctr"/>
+          <a:lstStyle/>
+          <a:p>
+            <a:pPr algn="ctr"/>
+            <a:r>
+              <a:rPr lang="en-US" sz="1000" noProof="1" smtClean="0"/>
+              <a:t>auth-server:3010</a:t>
+            </a:r>
+            <a:endParaRPr lang="en-US" sz="1000" noProof="1"/>
+          </a:p>
+        </p:txBody>
+      </p:sp>
+      <p:sp>
+        <p:nvSpPr>
+          <p:cNvPr id="20" name="Rechteck 19"/>
+          <p:cNvSpPr/>
+          <p:nvPr/>
+        </p:nvSpPr>
+        <p:spPr>
+          <a:xfrm>
+            <a:off x="4725847" y="3748566"/>
+            <a:ext cx="922215" cy="523631"/>
+          </a:xfrm>
+          <a:prstGeom prst="rect">
+            <a:avLst/>
+          </a:prstGeom>
+        </p:spPr>
+        <p:style>
+          <a:lnRef idx="0">
+            <a:schemeClr val="accent1"/>
+          </a:lnRef>
+          <a:fillRef idx="3">
+            <a:schemeClr val="accent1"/>
+          </a:fillRef>
+          <a:effectRef idx="3">
+            <a:schemeClr val="accent1"/>
+          </a:effectRef>
+          <a:fontRef idx="minor">
+            <a:schemeClr val="lt1"/>
+          </a:fontRef>
+        </p:style>
+        <p:txBody>
+          <a:bodyPr rtlCol="0" anchor="ctr"/>
+          <a:lstStyle/>
+          <a:p>
+            <a:pPr algn="ctr"/>
+            <a:r>
+              <a:rPr lang="en-US" sz="1000" noProof="1" smtClean="0"/>
+              <a:t>kong</a:t>
+            </a:r>
+            <a:endParaRPr lang="en-US" sz="1000" noProof="1"/>
+          </a:p>
+        </p:txBody>
+      </p:sp>
+      <p:sp>
+        <p:nvSpPr>
+          <p:cNvPr id="23" name="Rechteck 22"/>
+          <p:cNvSpPr/>
+          <p:nvPr/>
+        </p:nvSpPr>
+        <p:spPr>
+          <a:xfrm>
+            <a:off x="4725846" y="4655149"/>
+            <a:ext cx="922215" cy="523631"/>
+          </a:xfrm>
+          <a:prstGeom prst="rect">
+            <a:avLst/>
+          </a:prstGeom>
+        </p:spPr>
+        <p:style>
+          <a:lnRef idx="0">
+            <a:schemeClr val="accent1"/>
+          </a:lnRef>
+          <a:fillRef idx="3">
+            <a:schemeClr val="accent1"/>
+          </a:fillRef>
+          <a:effectRef idx="3">
+            <a:schemeClr val="accent1"/>
+          </a:effectRef>
+          <a:fontRef idx="minor">
+            <a:schemeClr val="lt1"/>
+          </a:fontRef>
+        </p:style>
+        <p:txBody>
+          <a:bodyPr rtlCol="0" anchor="ctr"/>
+          <a:lstStyle/>
+          <a:p>
+            <a:pPr algn="ctr"/>
+            <a:r>
+              <a:rPr lang="en-US" sz="1000" noProof="1" smtClean="0"/>
+              <a:t>kong</a:t>
+            </a:r>
+            <a:endParaRPr lang="en-US" sz="1000" noProof="1"/>
+          </a:p>
+        </p:txBody>
+      </p:sp>
+      <p:sp>
+        <p:nvSpPr>
+          <p:cNvPr id="24" name="Textfeld 23"/>
+          <p:cNvSpPr txBox="1"/>
+          <p:nvPr/>
+        </p:nvSpPr>
+        <p:spPr>
+          <a:xfrm>
+            <a:off x="4874337" y="4220391"/>
+            <a:ext cx="625231" cy="369332"/>
+          </a:xfrm>
+          <a:prstGeom prst="rect">
+            <a:avLst/>
+          </a:prstGeom>
+          <a:noFill/>
+        </p:spPr>
+        <p:txBody>
+          <a:bodyPr wrap="square" rtlCol="0" anchor="ctr">
+            <a:spAutoFit/>
+          </a:bodyPr>
+          <a:lstStyle/>
+          <a:p>
+            <a:pPr algn="ctr"/>
+            <a:r>
+              <a:rPr lang="mr-IN" noProof="1" smtClean="0">
+                <a:solidFill>
+                  <a:schemeClr val="bg1"/>
+                </a:solidFill>
+              </a:rPr>
+              <a:t>…</a:t>
+            </a:r>
+            <a:endParaRPr lang="en-US" noProof="1">
+              <a:solidFill>
+                <a:schemeClr val="bg1"/>
+              </a:solidFill>
+            </a:endParaRPr>
+          </a:p>
+        </p:txBody>
+      </p:sp>
+      <p:sp>
+        <p:nvSpPr>
+          <p:cNvPr id="25" name="Rechteck 24"/>
+          <p:cNvSpPr/>
+          <p:nvPr/>
+        </p:nvSpPr>
+        <p:spPr>
+          <a:xfrm>
+            <a:off x="6671878" y="4405052"/>
+            <a:ext cx="1047262" cy="828431"/>
+          </a:xfrm>
+          <a:prstGeom prst="rect">
+            <a:avLst/>
+          </a:prstGeom>
+        </p:spPr>
+        <p:style>
+          <a:lnRef idx="0">
+            <a:schemeClr val="accent5"/>
+          </a:lnRef>
+          <a:fillRef idx="3">
+            <a:schemeClr val="accent5"/>
+          </a:fillRef>
+          <a:effectRef idx="3">
+            <a:schemeClr val="accent5"/>
+          </a:effectRef>
+          <a:fontRef idx="minor">
+            <a:schemeClr val="lt1"/>
+          </a:fontRef>
+        </p:style>
+        <p:txBody>
+          <a:bodyPr rtlCol="0" anchor="t"/>
+          <a:lstStyle/>
+          <a:p>
+            <a:pPr algn="ctr"/>
+            <a:r>
+              <a:rPr lang="en-US" sz="1000" noProof="1" smtClean="0"/>
+              <a:t>kong-database</a:t>
+            </a:r>
+            <a:endParaRPr lang="en-US" sz="1000" noProof="1"/>
+          </a:p>
+        </p:txBody>
+      </p:sp>
+      <p:sp>
+        <p:nvSpPr>
+          <p:cNvPr id="26" name="Rechteck 25"/>
+          <p:cNvSpPr/>
+          <p:nvPr/>
+        </p:nvSpPr>
+        <p:spPr>
+          <a:xfrm>
+            <a:off x="6720720" y="4662963"/>
+            <a:ext cx="922215" cy="523631"/>
+          </a:xfrm>
+          <a:prstGeom prst="rect">
+            <a:avLst/>
+          </a:prstGeom>
+        </p:spPr>
+        <p:style>
+          <a:lnRef idx="0">
+            <a:schemeClr val="accent1"/>
+          </a:lnRef>
+          <a:fillRef idx="3">
+            <a:schemeClr val="accent1"/>
+          </a:fillRef>
+          <a:effectRef idx="3">
+            <a:schemeClr val="accent1"/>
+          </a:effectRef>
+          <a:fontRef idx="minor">
+            <a:schemeClr val="lt1"/>
+          </a:fontRef>
+        </p:style>
+        <p:txBody>
+          <a:bodyPr rtlCol="0" anchor="ctr"/>
+          <a:lstStyle/>
+          <a:p>
+            <a:pPr algn="ctr"/>
+            <a:r>
+              <a:rPr lang="en-US" sz="1000" noProof="1" smtClean="0"/>
+              <a:t>kong-database </a:t>
+            </a:r>
+            <a:r>
+              <a:rPr lang="en-US" sz="1000" noProof="1" smtClean="0"/>
+              <a:t>(postgres:9.4)</a:t>
+            </a:r>
+            <a:endParaRPr lang="en-US" sz="1000" noProof="1"/>
+          </a:p>
+        </p:txBody>
+      </p:sp>
+      <p:sp>
+        <p:nvSpPr>
+          <p:cNvPr id="28" name="Rechteck 27"/>
+          <p:cNvSpPr/>
+          <p:nvPr/>
+        </p:nvSpPr>
+        <p:spPr>
+          <a:xfrm>
+            <a:off x="6226398" y="4405052"/>
+            <a:ext cx="382953" cy="828431"/>
+          </a:xfrm>
+          <a:prstGeom prst="rect">
+            <a:avLst/>
+          </a:prstGeom>
+        </p:spPr>
+        <p:style>
+          <a:lnRef idx="0">
+            <a:schemeClr val="accent2"/>
+          </a:lnRef>
+          <a:fillRef idx="3">
+            <a:schemeClr val="accent2"/>
+          </a:fillRef>
+          <a:effectRef idx="3">
+            <a:schemeClr val="accent2"/>
+          </a:effectRef>
+          <a:fontRef idx="minor">
+            <a:schemeClr val="lt1"/>
+          </a:fontRef>
+        </p:style>
+        <p:txBody>
+          <a:bodyPr vert="vert270" rtlCol="0" anchor="ctr"/>
+          <a:lstStyle/>
+          <a:p>
+            <a:pPr algn="ctr"/>
+            <a:r>
+              <a:rPr lang="en-US" sz="900" noProof="1" smtClean="0"/>
+              <a:t>kong-database:5432</a:t>
+            </a:r>
+            <a:endParaRPr lang="en-US" sz="900" noProof="1"/>
+          </a:p>
+        </p:txBody>
+      </p:sp>
+      <p:pic>
+        <p:nvPicPr>
+          <p:cNvPr id="30" name="Bild 29"/>
+          <p:cNvPicPr>
+            <a:picLocks noChangeAspect="1"/>
+          </p:cNvPicPr>
+          <p:nvPr/>
+        </p:nvPicPr>
+        <p:blipFill>
+          <a:blip r:embed="rId2"/>
+          <a:stretch>
+            <a:fillRect/>
+          </a:stretch>
+        </p:blipFill>
+        <p:spPr>
+          <a:xfrm>
+            <a:off x="8286427" y="1917072"/>
+            <a:ext cx="515903" cy="515903"/>
+          </a:xfrm>
+          <a:prstGeom prst="rect">
+            <a:avLst/>
+          </a:prstGeom>
+        </p:spPr>
+      </p:pic>
+      <p:sp>
+        <p:nvSpPr>
+          <p:cNvPr id="33" name="Textfeld 32"/>
+          <p:cNvSpPr txBox="1"/>
+          <p:nvPr/>
+        </p:nvSpPr>
+        <p:spPr>
+          <a:xfrm>
+            <a:off x="8802330" y="1784209"/>
+            <a:ext cx="1000839" cy="553998"/>
+          </a:xfrm>
+          <a:prstGeom prst="rect">
+            <a:avLst/>
+          </a:prstGeom>
+          <a:noFill/>
+        </p:spPr>
+        <p:txBody>
+          <a:bodyPr wrap="square" rtlCol="0">
+            <a:spAutoFit/>
+          </a:bodyPr>
+          <a:lstStyle/>
+          <a:p>
+            <a:r>
+              <a:rPr lang="en-US" sz="1000" noProof="1" smtClean="0">
+                <a:solidFill>
+                  <a:schemeClr val="bg1"/>
+                </a:solidFill>
+              </a:rPr>
+              <a:t>portal-api-dynamic-data: </a:t>
+            </a:r>
+            <a:r>
+              <a:rPr lang="en-US" sz="1000" noProof="1" smtClean="0">
+                <a:solidFill>
+                  <a:schemeClr val="bg1"/>
+                </a:solidFill>
+              </a:rPr>
+              <a:t>critical data</a:t>
+            </a:r>
+            <a:endParaRPr lang="en-US" sz="1000" noProof="1">
+              <a:solidFill>
+                <a:schemeClr val="bg1"/>
+              </a:solidFill>
+            </a:endParaRPr>
+          </a:p>
+        </p:txBody>
+      </p:sp>
+      <p:sp>
+        <p:nvSpPr>
+          <p:cNvPr id="37" name="Rechteck 36"/>
+          <p:cNvSpPr/>
+          <p:nvPr/>
+        </p:nvSpPr>
+        <p:spPr>
+          <a:xfrm>
+            <a:off x="8178431" y="4405052"/>
+            <a:ext cx="1555611" cy="828431"/>
+          </a:xfrm>
+          <a:prstGeom prst="rect">
+            <a:avLst/>
+          </a:prstGeom>
+        </p:spPr>
+        <p:style>
+          <a:lnRef idx="0">
+            <a:schemeClr val="dk1"/>
+          </a:lnRef>
+          <a:fillRef idx="3">
+            <a:schemeClr val="dk1"/>
+          </a:fillRef>
+          <a:effectRef idx="3">
+            <a:schemeClr val="dk1"/>
+          </a:effectRef>
+          <a:fontRef idx="minor">
+            <a:schemeClr val="lt1"/>
+          </a:fontRef>
+        </p:style>
+        <p:txBody>
+          <a:bodyPr rtlCol="0" anchor="ctr"/>
+          <a:lstStyle/>
+          <a:p>
+            <a:pPr algn="ctr"/>
+            <a:endParaRPr lang="en-US" noProof="1">
+              <a:solidFill>
+                <a:schemeClr val="bg1"/>
+              </a:solidFill>
+            </a:endParaRPr>
+          </a:p>
+        </p:txBody>
+      </p:sp>
+      <p:pic>
+        <p:nvPicPr>
+          <p:cNvPr id="38" name="Bild 37"/>
+          <p:cNvPicPr>
+            <a:picLocks noChangeAspect="1"/>
+          </p:cNvPicPr>
+          <p:nvPr/>
+        </p:nvPicPr>
+        <p:blipFill>
+          <a:blip r:embed="rId2"/>
+          <a:stretch>
+            <a:fillRect/>
+          </a:stretch>
+        </p:blipFill>
+        <p:spPr>
+          <a:xfrm>
+            <a:off x="8282920" y="4603753"/>
+            <a:ext cx="515903" cy="515903"/>
+          </a:xfrm>
+          <a:prstGeom prst="rect">
+            <a:avLst/>
+          </a:prstGeom>
+        </p:spPr>
+      </p:pic>
+      <p:sp>
+        <p:nvSpPr>
+          <p:cNvPr id="39" name="Textfeld 38"/>
+          <p:cNvSpPr txBox="1"/>
+          <p:nvPr/>
+        </p:nvSpPr>
+        <p:spPr>
+          <a:xfrm>
+            <a:off x="8798823" y="4470890"/>
+            <a:ext cx="1000839" cy="553998"/>
+          </a:xfrm>
+          <a:prstGeom prst="rect">
+            <a:avLst/>
+          </a:prstGeom>
+          <a:noFill/>
+        </p:spPr>
+        <p:txBody>
+          <a:bodyPr wrap="square" rtlCol="0">
+            <a:spAutoFit/>
+          </a:bodyPr>
+          <a:lstStyle/>
+          <a:p>
+            <a:r>
+              <a:rPr lang="en-US" sz="1000" noProof="1" smtClean="0">
+                <a:solidFill>
+                  <a:schemeClr val="bg1"/>
+                </a:solidFill>
+              </a:rPr>
+              <a:t>kong-db-data: fast, non-critical </a:t>
+            </a:r>
+            <a:r>
+              <a:rPr lang="en-US" sz="1000" noProof="1" smtClean="0">
+                <a:solidFill>
+                  <a:schemeClr val="bg1"/>
+                </a:solidFill>
+              </a:rPr>
+              <a:t>data</a:t>
+            </a:r>
+            <a:endParaRPr lang="en-US" sz="1000" noProof="1">
+              <a:solidFill>
+                <a:schemeClr val="bg1"/>
+              </a:solidFill>
+            </a:endParaRPr>
+          </a:p>
+        </p:txBody>
+      </p:sp>
+      <p:cxnSp>
+        <p:nvCxnSpPr>
+          <p:cNvPr id="41" name="Gerade Verbindung 40"/>
+          <p:cNvCxnSpPr>
+            <a:stCxn id="26" idx="3"/>
+          </p:cNvCxnSpPr>
+          <p:nvPr/>
+        </p:nvCxnSpPr>
+        <p:spPr>
+          <a:xfrm>
+            <a:off x="7642935" y="4924779"/>
+            <a:ext cx="522000" cy="0"/>
+          </a:xfrm>
+          <a:prstGeom prst="line">
+            <a:avLst/>
+          </a:prstGeom>
+          <a:ln>
+            <a:prstDash val="dash"/>
+          </a:ln>
+        </p:spPr>
+        <p:style>
+          <a:lnRef idx="3">
+            <a:schemeClr val="dk1"/>
+          </a:lnRef>
+          <a:fillRef idx="0">
+            <a:schemeClr val="dk1"/>
+          </a:fillRef>
+          <a:effectRef idx="2">
+            <a:schemeClr val="dk1"/>
+          </a:effectRef>
+          <a:fontRef idx="minor">
+            <a:schemeClr val="tx1"/>
+          </a:fontRef>
+        </p:style>
+      </p:cxnSp>
+      <p:cxnSp>
+        <p:nvCxnSpPr>
+          <p:cNvPr id="42" name="Gerade Verbindung 41"/>
+          <p:cNvCxnSpPr/>
+          <p:nvPr/>
+        </p:nvCxnSpPr>
+        <p:spPr>
+          <a:xfrm>
+            <a:off x="7650306" y="2205394"/>
+            <a:ext cx="522213" cy="0"/>
+          </a:xfrm>
+          <a:prstGeom prst="line">
+            <a:avLst/>
+          </a:prstGeom>
+          <a:ln>
+            <a:prstDash val="dash"/>
+          </a:ln>
+        </p:spPr>
+        <p:style>
+          <a:lnRef idx="3">
+            <a:schemeClr val="dk1"/>
+          </a:lnRef>
+          <a:fillRef idx="0">
+            <a:schemeClr val="dk1"/>
+          </a:fillRef>
+          <a:effectRef idx="2">
+            <a:schemeClr val="dk1"/>
+          </a:effectRef>
+          <a:fontRef idx="minor">
+            <a:schemeClr val="tx1"/>
+          </a:fontRef>
+        </p:style>
+      </p:cxnSp>
+      <p:sp>
+        <p:nvSpPr>
+          <p:cNvPr id="46" name="Rechteck 45"/>
+          <p:cNvSpPr/>
+          <p:nvPr/>
+        </p:nvSpPr>
+        <p:spPr>
+          <a:xfrm>
+            <a:off x="4372448" y="5550627"/>
+            <a:ext cx="713265" cy="387502"/>
+          </a:xfrm>
+          <a:prstGeom prst="rect">
+            <a:avLst/>
+          </a:prstGeom>
+        </p:spPr>
+        <p:style>
+          <a:lnRef idx="0">
+            <a:schemeClr val="accent6"/>
+          </a:lnRef>
+          <a:fillRef idx="3">
+            <a:schemeClr val="accent6"/>
+          </a:fillRef>
+          <a:effectRef idx="3">
+            <a:schemeClr val="accent6"/>
+          </a:effectRef>
+          <a:fontRef idx="minor">
+            <a:schemeClr val="lt1"/>
+          </a:fontRef>
+        </p:style>
+        <p:txBody>
+          <a:bodyPr vert="horz" rtlCol="0" anchor="ctr"/>
+          <a:lstStyle/>
+          <a:p>
+            <a:pPr algn="ctr"/>
+            <a:r>
+              <a:rPr lang="en-US" sz="1000" noProof="1" smtClean="0"/>
+              <a:t>Public Service</a:t>
+            </a:r>
+            <a:endParaRPr lang="en-US" sz="1000" noProof="1"/>
+          </a:p>
+        </p:txBody>
+      </p:sp>
+      <p:sp>
+        <p:nvSpPr>
+          <p:cNvPr id="47" name="Rechteck 46"/>
+          <p:cNvSpPr/>
+          <p:nvPr/>
+        </p:nvSpPr>
+        <p:spPr>
+          <a:xfrm>
+            <a:off x="5164603" y="5549347"/>
+            <a:ext cx="713265" cy="387739"/>
+          </a:xfrm>
+          <a:prstGeom prst="rect">
+            <a:avLst/>
+          </a:prstGeom>
+        </p:spPr>
+        <p:style>
+          <a:lnRef idx="0">
+            <a:schemeClr val="accent2"/>
+          </a:lnRef>
+          <a:fillRef idx="3">
+            <a:schemeClr val="accent2"/>
+          </a:fillRef>
+          <a:effectRef idx="3">
+            <a:schemeClr val="accent2"/>
+          </a:effectRef>
+          <a:fontRef idx="minor">
+            <a:schemeClr val="lt1"/>
+          </a:fontRef>
+        </p:style>
+        <p:txBody>
+          <a:bodyPr rot="0" spcFirstLastPara="0" vertOverflow="overflow" horzOverflow="overflow" vert="horz" wrap="square" lIns="91440" tIns="45720" rIns="91440" bIns="45720" numCol="1" spcCol="0" rtlCol="0" fromWordArt="0" anchor="ctr" anchorCtr="0" forceAA="0" compatLnSpc="1">
+            <a:prstTxWarp prst="textNoShape">
+              <a:avLst/>
+            </a:prstTxWarp>
+            <a:noAutofit/>
+          </a:bodyPr>
+          <a:lstStyle/>
+          <a:p>
+            <a:pPr algn="ctr"/>
+            <a:r>
+              <a:rPr lang="en-US" sz="1000" noProof="1" smtClean="0"/>
+              <a:t>Internal Service</a:t>
+            </a:r>
+            <a:endParaRPr lang="en-US" sz="1000" noProof="1"/>
+          </a:p>
+        </p:txBody>
+      </p:sp>
+      <p:sp>
+        <p:nvSpPr>
+          <p:cNvPr id="48" name="Rechteck 47"/>
+          <p:cNvSpPr/>
+          <p:nvPr/>
+        </p:nvSpPr>
+        <p:spPr>
+          <a:xfrm>
+            <a:off x="5965745" y="5549347"/>
+            <a:ext cx="713265" cy="387739"/>
+          </a:xfrm>
+          <a:prstGeom prst="rect">
+            <a:avLst/>
+          </a:prstGeom>
+        </p:spPr>
+        <p:style>
+          <a:lnRef idx="0">
+            <a:schemeClr val="accent5"/>
+          </a:lnRef>
+          <a:fillRef idx="3">
+            <a:schemeClr val="accent5"/>
+          </a:fillRef>
+          <a:effectRef idx="3">
+            <a:schemeClr val="accent5"/>
+          </a:effectRef>
+          <a:fontRef idx="minor">
+            <a:schemeClr val="lt1"/>
+          </a:fontRef>
+        </p:style>
+        <p:txBody>
+          <a:bodyPr rot="0" spcFirstLastPara="0" vertOverflow="overflow" horzOverflow="overflow" vert="horz" wrap="square" lIns="91440" tIns="45720" rIns="91440" bIns="45720" numCol="1" spcCol="0" rtlCol="0" fromWordArt="0" anchor="ctr" anchorCtr="0" forceAA="0" compatLnSpc="1">
+            <a:prstTxWarp prst="textNoShape">
+              <a:avLst/>
+            </a:prstTxWarp>
+            <a:noAutofit/>
+          </a:bodyPr>
+          <a:lstStyle/>
+          <a:p>
+            <a:pPr algn="ctr"/>
+            <a:r>
+              <a:rPr lang="en-US" sz="1000" noProof="1" smtClean="0"/>
+              <a:t>Deploy-ment</a:t>
+            </a:r>
+            <a:endParaRPr lang="en-US" sz="1000" noProof="1"/>
+          </a:p>
+        </p:txBody>
+      </p:sp>
+      <p:sp>
+        <p:nvSpPr>
+          <p:cNvPr id="49" name="Rechteck 48"/>
+          <p:cNvSpPr/>
+          <p:nvPr/>
+        </p:nvSpPr>
+        <p:spPr>
+          <a:xfrm>
+            <a:off x="6766887" y="5549346"/>
+            <a:ext cx="713265" cy="387739"/>
+          </a:xfrm>
+          <a:prstGeom prst="rect">
+            <a:avLst/>
+          </a:prstGeom>
+        </p:spPr>
+        <p:style>
+          <a:lnRef idx="0">
+            <a:schemeClr val="accent1"/>
+          </a:lnRef>
+          <a:fillRef idx="3">
+            <a:schemeClr val="accent1"/>
+          </a:fillRef>
+          <a:effectRef idx="3">
+            <a:schemeClr val="accent1"/>
+          </a:effectRef>
+          <a:fontRef idx="minor">
+            <a:schemeClr val="lt1"/>
+          </a:fontRef>
+        </p:style>
+        <p:txBody>
+          <a:bodyPr rot="0" spcFirstLastPara="0" vertOverflow="overflow" horzOverflow="overflow" vert="horz" wrap="square" lIns="91440" tIns="45720" rIns="91440" bIns="45720" numCol="1" spcCol="0" rtlCol="0" fromWordArt="0" anchor="ctr" anchorCtr="0" forceAA="0" compatLnSpc="1">
+            <a:prstTxWarp prst="textNoShape">
+              <a:avLst/>
+            </a:prstTxWarp>
+            <a:noAutofit/>
+          </a:bodyPr>
+          <a:lstStyle/>
+          <a:p>
+            <a:pPr algn="ctr"/>
+            <a:r>
+              <a:rPr lang="en-US" sz="1000" noProof="1" smtClean="0"/>
+              <a:t>Container/Pod</a:t>
+            </a:r>
+            <a:endParaRPr lang="en-US" sz="1000" noProof="1"/>
+          </a:p>
+        </p:txBody>
+      </p:sp>
+      <p:sp>
+        <p:nvSpPr>
+          <p:cNvPr id="50" name="Rechteck 49"/>
+          <p:cNvSpPr/>
+          <p:nvPr/>
+        </p:nvSpPr>
+        <p:spPr>
+          <a:xfrm>
+            <a:off x="7559042" y="5549345"/>
+            <a:ext cx="713265" cy="387739"/>
+          </a:xfrm>
+          <a:prstGeom prst="rect">
+            <a:avLst/>
+          </a:prstGeom>
+        </p:spPr>
+        <p:style>
+          <a:lnRef idx="0">
+            <a:schemeClr val="dk1"/>
+          </a:lnRef>
+          <a:fillRef idx="3">
+            <a:schemeClr val="dk1"/>
+          </a:fillRef>
+          <a:effectRef idx="3">
+            <a:schemeClr val="dk1"/>
+          </a:effectRef>
+          <a:fontRef idx="minor">
+            <a:schemeClr val="lt1"/>
+          </a:fontRef>
+        </p:style>
+        <p:txBody>
+          <a:bodyPr rot="0" spcFirstLastPara="0" vertOverflow="overflow" horzOverflow="overflow" vert="horz" wrap="square" lIns="91440" tIns="45720" rIns="91440" bIns="45720" numCol="1" spcCol="0" rtlCol="0" fromWordArt="0" anchor="ctr" anchorCtr="0" forceAA="0" compatLnSpc="1">
+            <a:prstTxWarp prst="textNoShape">
+              <a:avLst/>
+            </a:prstTxWarp>
+            <a:noAutofit/>
+          </a:bodyPr>
+          <a:lstStyle/>
+          <a:p>
+            <a:pPr algn="ctr"/>
+            <a:r>
+              <a:rPr lang="en-US" sz="1000" noProof="1" smtClean="0"/>
+              <a:t>Persistent Volume</a:t>
+            </a:r>
+            <a:endParaRPr lang="en-US" sz="1000" noProof="1"/>
+          </a:p>
+        </p:txBody>
+      </p:sp>
+      <p:pic>
+        <p:nvPicPr>
+          <p:cNvPr id="52" name="Bild 51"/>
+          <p:cNvPicPr>
+            <a:picLocks noChangeAspect="1"/>
+          </p:cNvPicPr>
+          <p:nvPr/>
+        </p:nvPicPr>
+        <p:blipFill>
+          <a:blip r:embed="rId3"/>
+          <a:stretch>
+            <a:fillRect/>
+          </a:stretch>
+        </p:blipFill>
+        <p:spPr>
+          <a:xfrm>
+            <a:off x="4398052" y="1227484"/>
+            <a:ext cx="1734972" cy="425108"/>
+          </a:xfrm>
+          <a:prstGeom prst="rect">
+            <a:avLst/>
+          </a:prstGeom>
+        </p:spPr>
+      </p:pic>
+      <p:sp>
+        <p:nvSpPr>
+          <p:cNvPr id="56" name="Rechteck 55"/>
+          <p:cNvSpPr/>
+          <p:nvPr/>
+        </p:nvSpPr>
+        <p:spPr>
+          <a:xfrm>
+            <a:off x="3204675" y="1181746"/>
+            <a:ext cx="516316" cy="4210202"/>
+          </a:xfrm>
+          <a:prstGeom prst="rect">
+            <a:avLst/>
+          </a:prstGeom>
+        </p:spPr>
+        <p:style>
+          <a:lnRef idx="0">
+            <a:schemeClr val="accent3"/>
+          </a:lnRef>
+          <a:fillRef idx="3">
+            <a:schemeClr val="accent3"/>
+          </a:fillRef>
+          <a:effectRef idx="3">
+            <a:schemeClr val="accent3"/>
+          </a:effectRef>
+          <a:fontRef idx="minor">
+            <a:schemeClr val="lt1"/>
+          </a:fontRef>
+        </p:style>
+        <p:txBody>
+          <a:bodyPr vert="vert270" rtlCol="0" anchor="ctr"/>
+          <a:lstStyle/>
+          <a:p>
+            <a:pPr algn="ctr"/>
+            <a:r>
+              <a:rPr lang="en-US" sz="1000" noProof="1" smtClean="0"/>
+              <a:t>External Load </a:t>
+            </a:r>
+            <a:r>
+              <a:rPr lang="en-US" sz="1000" noProof="1" smtClean="0"/>
+              <a:t>Balancer</a:t>
+            </a:r>
+          </a:p>
+          <a:p>
+            <a:pPr algn="ctr"/>
+            <a:r>
+              <a:rPr lang="en-US" sz="1000" noProof="1" smtClean="0"/>
+              <a:t>(Ingress Configuration)</a:t>
+            </a:r>
+            <a:endParaRPr lang="en-US" sz="1000" noProof="1"/>
+          </a:p>
+        </p:txBody>
+      </p:sp>
+      <p:sp>
+        <p:nvSpPr>
+          <p:cNvPr id="57" name="Pfeil nach rechts 56"/>
+          <p:cNvSpPr/>
+          <p:nvPr/>
+        </p:nvSpPr>
+        <p:spPr>
+          <a:xfrm>
+            <a:off x="2980178" y="1885030"/>
+            <a:ext cx="1091489" cy="428980"/>
+          </a:xfrm>
+          <a:prstGeom prst="rightArrow">
+            <a:avLst/>
+          </a:prstGeom>
+          <a:solidFill>
+            <a:schemeClr val="accent1">
+              <a:alpha val="41000"/>
+            </a:schemeClr>
+          </a:solidFill>
+        </p:spPr>
+        <p:style>
+          <a:lnRef idx="0">
+            <a:schemeClr val="accent1"/>
+          </a:lnRef>
+          <a:fillRef idx="3">
+            <a:schemeClr val="accent1"/>
+          </a:fillRef>
+          <a:effectRef idx="3">
+            <a:schemeClr val="accent1"/>
+          </a:effectRef>
+          <a:fontRef idx="minor">
+            <a:schemeClr val="lt1"/>
+          </a:fontRef>
+        </p:style>
+        <p:txBody>
+          <a:bodyPr rtlCol="0" anchor="ctr"/>
+          <a:lstStyle/>
+          <a:p>
+            <a:pPr algn="ctr"/>
+            <a:endParaRPr lang="en-US" noProof="1"/>
+          </a:p>
+        </p:txBody>
+      </p:sp>
+      <p:sp>
+        <p:nvSpPr>
+          <p:cNvPr id="66" name="Textfeld 65"/>
+          <p:cNvSpPr txBox="1"/>
+          <p:nvPr/>
+        </p:nvSpPr>
+        <p:spPr>
+          <a:xfrm>
+            <a:off x="1533830" y="1885030"/>
+            <a:ext cx="1499128" cy="400110"/>
+          </a:xfrm>
+          <a:prstGeom prst="rect">
+            <a:avLst/>
+          </a:prstGeom>
+          <a:noFill/>
+        </p:spPr>
+        <p:txBody>
+          <a:bodyPr wrap="none" rtlCol="0">
+            <a:spAutoFit/>
+          </a:bodyPr>
+          <a:lstStyle/>
+          <a:p>
+            <a:pPr algn="r"/>
+            <a:r>
+              <a:rPr lang="en-US" sz="1000" noProof="1" smtClean="0"/>
+              <a:t>VHOST</a:t>
+            </a:r>
+          </a:p>
+          <a:p>
+            <a:r>
+              <a:rPr lang="en-US" sz="1000" noProof="1" smtClean="0"/>
+              <a:t>portal.yourcompany.com</a:t>
+            </a:r>
+            <a:endParaRPr lang="en-US" sz="1000" noProof="1"/>
+          </a:p>
+        </p:txBody>
+      </p:sp>
+      <p:sp>
+        <p:nvSpPr>
+          <p:cNvPr id="67" name="Textfeld 66"/>
+          <p:cNvSpPr txBox="1"/>
+          <p:nvPr/>
+        </p:nvSpPr>
+        <p:spPr>
+          <a:xfrm>
+            <a:off x="1687718" y="4318466"/>
+            <a:ext cx="1345240" cy="400110"/>
+          </a:xfrm>
+          <a:prstGeom prst="rect">
+            <a:avLst/>
+          </a:prstGeom>
+          <a:noFill/>
+        </p:spPr>
+        <p:txBody>
+          <a:bodyPr wrap="none" rtlCol="0">
+            <a:spAutoFit/>
+          </a:bodyPr>
+          <a:lstStyle/>
+          <a:p>
+            <a:pPr algn="r"/>
+            <a:r>
+              <a:rPr lang="en-US" sz="1000" noProof="1" smtClean="0"/>
+              <a:t>VHOST</a:t>
+            </a:r>
+          </a:p>
+          <a:p>
+            <a:r>
+              <a:rPr lang="en-US" sz="1000" noProof="1" smtClean="0"/>
+              <a:t>api.yourcompany.com</a:t>
+            </a:r>
+            <a:endParaRPr lang="en-US" sz="1000" noProof="1"/>
+          </a:p>
+        </p:txBody>
+      </p:sp>
+      <p:sp>
+        <p:nvSpPr>
+          <p:cNvPr id="70" name="Rechteck 69"/>
+          <p:cNvSpPr/>
+          <p:nvPr/>
+        </p:nvSpPr>
+        <p:spPr>
+          <a:xfrm>
+            <a:off x="8185153" y="3498464"/>
+            <a:ext cx="1552107" cy="805670"/>
+          </a:xfrm>
+          <a:prstGeom prst="rect">
+            <a:avLst/>
+          </a:prstGeom>
+        </p:spPr>
+        <p:style>
+          <a:lnRef idx="0">
+            <a:schemeClr val="accent3"/>
+          </a:lnRef>
+          <a:fillRef idx="3">
+            <a:schemeClr val="accent3"/>
+          </a:fillRef>
+          <a:effectRef idx="3">
+            <a:schemeClr val="accent3"/>
+          </a:effectRef>
+          <a:fontRef idx="minor">
+            <a:schemeClr val="lt1"/>
+          </a:fontRef>
+        </p:style>
+        <p:txBody>
+          <a:bodyPr vert="horz" rtlCol="0" anchor="ctr"/>
+          <a:lstStyle/>
+          <a:p>
+            <a:pPr algn="ctr"/>
+            <a:r>
+              <a:rPr lang="en-US" sz="1000" noProof="1" smtClean="0"/>
+              <a:t>Backend APIs (may be in k8s as well)</a:t>
+            </a:r>
+            <a:endParaRPr lang="en-US" sz="1000" noProof="1"/>
+          </a:p>
+        </p:txBody>
+      </p:sp>
+      <p:sp>
+        <p:nvSpPr>
+          <p:cNvPr id="71" name="Pfeil nach rechts 70"/>
+          <p:cNvSpPr/>
+          <p:nvPr/>
+        </p:nvSpPr>
+        <p:spPr>
+          <a:xfrm>
+            <a:off x="2979152" y="4318466"/>
+            <a:ext cx="1091489" cy="428980"/>
+          </a:xfrm>
+          <a:prstGeom prst="rightArrow">
+            <a:avLst/>
+          </a:prstGeom>
+          <a:solidFill>
+            <a:schemeClr val="accent1">
+              <a:alpha val="41000"/>
+            </a:schemeClr>
+          </a:solidFill>
+        </p:spPr>
+        <p:style>
+          <a:lnRef idx="0">
+            <a:schemeClr val="accent1"/>
+          </a:lnRef>
+          <a:fillRef idx="3">
+            <a:schemeClr val="accent1"/>
+          </a:fillRef>
+          <a:effectRef idx="3">
+            <a:schemeClr val="accent1"/>
+          </a:effectRef>
+          <a:fontRef idx="minor">
+            <a:schemeClr val="lt1"/>
+          </a:fontRef>
+        </p:style>
+        <p:txBody>
+          <a:bodyPr rtlCol="0" anchor="ctr"/>
+          <a:lstStyle/>
+          <a:p>
+            <a:pPr algn="ctr"/>
+            <a:endParaRPr lang="en-US" noProof="1"/>
+          </a:p>
+        </p:txBody>
+      </p:sp>
+      <p:sp>
+        <p:nvSpPr>
+          <p:cNvPr id="21" name="Rechteck 20"/>
+          <p:cNvSpPr/>
+          <p:nvPr/>
+        </p:nvSpPr>
+        <p:spPr>
+          <a:xfrm>
+            <a:off x="5773109" y="3498469"/>
+            <a:ext cx="382953" cy="1735014"/>
+          </a:xfrm>
+          <a:prstGeom prst="rect">
+            <a:avLst/>
+          </a:prstGeom>
+        </p:spPr>
+        <p:style>
+          <a:lnRef idx="0">
+            <a:schemeClr val="accent2"/>
+          </a:lnRef>
+          <a:fillRef idx="3">
+            <a:schemeClr val="accent2"/>
+          </a:fillRef>
+          <a:effectRef idx="3">
+            <a:schemeClr val="accent2"/>
+          </a:effectRef>
+          <a:fontRef idx="minor">
+            <a:schemeClr val="lt1"/>
+          </a:fontRef>
+        </p:style>
+        <p:txBody>
+          <a:bodyPr vert="vert270" rtlCol="0" anchor="ctr"/>
+          <a:lstStyle/>
+          <a:p>
+            <a:pPr algn="ctr"/>
+            <a:r>
+              <a:rPr lang="en-US" sz="1000" noProof="1" smtClean="0"/>
+              <a:t>kong:8001</a:t>
+            </a:r>
+            <a:endParaRPr lang="en-US" sz="1000" noProof="1"/>
+          </a:p>
+        </p:txBody>
+      </p:sp>
+      <p:sp>
+        <p:nvSpPr>
+          <p:cNvPr id="29" name="Rechteck 28"/>
+          <p:cNvSpPr/>
+          <p:nvPr/>
+        </p:nvSpPr>
+        <p:spPr>
+          <a:xfrm>
+            <a:off x="4654281" y="2587873"/>
+            <a:ext cx="1500555" cy="828435"/>
+          </a:xfrm>
+          <a:prstGeom prst="rect">
+            <a:avLst/>
+          </a:prstGeom>
+          <a:solidFill>
+            <a:schemeClr val="bg1">
+              <a:alpha val="38000"/>
+            </a:schemeClr>
+          </a:solidFill>
+          <a:ln>
+            <a:noFill/>
+          </a:ln>
+        </p:spPr>
+        <p:style>
+          <a:lnRef idx="2">
+            <a:schemeClr val="accent1">
+              <a:shade val="50000"/>
+            </a:schemeClr>
+          </a:lnRef>
+          <a:fillRef idx="1">
+            <a:schemeClr val="accent1"/>
+          </a:fillRef>
+          <a:effectRef idx="0">
+            <a:schemeClr val="accent1"/>
+          </a:effectRef>
+          <a:fontRef idx="minor">
+            <a:schemeClr val="lt1"/>
+          </a:fontRef>
+        </p:style>
+        <p:txBody>
+          <a:bodyPr rtlCol="0" anchor="ctr"/>
+          <a:lstStyle/>
+          <a:p>
+            <a:pPr algn="ctr"/>
+            <a:endParaRPr lang="en-US" noProof="1"/>
+          </a:p>
+        </p:txBody>
+      </p:sp>
+      <p:sp>
+        <p:nvSpPr>
+          <p:cNvPr id="78" name="Rechteck 77"/>
+          <p:cNvSpPr/>
+          <p:nvPr/>
+        </p:nvSpPr>
+        <p:spPr>
+          <a:xfrm>
+            <a:off x="8190545" y="2592888"/>
+            <a:ext cx="1552107" cy="805670"/>
+          </a:xfrm>
+          <a:prstGeom prst="rect">
+            <a:avLst/>
+          </a:prstGeom>
+        </p:spPr>
+        <p:style>
+          <a:lnRef idx="0">
+            <a:schemeClr val="accent3"/>
+          </a:lnRef>
+          <a:fillRef idx="3">
+            <a:schemeClr val="accent3"/>
+          </a:fillRef>
+          <a:effectRef idx="3">
+            <a:schemeClr val="accent3"/>
+          </a:effectRef>
+          <a:fontRef idx="minor">
+            <a:schemeClr val="lt1"/>
+          </a:fontRef>
+        </p:style>
+        <p:txBody>
+          <a:bodyPr vert="horz" rtlCol="0" anchor="ctr"/>
+          <a:lstStyle/>
+          <a:p>
+            <a:pPr algn="ctr"/>
+            <a:r>
+              <a:rPr lang="en-US" sz="1000" noProof="1" smtClean="0"/>
+              <a:t>Identity Provider</a:t>
+            </a:r>
+            <a:endParaRPr lang="en-US" sz="1000" noProof="1"/>
+          </a:p>
+        </p:txBody>
+      </p:sp>
+    </p:spTree>
+    <p:extLst>
+      <p:ext uri="{BB962C8B-B14F-4D97-AF65-F5344CB8AC3E}">
+        <p14:creationId xmlns:p14="http://schemas.microsoft.com/office/powerpoint/2010/main" val="1625177160"/>
+      </p:ext>
+    </p:extLst>
+  </p:cSld>
+  <p:clrMapOvr>
+    <a:masterClrMapping/>
+  </p:clrMapOvr>
+  <p:timing>
+    <p:tnLst>
+      <p:par>
+        <p:cTn id="1" dur="indefinite" restart="never" nodeType="tmRoot"/>
+      </p:par>
+    </p:tnLst>
+  </p:timing>
+</p:sld>
+</file>
+
 <file path=ppt/slides/slide3.xml><?xml version="1.0" encoding="utf-8"?>
 <p:sld xmlns:a="http://schemas.openxmlformats.org/drawingml/2006/main" xmlns:r="http://schemas.openxmlformats.org/officeDocument/2006/relationships" xmlns:p="http://schemas.openxmlformats.org/presentationml/2006/main">
   <p:cSld>

</xml_diff>

<commit_message>
Added illustrations for use cases.
</commit_message>
<xml_diff>
--- a/doc/architecture-illustrations.pptx
+++ b/doc/architecture-illustrations.pptx
@@ -27,6 +27,7 @@
     <p:sldId id="277" r:id="rId21"/>
     <p:sldId id="278" r:id="rId22"/>
     <p:sldId id="280" r:id="rId23"/>
+    <p:sldId id="281" r:id="rId24"/>
   </p:sldIdLst>
   <p:sldSz cx="12192000" cy="6858000"/>
   <p:notesSz cx="6858000" cy="9144000"/>
@@ -264,7 +265,7 @@
           <a:p>
             <a:fld id="{C1D20212-1D84-1140-85B9-B9CA8444BDC5}" type="datetimeFigureOut">
               <a:rPr lang="en-US" smtClean="0"/>
-              <a:t>1/12/17</a:t>
+              <a:t>2/21/17</a:t>
             </a:fld>
             <a:endParaRPr lang="en-US" dirty="0"/>
           </a:p>
@@ -434,7 +435,7 @@
           <a:p>
             <a:fld id="{C1D20212-1D84-1140-85B9-B9CA8444BDC5}" type="datetimeFigureOut">
               <a:rPr lang="en-US" smtClean="0"/>
-              <a:t>1/12/17</a:t>
+              <a:t>2/21/17</a:t>
             </a:fld>
             <a:endParaRPr lang="en-US" dirty="0"/>
           </a:p>
@@ -614,7 +615,7 @@
           <a:p>
             <a:fld id="{C1D20212-1D84-1140-85B9-B9CA8444BDC5}" type="datetimeFigureOut">
               <a:rPr lang="en-US" smtClean="0"/>
-              <a:t>1/12/17</a:t>
+              <a:t>2/21/17</a:t>
             </a:fld>
             <a:endParaRPr lang="en-US" dirty="0"/>
           </a:p>
@@ -784,7 +785,7 @@
           <a:p>
             <a:fld id="{C1D20212-1D84-1140-85B9-B9CA8444BDC5}" type="datetimeFigureOut">
               <a:rPr lang="en-US" smtClean="0"/>
-              <a:t>1/12/17</a:t>
+              <a:t>2/21/17</a:t>
             </a:fld>
             <a:endParaRPr lang="en-US" dirty="0"/>
           </a:p>
@@ -1030,7 +1031,7 @@
           <a:p>
             <a:fld id="{C1D20212-1D84-1140-85B9-B9CA8444BDC5}" type="datetimeFigureOut">
               <a:rPr lang="en-US" smtClean="0"/>
-              <a:t>1/12/17</a:t>
+              <a:t>2/21/17</a:t>
             </a:fld>
             <a:endParaRPr lang="en-US" dirty="0"/>
           </a:p>
@@ -1262,7 +1263,7 @@
           <a:p>
             <a:fld id="{C1D20212-1D84-1140-85B9-B9CA8444BDC5}" type="datetimeFigureOut">
               <a:rPr lang="en-US" smtClean="0"/>
-              <a:t>1/12/17</a:t>
+              <a:t>2/21/17</a:t>
             </a:fld>
             <a:endParaRPr lang="en-US" dirty="0"/>
           </a:p>
@@ -1629,7 +1630,7 @@
           <a:p>
             <a:fld id="{C1D20212-1D84-1140-85B9-B9CA8444BDC5}" type="datetimeFigureOut">
               <a:rPr lang="en-US" smtClean="0"/>
-              <a:t>1/12/17</a:t>
+              <a:t>2/21/17</a:t>
             </a:fld>
             <a:endParaRPr lang="en-US" dirty="0"/>
           </a:p>
@@ -1747,7 +1748,7 @@
           <a:p>
             <a:fld id="{C1D20212-1D84-1140-85B9-B9CA8444BDC5}" type="datetimeFigureOut">
               <a:rPr lang="en-US" smtClean="0"/>
-              <a:t>1/12/17</a:t>
+              <a:t>2/21/17</a:t>
             </a:fld>
             <a:endParaRPr lang="en-US" dirty="0"/>
           </a:p>
@@ -1842,7 +1843,7 @@
           <a:p>
             <a:fld id="{C1D20212-1D84-1140-85B9-B9CA8444BDC5}" type="datetimeFigureOut">
               <a:rPr lang="en-US" smtClean="0"/>
-              <a:t>1/12/17</a:t>
+              <a:t>2/21/17</a:t>
             </a:fld>
             <a:endParaRPr lang="en-US" dirty="0"/>
           </a:p>
@@ -2119,7 +2120,7 @@
           <a:p>
             <a:fld id="{C1D20212-1D84-1140-85B9-B9CA8444BDC5}" type="datetimeFigureOut">
               <a:rPr lang="en-US" smtClean="0"/>
-              <a:t>1/12/17</a:t>
+              <a:t>2/21/17</a:t>
             </a:fld>
             <a:endParaRPr lang="en-US" dirty="0"/>
           </a:p>
@@ -2372,7 +2373,7 @@
           <a:p>
             <a:fld id="{C1D20212-1D84-1140-85B9-B9CA8444BDC5}" type="datetimeFigureOut">
               <a:rPr lang="en-US" smtClean="0"/>
-              <a:t>1/12/17</a:t>
+              <a:t>2/21/17</a:t>
             </a:fld>
             <a:endParaRPr lang="en-US" dirty="0"/>
           </a:p>
@@ -2585,7 +2586,7 @@
           <a:p>
             <a:fld id="{C1D20212-1D84-1140-85B9-B9CA8444BDC5}" type="datetimeFigureOut">
               <a:rPr lang="en-US" smtClean="0"/>
-              <a:t>1/12/17</a:t>
+              <a:t>2/21/17</a:t>
             </a:fld>
             <a:endParaRPr lang="en-US" dirty="0"/>
           </a:p>
@@ -16824,7 +16825,6 @@
               <a:rPr lang="en-US" sz="1000" noProof="1" smtClean="0"/>
               <a:t>kong-gw:8000</a:t>
             </a:r>
-            <a:endParaRPr lang="en-US" sz="1000" noProof="1" smtClean="0"/>
           </a:p>
         </p:txBody>
       </p:sp>
@@ -17201,11 +17201,7 @@
             <a:pPr algn="ctr"/>
             <a:r>
               <a:rPr lang="en-US" sz="1000" noProof="1" smtClean="0"/>
-              <a:t>portal-</a:t>
-            </a:r>
-            <a:r>
-              <a:rPr lang="en-US" sz="1000" noProof="1" smtClean="0"/>
-              <a:t>kong-adapter</a:t>
+              <a:t>portal-kong-adapter</a:t>
             </a:r>
             <a:endParaRPr lang="en-US" sz="1000" noProof="1"/>
           </a:p>
@@ -17375,7 +17371,6 @@
               <a:rPr lang="en-US" sz="1000" noProof="1" smtClean="0"/>
               <a:t>portal:3000</a:t>
             </a:r>
-            <a:endParaRPr lang="en-US" sz="1000" noProof="1" smtClean="0"/>
           </a:p>
         </p:txBody>
       </p:sp>
@@ -17748,11 +17743,7 @@
             <a:pPr algn="ctr"/>
             <a:r>
               <a:rPr lang="en-US" sz="1000" noProof="1" smtClean="0"/>
-              <a:t>kong-database </a:t>
-            </a:r>
-            <a:r>
-              <a:rPr lang="en-US" sz="1000" noProof="1" smtClean="0"/>
-              <a:t>(postgres:9.4)</a:t>
+              <a:t>kong-database (postgres:9.4)</a:t>
             </a:r>
             <a:endParaRPr lang="en-US" sz="1000" noProof="1"/>
           </a:p>
@@ -17852,15 +17843,7 @@
                   <a:schemeClr val="bg1"/>
                 </a:solidFill>
               </a:rPr>
-              <a:t>portal-api-dynamic-data: </a:t>
-            </a:r>
-            <a:r>
-              <a:rPr lang="en-US" sz="1000" noProof="1" smtClean="0">
-                <a:solidFill>
-                  <a:schemeClr val="bg1"/>
-                </a:solidFill>
-              </a:rPr>
-              <a:t>critical data</a:t>
+              <a:t>portal-api-dynamic-data: critical data</a:t>
             </a:r>
             <a:endParaRPr lang="en-US" sz="1000" noProof="1">
               <a:solidFill>
@@ -17964,15 +17947,7 @@
                   <a:schemeClr val="bg1"/>
                 </a:solidFill>
               </a:rPr>
-              <a:t>kong-db-data: fast, non-critical </a:t>
-            </a:r>
-            <a:r>
-              <a:rPr lang="en-US" sz="1000" noProof="1" smtClean="0">
-                <a:solidFill>
-                  <a:schemeClr val="bg1"/>
-                </a:solidFill>
-              </a:rPr>
-              <a:t>data</a:t>
+              <a:t>kong-db-data: fast, non-critical data</a:t>
             </a:r>
             <a:endParaRPr lang="en-US" sz="1000" noProof="1">
               <a:solidFill>
@@ -18340,11 +18315,7 @@
             <a:pPr algn="ctr"/>
             <a:r>
               <a:rPr lang="en-US" sz="1000" noProof="1" smtClean="0"/>
-              <a:t>External Load </a:t>
-            </a:r>
-            <a:r>
-              <a:rPr lang="en-US" sz="1000" noProof="1" smtClean="0"/>
-              <a:t>Balancer</a:t>
+              <a:t>External Load Balancer</a:t>
             </a:r>
           </a:p>
           <a:p>
@@ -18708,6 +18679,1759 @@
       </p:par>
     </p:tnLst>
   </p:timing>
+</p:sld>
+</file>
+
+<file path=ppt/slides/slide23.xml><?xml version="1.0" encoding="utf-8"?>
+<p:sld xmlns:a="http://schemas.openxmlformats.org/drawingml/2006/main" xmlns:r="http://schemas.openxmlformats.org/officeDocument/2006/relationships" xmlns:p="http://schemas.openxmlformats.org/presentationml/2006/main">
+  <p:cSld>
+    <p:spTree>
+      <p:nvGrpSpPr>
+        <p:cNvPr id="1" name=""/>
+        <p:cNvGrpSpPr/>
+        <p:nvPr/>
+      </p:nvGrpSpPr>
+      <p:grpSpPr>
+        <a:xfrm>
+          <a:off x="0" y="0"/>
+          <a:ext cx="0" cy="0"/>
+          <a:chOff x="0" y="0"/>
+          <a:chExt cx="0" cy="0"/>
+        </a:xfrm>
+      </p:grpSpPr>
+      <p:sp>
+        <p:nvSpPr>
+          <p:cNvPr id="2" name="Abgerundetes Rechteck 1"/>
+          <p:cNvSpPr/>
+          <p:nvPr/>
+        </p:nvSpPr>
+        <p:spPr>
+          <a:xfrm>
+            <a:off x="2211219" y="746186"/>
+            <a:ext cx="399837" cy="1727325"/>
+          </a:xfrm>
+          <a:prstGeom prst="roundRect">
+            <a:avLst>
+              <a:gd name="adj" fmla="val 13388"/>
+            </a:avLst>
+          </a:prstGeom>
+          <a:ln w="19050"/>
+        </p:spPr>
+        <p:style>
+          <a:lnRef idx="2">
+            <a:schemeClr val="accent3"/>
+          </a:lnRef>
+          <a:fillRef idx="1">
+            <a:schemeClr val="lt1"/>
+          </a:fillRef>
+          <a:effectRef idx="0">
+            <a:schemeClr val="accent3"/>
+          </a:effectRef>
+          <a:fontRef idx="minor">
+            <a:schemeClr val="dk1"/>
+          </a:fontRef>
+        </p:style>
+        <p:txBody>
+          <a:bodyPr vert="vert270" rtlCol="0" anchor="ctr"/>
+          <a:lstStyle/>
+          <a:p>
+            <a:pPr algn="ctr"/>
+            <a:r>
+              <a:rPr lang="en-US" sz="1400" smtClean="0">
+                <a:solidFill>
+                  <a:schemeClr val="tx1">
+                    <a:lumMod val="50000"/>
+                    <a:lumOff val="50000"/>
+                  </a:schemeClr>
+                </a:solidFill>
+              </a:rPr>
+              <a:t>API GATEWAY</a:t>
+            </a:r>
+            <a:endParaRPr lang="en-US" sz="1400" dirty="0">
+              <a:solidFill>
+                <a:schemeClr val="tx1">
+                  <a:lumMod val="50000"/>
+                  <a:lumOff val="50000"/>
+                </a:schemeClr>
+              </a:solidFill>
+            </a:endParaRPr>
+          </a:p>
+        </p:txBody>
+      </p:sp>
+      <p:sp>
+        <p:nvSpPr>
+          <p:cNvPr id="3" name="Abgerundetes Rechteck 2"/>
+          <p:cNvSpPr/>
+          <p:nvPr/>
+        </p:nvSpPr>
+        <p:spPr>
+          <a:xfrm>
+            <a:off x="908721" y="1259982"/>
+            <a:ext cx="930477" cy="699731"/>
+          </a:xfrm>
+          <a:prstGeom prst="roundRect">
+            <a:avLst>
+              <a:gd name="adj" fmla="val 5119"/>
+            </a:avLst>
+          </a:prstGeom>
+          <a:ln w="19050"/>
+        </p:spPr>
+        <p:style>
+          <a:lnRef idx="2">
+            <a:schemeClr val="accent3"/>
+          </a:lnRef>
+          <a:fillRef idx="1">
+            <a:schemeClr val="lt1"/>
+          </a:fillRef>
+          <a:effectRef idx="0">
+            <a:schemeClr val="accent3"/>
+          </a:effectRef>
+          <a:fontRef idx="minor">
+            <a:schemeClr val="dk1"/>
+          </a:fontRef>
+        </p:style>
+        <p:txBody>
+          <a:bodyPr vert="horz" rtlCol="0" anchor="ctr"/>
+          <a:lstStyle/>
+          <a:p>
+            <a:pPr algn="ctr"/>
+            <a:r>
+              <a:rPr lang="en-US" sz="1400" dirty="0" smtClean="0">
+                <a:solidFill>
+                  <a:schemeClr val="tx1">
+                    <a:lumMod val="50000"/>
+                    <a:lumOff val="50000"/>
+                  </a:schemeClr>
+                </a:solidFill>
+              </a:rPr>
+              <a:t>SERVER APPLICA-TION</a:t>
+            </a:r>
+            <a:endParaRPr lang="en-US" sz="1400" dirty="0">
+              <a:solidFill>
+                <a:schemeClr val="tx1">
+                  <a:lumMod val="50000"/>
+                  <a:lumOff val="50000"/>
+                </a:schemeClr>
+              </a:solidFill>
+            </a:endParaRPr>
+          </a:p>
+        </p:txBody>
+      </p:sp>
+      <p:sp>
+        <p:nvSpPr>
+          <p:cNvPr id="4" name="Abgerundetes Rechteck 3"/>
+          <p:cNvSpPr/>
+          <p:nvPr/>
+        </p:nvSpPr>
+        <p:spPr>
+          <a:xfrm>
+            <a:off x="2983078" y="1259982"/>
+            <a:ext cx="930477" cy="699731"/>
+          </a:xfrm>
+          <a:prstGeom prst="roundRect">
+            <a:avLst>
+              <a:gd name="adj" fmla="val 5119"/>
+            </a:avLst>
+          </a:prstGeom>
+          <a:ln w="19050"/>
+        </p:spPr>
+        <p:style>
+          <a:lnRef idx="2">
+            <a:schemeClr val="accent3"/>
+          </a:lnRef>
+          <a:fillRef idx="1">
+            <a:schemeClr val="lt1"/>
+          </a:fillRef>
+          <a:effectRef idx="0">
+            <a:schemeClr val="accent3"/>
+          </a:effectRef>
+          <a:fontRef idx="minor">
+            <a:schemeClr val="dk1"/>
+          </a:fontRef>
+        </p:style>
+        <p:txBody>
+          <a:bodyPr vert="horz" rtlCol="0" anchor="ctr"/>
+          <a:lstStyle/>
+          <a:p>
+            <a:pPr algn="ctr"/>
+            <a:r>
+              <a:rPr lang="en-US" sz="1400" dirty="0" smtClean="0">
+                <a:solidFill>
+                  <a:schemeClr val="tx1">
+                    <a:lumMod val="50000"/>
+                    <a:lumOff val="50000"/>
+                  </a:schemeClr>
+                </a:solidFill>
+              </a:rPr>
+              <a:t>API BACKEND</a:t>
+            </a:r>
+            <a:endParaRPr lang="en-US" sz="1400" dirty="0">
+              <a:solidFill>
+                <a:schemeClr val="tx1">
+                  <a:lumMod val="50000"/>
+                  <a:lumOff val="50000"/>
+                </a:schemeClr>
+              </a:solidFill>
+            </a:endParaRPr>
+          </a:p>
+        </p:txBody>
+      </p:sp>
+      <p:cxnSp>
+        <p:nvCxnSpPr>
+          <p:cNvPr id="5" name="Gerade Verbindung mit Pfeil 4"/>
+          <p:cNvCxnSpPr>
+            <a:stCxn id="3" idx="3"/>
+            <a:endCxn id="4" idx="1"/>
+          </p:cNvCxnSpPr>
+          <p:nvPr/>
+        </p:nvCxnSpPr>
+        <p:spPr>
+          <a:xfrm>
+            <a:off x="1839198" y="1609848"/>
+            <a:ext cx="1143880" cy="0"/>
+          </a:xfrm>
+          <a:prstGeom prst="straightConnector1">
+            <a:avLst/>
+          </a:prstGeom>
+          <a:ln w="76200">
+            <a:solidFill>
+              <a:schemeClr val="accent1">
+                <a:alpha val="41000"/>
+              </a:schemeClr>
+            </a:solidFill>
+            <a:tailEnd type="triangle"/>
+          </a:ln>
+        </p:spPr>
+        <p:style>
+          <a:lnRef idx="1">
+            <a:schemeClr val="accent1"/>
+          </a:lnRef>
+          <a:fillRef idx="0">
+            <a:schemeClr val="accent1"/>
+          </a:fillRef>
+          <a:effectRef idx="0">
+            <a:schemeClr val="accent1"/>
+          </a:effectRef>
+          <a:fontRef idx="minor">
+            <a:schemeClr val="tx1"/>
+          </a:fontRef>
+        </p:style>
+      </p:cxnSp>
+      <p:sp>
+        <p:nvSpPr>
+          <p:cNvPr id="8" name="Abgerundetes Rechteck 7"/>
+          <p:cNvSpPr/>
+          <p:nvPr/>
+        </p:nvSpPr>
+        <p:spPr>
+          <a:xfrm>
+            <a:off x="3606935" y="4215945"/>
+            <a:ext cx="399837" cy="1727325"/>
+          </a:xfrm>
+          <a:prstGeom prst="roundRect">
+            <a:avLst>
+              <a:gd name="adj" fmla="val 13388"/>
+            </a:avLst>
+          </a:prstGeom>
+          <a:ln w="19050"/>
+        </p:spPr>
+        <p:style>
+          <a:lnRef idx="2">
+            <a:schemeClr val="accent3"/>
+          </a:lnRef>
+          <a:fillRef idx="1">
+            <a:schemeClr val="lt1"/>
+          </a:fillRef>
+          <a:effectRef idx="0">
+            <a:schemeClr val="accent3"/>
+          </a:effectRef>
+          <a:fontRef idx="minor">
+            <a:schemeClr val="dk1"/>
+          </a:fontRef>
+        </p:style>
+        <p:txBody>
+          <a:bodyPr vert="vert270" rtlCol="0" anchor="ctr"/>
+          <a:lstStyle/>
+          <a:p>
+            <a:pPr algn="ctr"/>
+            <a:r>
+              <a:rPr lang="en-US" sz="1400" smtClean="0">
+                <a:solidFill>
+                  <a:schemeClr val="tx1">
+                    <a:lumMod val="50000"/>
+                    <a:lumOff val="50000"/>
+                  </a:schemeClr>
+                </a:solidFill>
+              </a:rPr>
+              <a:t>API GATEWAY</a:t>
+            </a:r>
+            <a:endParaRPr lang="en-US" sz="1400" dirty="0">
+              <a:solidFill>
+                <a:schemeClr val="tx1">
+                  <a:lumMod val="50000"/>
+                  <a:lumOff val="50000"/>
+                </a:schemeClr>
+              </a:solidFill>
+            </a:endParaRPr>
+          </a:p>
+        </p:txBody>
+      </p:sp>
+      <p:sp>
+        <p:nvSpPr>
+          <p:cNvPr id="9" name="Abgerundetes Rechteck 8"/>
+          <p:cNvSpPr/>
+          <p:nvPr/>
+        </p:nvSpPr>
+        <p:spPr>
+          <a:xfrm>
+            <a:off x="2304437" y="4729741"/>
+            <a:ext cx="930477" cy="699731"/>
+          </a:xfrm>
+          <a:prstGeom prst="roundRect">
+            <a:avLst>
+              <a:gd name="adj" fmla="val 5119"/>
+            </a:avLst>
+          </a:prstGeom>
+          <a:ln w="19050"/>
+        </p:spPr>
+        <p:style>
+          <a:lnRef idx="2">
+            <a:schemeClr val="accent3"/>
+          </a:lnRef>
+          <a:fillRef idx="1">
+            <a:schemeClr val="lt1"/>
+          </a:fillRef>
+          <a:effectRef idx="0">
+            <a:schemeClr val="accent3"/>
+          </a:effectRef>
+          <a:fontRef idx="minor">
+            <a:schemeClr val="dk1"/>
+          </a:fontRef>
+        </p:style>
+        <p:txBody>
+          <a:bodyPr vert="horz" rtlCol="0" anchor="ctr"/>
+          <a:lstStyle/>
+          <a:p>
+            <a:pPr algn="ctr"/>
+            <a:r>
+              <a:rPr lang="en-US" sz="1400" dirty="0" smtClean="0">
+                <a:solidFill>
+                  <a:schemeClr val="tx1">
+                    <a:lumMod val="50000"/>
+                    <a:lumOff val="50000"/>
+                  </a:schemeClr>
+                </a:solidFill>
+              </a:rPr>
+              <a:t>SERVER APPLICA-TION</a:t>
+            </a:r>
+            <a:endParaRPr lang="en-US" sz="1400" dirty="0">
+              <a:solidFill>
+                <a:schemeClr val="tx1">
+                  <a:lumMod val="50000"/>
+                  <a:lumOff val="50000"/>
+                </a:schemeClr>
+              </a:solidFill>
+            </a:endParaRPr>
+          </a:p>
+        </p:txBody>
+      </p:sp>
+      <p:sp>
+        <p:nvSpPr>
+          <p:cNvPr id="10" name="Abgerundetes Rechteck 9"/>
+          <p:cNvSpPr/>
+          <p:nvPr/>
+        </p:nvSpPr>
+        <p:spPr>
+          <a:xfrm>
+            <a:off x="4293734" y="4215945"/>
+            <a:ext cx="930477" cy="699731"/>
+          </a:xfrm>
+          <a:prstGeom prst="roundRect">
+            <a:avLst>
+              <a:gd name="adj" fmla="val 5119"/>
+            </a:avLst>
+          </a:prstGeom>
+          <a:ln w="19050"/>
+        </p:spPr>
+        <p:style>
+          <a:lnRef idx="2">
+            <a:schemeClr val="accent3"/>
+          </a:lnRef>
+          <a:fillRef idx="1">
+            <a:schemeClr val="lt1"/>
+          </a:fillRef>
+          <a:effectRef idx="0">
+            <a:schemeClr val="accent3"/>
+          </a:effectRef>
+          <a:fontRef idx="minor">
+            <a:schemeClr val="dk1"/>
+          </a:fontRef>
+        </p:style>
+        <p:txBody>
+          <a:bodyPr vert="horz" rtlCol="0" anchor="ctr"/>
+          <a:lstStyle/>
+          <a:p>
+            <a:pPr algn="ctr"/>
+            <a:r>
+              <a:rPr lang="en-US" sz="1400" dirty="0" smtClean="0">
+                <a:solidFill>
+                  <a:schemeClr val="tx1">
+                    <a:lumMod val="50000"/>
+                    <a:lumOff val="50000"/>
+                  </a:schemeClr>
+                </a:solidFill>
+              </a:rPr>
+              <a:t>API BACKEND</a:t>
+            </a:r>
+            <a:endParaRPr lang="en-US" sz="1400" dirty="0">
+              <a:solidFill>
+                <a:schemeClr val="tx1">
+                  <a:lumMod val="50000"/>
+                  <a:lumOff val="50000"/>
+                </a:schemeClr>
+              </a:solidFill>
+            </a:endParaRPr>
+          </a:p>
+        </p:txBody>
+      </p:sp>
+      <p:sp>
+        <p:nvSpPr>
+          <p:cNvPr id="12" name="Abgerundetes Rechteck 11"/>
+          <p:cNvSpPr/>
+          <p:nvPr/>
+        </p:nvSpPr>
+        <p:spPr>
+          <a:xfrm>
+            <a:off x="4293733" y="5243539"/>
+            <a:ext cx="930477" cy="699731"/>
+          </a:xfrm>
+          <a:prstGeom prst="roundRect">
+            <a:avLst>
+              <a:gd name="adj" fmla="val 5119"/>
+            </a:avLst>
+          </a:prstGeom>
+          <a:ln w="19050"/>
+        </p:spPr>
+        <p:style>
+          <a:lnRef idx="2">
+            <a:schemeClr val="accent3"/>
+          </a:lnRef>
+          <a:fillRef idx="1">
+            <a:schemeClr val="lt1"/>
+          </a:fillRef>
+          <a:effectRef idx="0">
+            <a:schemeClr val="accent3"/>
+          </a:effectRef>
+          <a:fontRef idx="minor">
+            <a:schemeClr val="dk1"/>
+          </a:fontRef>
+        </p:style>
+        <p:txBody>
+          <a:bodyPr vert="horz" rtlCol="0" anchor="ctr"/>
+          <a:lstStyle/>
+          <a:p>
+            <a:pPr algn="ctr"/>
+            <a:r>
+              <a:rPr lang="en-US" sz="1400" dirty="0" smtClean="0">
+                <a:solidFill>
+                  <a:schemeClr val="tx1">
+                    <a:lumMod val="50000"/>
+                    <a:lumOff val="50000"/>
+                  </a:schemeClr>
+                </a:solidFill>
+              </a:rPr>
+              <a:t>AUTHZ</a:t>
+            </a:r>
+          </a:p>
+          <a:p>
+            <a:pPr algn="ctr"/>
+            <a:r>
+              <a:rPr lang="en-US" sz="1400" dirty="0" smtClean="0">
+                <a:solidFill>
+                  <a:schemeClr val="tx1">
+                    <a:lumMod val="50000"/>
+                    <a:lumOff val="50000"/>
+                  </a:schemeClr>
+                </a:solidFill>
+              </a:rPr>
+              <a:t>SERVER</a:t>
+            </a:r>
+            <a:endParaRPr lang="en-US" sz="1400" dirty="0">
+              <a:solidFill>
+                <a:schemeClr val="tx1">
+                  <a:lumMod val="50000"/>
+                  <a:lumOff val="50000"/>
+                </a:schemeClr>
+              </a:solidFill>
+            </a:endParaRPr>
+          </a:p>
+        </p:txBody>
+      </p:sp>
+      <p:sp>
+        <p:nvSpPr>
+          <p:cNvPr id="17" name="Abgerundetes Rechteck 16"/>
+          <p:cNvSpPr/>
+          <p:nvPr/>
+        </p:nvSpPr>
+        <p:spPr>
+          <a:xfrm>
+            <a:off x="7796856" y="746186"/>
+            <a:ext cx="399837" cy="1727325"/>
+          </a:xfrm>
+          <a:prstGeom prst="roundRect">
+            <a:avLst>
+              <a:gd name="adj" fmla="val 13388"/>
+            </a:avLst>
+          </a:prstGeom>
+          <a:ln w="19050"/>
+        </p:spPr>
+        <p:style>
+          <a:lnRef idx="2">
+            <a:schemeClr val="accent3"/>
+          </a:lnRef>
+          <a:fillRef idx="1">
+            <a:schemeClr val="lt1"/>
+          </a:fillRef>
+          <a:effectRef idx="0">
+            <a:schemeClr val="accent3"/>
+          </a:effectRef>
+          <a:fontRef idx="minor">
+            <a:schemeClr val="dk1"/>
+          </a:fontRef>
+        </p:style>
+        <p:txBody>
+          <a:bodyPr vert="vert270" rtlCol="0" anchor="ctr"/>
+          <a:lstStyle/>
+          <a:p>
+            <a:pPr algn="ctr"/>
+            <a:r>
+              <a:rPr lang="en-US" sz="1400" smtClean="0">
+                <a:solidFill>
+                  <a:schemeClr val="tx1">
+                    <a:lumMod val="50000"/>
+                    <a:lumOff val="50000"/>
+                  </a:schemeClr>
+                </a:solidFill>
+              </a:rPr>
+              <a:t>API GATEWAY</a:t>
+            </a:r>
+            <a:endParaRPr lang="en-US" sz="1400" dirty="0">
+              <a:solidFill>
+                <a:schemeClr val="tx1">
+                  <a:lumMod val="50000"/>
+                  <a:lumOff val="50000"/>
+                </a:schemeClr>
+              </a:solidFill>
+            </a:endParaRPr>
+          </a:p>
+        </p:txBody>
+      </p:sp>
+      <p:sp>
+        <p:nvSpPr>
+          <p:cNvPr id="18" name="Abgerundetes Rechteck 17"/>
+          <p:cNvSpPr/>
+          <p:nvPr/>
+        </p:nvSpPr>
+        <p:spPr>
+          <a:xfrm>
+            <a:off x="6494358" y="1259982"/>
+            <a:ext cx="930477" cy="699731"/>
+          </a:xfrm>
+          <a:prstGeom prst="roundRect">
+            <a:avLst>
+              <a:gd name="adj" fmla="val 5119"/>
+            </a:avLst>
+          </a:prstGeom>
+          <a:ln w="19050">
+            <a:solidFill>
+              <a:schemeClr val="accent1"/>
+            </a:solidFill>
+          </a:ln>
+        </p:spPr>
+        <p:style>
+          <a:lnRef idx="2">
+            <a:schemeClr val="accent3"/>
+          </a:lnRef>
+          <a:fillRef idx="1">
+            <a:schemeClr val="lt1"/>
+          </a:fillRef>
+          <a:effectRef idx="0">
+            <a:schemeClr val="accent3"/>
+          </a:effectRef>
+          <a:fontRef idx="minor">
+            <a:schemeClr val="dk1"/>
+          </a:fontRef>
+        </p:style>
+        <p:txBody>
+          <a:bodyPr vert="horz" rtlCol="0" anchor="ctr"/>
+          <a:lstStyle/>
+          <a:p>
+            <a:pPr algn="ctr"/>
+            <a:r>
+              <a:rPr lang="en-US" sz="1400" dirty="0" smtClean="0">
+                <a:solidFill>
+                  <a:schemeClr val="tx1">
+                    <a:lumMod val="50000"/>
+                    <a:lumOff val="50000"/>
+                  </a:schemeClr>
+                </a:solidFill>
+              </a:rPr>
+              <a:t>USER AGENT (SPA)</a:t>
+            </a:r>
+            <a:endParaRPr lang="en-US" sz="1400" dirty="0">
+              <a:solidFill>
+                <a:schemeClr val="tx1">
+                  <a:lumMod val="50000"/>
+                  <a:lumOff val="50000"/>
+                </a:schemeClr>
+              </a:solidFill>
+            </a:endParaRPr>
+          </a:p>
+        </p:txBody>
+      </p:sp>
+      <p:sp>
+        <p:nvSpPr>
+          <p:cNvPr id="19" name="Abgerundetes Rechteck 18"/>
+          <p:cNvSpPr/>
+          <p:nvPr/>
+        </p:nvSpPr>
+        <p:spPr>
+          <a:xfrm>
+            <a:off x="8483655" y="746186"/>
+            <a:ext cx="930477" cy="699731"/>
+          </a:xfrm>
+          <a:prstGeom prst="roundRect">
+            <a:avLst>
+              <a:gd name="adj" fmla="val 5119"/>
+            </a:avLst>
+          </a:prstGeom>
+          <a:ln w="19050"/>
+        </p:spPr>
+        <p:style>
+          <a:lnRef idx="2">
+            <a:schemeClr val="accent3"/>
+          </a:lnRef>
+          <a:fillRef idx="1">
+            <a:schemeClr val="lt1"/>
+          </a:fillRef>
+          <a:effectRef idx="0">
+            <a:schemeClr val="accent3"/>
+          </a:effectRef>
+          <a:fontRef idx="minor">
+            <a:schemeClr val="dk1"/>
+          </a:fontRef>
+        </p:style>
+        <p:txBody>
+          <a:bodyPr vert="horz" rtlCol="0" anchor="ctr"/>
+          <a:lstStyle/>
+          <a:p>
+            <a:pPr algn="ctr"/>
+            <a:r>
+              <a:rPr lang="en-US" sz="1400" dirty="0" smtClean="0">
+                <a:solidFill>
+                  <a:schemeClr val="tx1">
+                    <a:lumMod val="50000"/>
+                    <a:lumOff val="50000"/>
+                  </a:schemeClr>
+                </a:solidFill>
+              </a:rPr>
+              <a:t>API BACKEND</a:t>
+            </a:r>
+            <a:endParaRPr lang="en-US" sz="1400" dirty="0">
+              <a:solidFill>
+                <a:schemeClr val="tx1">
+                  <a:lumMod val="50000"/>
+                  <a:lumOff val="50000"/>
+                </a:schemeClr>
+              </a:solidFill>
+            </a:endParaRPr>
+          </a:p>
+        </p:txBody>
+      </p:sp>
+      <p:sp>
+        <p:nvSpPr>
+          <p:cNvPr id="21" name="Abgerundetes Rechteck 20"/>
+          <p:cNvSpPr/>
+          <p:nvPr/>
+        </p:nvSpPr>
+        <p:spPr>
+          <a:xfrm>
+            <a:off x="8483654" y="1773780"/>
+            <a:ext cx="930477" cy="699731"/>
+          </a:xfrm>
+          <a:prstGeom prst="roundRect">
+            <a:avLst>
+              <a:gd name="adj" fmla="val 5119"/>
+            </a:avLst>
+          </a:prstGeom>
+          <a:ln w="19050"/>
+        </p:spPr>
+        <p:style>
+          <a:lnRef idx="2">
+            <a:schemeClr val="accent3"/>
+          </a:lnRef>
+          <a:fillRef idx="1">
+            <a:schemeClr val="lt1"/>
+          </a:fillRef>
+          <a:effectRef idx="0">
+            <a:schemeClr val="accent3"/>
+          </a:effectRef>
+          <a:fontRef idx="minor">
+            <a:schemeClr val="dk1"/>
+          </a:fontRef>
+        </p:style>
+        <p:txBody>
+          <a:bodyPr vert="horz" rtlCol="0" anchor="ctr"/>
+          <a:lstStyle/>
+          <a:p>
+            <a:pPr algn="ctr"/>
+            <a:r>
+              <a:rPr lang="en-US" sz="1400" dirty="0" smtClean="0">
+                <a:solidFill>
+                  <a:schemeClr val="tx1">
+                    <a:lumMod val="50000"/>
+                    <a:lumOff val="50000"/>
+                  </a:schemeClr>
+                </a:solidFill>
+              </a:rPr>
+              <a:t>AUTHZ</a:t>
+            </a:r>
+          </a:p>
+          <a:p>
+            <a:pPr algn="ctr"/>
+            <a:r>
+              <a:rPr lang="en-US" sz="1400" dirty="0" smtClean="0">
+                <a:solidFill>
+                  <a:schemeClr val="tx1">
+                    <a:lumMod val="50000"/>
+                    <a:lumOff val="50000"/>
+                  </a:schemeClr>
+                </a:solidFill>
+              </a:rPr>
+              <a:t>SERVER</a:t>
+            </a:r>
+            <a:endParaRPr lang="en-US" sz="1400" dirty="0">
+              <a:solidFill>
+                <a:schemeClr val="tx1">
+                  <a:lumMod val="50000"/>
+                  <a:lumOff val="50000"/>
+                </a:schemeClr>
+              </a:solidFill>
+            </a:endParaRPr>
+          </a:p>
+        </p:txBody>
+      </p:sp>
+      <p:sp>
+        <p:nvSpPr>
+          <p:cNvPr id="23" name="Abgerundetes Rechteck 22"/>
+          <p:cNvSpPr/>
+          <p:nvPr/>
+        </p:nvSpPr>
+        <p:spPr>
+          <a:xfrm>
+            <a:off x="908721" y="4729741"/>
+            <a:ext cx="930477" cy="699731"/>
+          </a:xfrm>
+          <a:prstGeom prst="roundRect">
+            <a:avLst>
+              <a:gd name="adj" fmla="val 5119"/>
+            </a:avLst>
+          </a:prstGeom>
+          <a:ln w="19050">
+            <a:solidFill>
+              <a:schemeClr val="accent1"/>
+            </a:solidFill>
+          </a:ln>
+        </p:spPr>
+        <p:style>
+          <a:lnRef idx="2">
+            <a:schemeClr val="accent3"/>
+          </a:lnRef>
+          <a:fillRef idx="1">
+            <a:schemeClr val="lt1"/>
+          </a:fillRef>
+          <a:effectRef idx="0">
+            <a:schemeClr val="accent3"/>
+          </a:effectRef>
+          <a:fontRef idx="minor">
+            <a:schemeClr val="dk1"/>
+          </a:fontRef>
+        </p:style>
+        <p:txBody>
+          <a:bodyPr vert="horz" rtlCol="0" anchor="ctr"/>
+          <a:lstStyle/>
+          <a:p>
+            <a:pPr algn="ctr"/>
+            <a:r>
+              <a:rPr lang="en-US" sz="1400" dirty="0">
+                <a:solidFill>
+                  <a:schemeClr val="tx1">
+                    <a:lumMod val="50000"/>
+                    <a:lumOff val="50000"/>
+                  </a:schemeClr>
+                </a:solidFill>
+              </a:rPr>
+              <a:t>USER AGENT (SPA)</a:t>
+            </a:r>
+            <a:endParaRPr lang="en-US" sz="1400" dirty="0">
+              <a:solidFill>
+                <a:schemeClr val="tx1">
+                  <a:lumMod val="50000"/>
+                  <a:lumOff val="50000"/>
+                </a:schemeClr>
+              </a:solidFill>
+            </a:endParaRPr>
+          </a:p>
+        </p:txBody>
+      </p:sp>
+      <p:cxnSp>
+        <p:nvCxnSpPr>
+          <p:cNvPr id="24" name="Gerade Verbindung mit Pfeil 23"/>
+          <p:cNvCxnSpPr>
+            <a:stCxn id="23" idx="3"/>
+            <a:endCxn id="9" idx="1"/>
+          </p:cNvCxnSpPr>
+          <p:nvPr/>
+        </p:nvCxnSpPr>
+        <p:spPr>
+          <a:xfrm>
+            <a:off x="1839198" y="5079607"/>
+            <a:ext cx="465239" cy="0"/>
+          </a:xfrm>
+          <a:prstGeom prst="straightConnector1">
+            <a:avLst/>
+          </a:prstGeom>
+          <a:ln w="76200">
+            <a:solidFill>
+              <a:schemeClr val="accent1">
+                <a:alpha val="41000"/>
+              </a:schemeClr>
+            </a:solidFill>
+            <a:tailEnd type="triangle"/>
+          </a:ln>
+        </p:spPr>
+        <p:style>
+          <a:lnRef idx="1">
+            <a:schemeClr val="accent1"/>
+          </a:lnRef>
+          <a:fillRef idx="0">
+            <a:schemeClr val="accent1"/>
+          </a:fillRef>
+          <a:effectRef idx="0">
+            <a:schemeClr val="accent1"/>
+          </a:effectRef>
+          <a:fontRef idx="minor">
+            <a:schemeClr val="tx1"/>
+          </a:fontRef>
+        </p:style>
+      </p:cxnSp>
+      <p:sp>
+        <p:nvSpPr>
+          <p:cNvPr id="27" name="Abgerundetes Rechteck 26"/>
+          <p:cNvSpPr/>
+          <p:nvPr/>
+        </p:nvSpPr>
+        <p:spPr>
+          <a:xfrm>
+            <a:off x="7796856" y="2713179"/>
+            <a:ext cx="930477" cy="699731"/>
+          </a:xfrm>
+          <a:prstGeom prst="roundRect">
+            <a:avLst>
+              <a:gd name="adj" fmla="val 5119"/>
+            </a:avLst>
+          </a:prstGeom>
+          <a:ln w="19050"/>
+        </p:spPr>
+        <p:style>
+          <a:lnRef idx="2">
+            <a:schemeClr val="accent3"/>
+          </a:lnRef>
+          <a:fillRef idx="1">
+            <a:schemeClr val="lt1"/>
+          </a:fillRef>
+          <a:effectRef idx="0">
+            <a:schemeClr val="accent3"/>
+          </a:effectRef>
+          <a:fontRef idx="minor">
+            <a:schemeClr val="dk1"/>
+          </a:fontRef>
+        </p:style>
+        <p:txBody>
+          <a:bodyPr vert="horz" rtlCol="0" anchor="ctr"/>
+          <a:lstStyle/>
+          <a:p>
+            <a:pPr algn="ctr"/>
+            <a:r>
+              <a:rPr lang="en-US" sz="1400" dirty="0" smtClean="0">
+                <a:solidFill>
+                  <a:schemeClr val="tx1">
+                    <a:lumMod val="50000"/>
+                    <a:lumOff val="50000"/>
+                  </a:schemeClr>
+                </a:solidFill>
+              </a:rPr>
+              <a:t>APP WEB SERVER (STATIC)</a:t>
+            </a:r>
+            <a:endParaRPr lang="en-US" sz="1400" dirty="0">
+              <a:solidFill>
+                <a:schemeClr val="tx1">
+                  <a:lumMod val="50000"/>
+                  <a:lumOff val="50000"/>
+                </a:schemeClr>
+              </a:solidFill>
+            </a:endParaRPr>
+          </a:p>
+        </p:txBody>
+      </p:sp>
+      <p:cxnSp>
+        <p:nvCxnSpPr>
+          <p:cNvPr id="28" name="Gerade Verbindung mit Pfeil 27"/>
+          <p:cNvCxnSpPr>
+            <a:stCxn id="18" idx="2"/>
+            <a:endCxn id="27" idx="1"/>
+          </p:cNvCxnSpPr>
+          <p:nvPr/>
+        </p:nvCxnSpPr>
+        <p:spPr>
+          <a:xfrm>
+            <a:off x="6959597" y="1959713"/>
+            <a:ext cx="837259" cy="1103332"/>
+          </a:xfrm>
+          <a:prstGeom prst="straightConnector1">
+            <a:avLst/>
+          </a:prstGeom>
+          <a:ln w="76200">
+            <a:solidFill>
+              <a:schemeClr val="accent1">
+                <a:alpha val="41000"/>
+              </a:schemeClr>
+            </a:solidFill>
+            <a:tailEnd type="triangle"/>
+          </a:ln>
+        </p:spPr>
+        <p:style>
+          <a:lnRef idx="1">
+            <a:schemeClr val="accent1"/>
+          </a:lnRef>
+          <a:fillRef idx="0">
+            <a:schemeClr val="accent1"/>
+          </a:fillRef>
+          <a:effectRef idx="0">
+            <a:schemeClr val="accent1"/>
+          </a:effectRef>
+          <a:fontRef idx="minor">
+            <a:schemeClr val="tx1"/>
+          </a:fontRef>
+        </p:style>
+      </p:cxnSp>
+      <p:sp>
+        <p:nvSpPr>
+          <p:cNvPr id="33" name="Abgerundetes Rechteck 32"/>
+          <p:cNvSpPr/>
+          <p:nvPr/>
+        </p:nvSpPr>
+        <p:spPr>
+          <a:xfrm>
+            <a:off x="8395824" y="4220277"/>
+            <a:ext cx="399837" cy="1727325"/>
+          </a:xfrm>
+          <a:prstGeom prst="roundRect">
+            <a:avLst>
+              <a:gd name="adj" fmla="val 13388"/>
+            </a:avLst>
+          </a:prstGeom>
+          <a:ln w="19050"/>
+        </p:spPr>
+        <p:style>
+          <a:lnRef idx="2">
+            <a:schemeClr val="accent3"/>
+          </a:lnRef>
+          <a:fillRef idx="1">
+            <a:schemeClr val="lt1"/>
+          </a:fillRef>
+          <a:effectRef idx="0">
+            <a:schemeClr val="accent3"/>
+          </a:effectRef>
+          <a:fontRef idx="minor">
+            <a:schemeClr val="dk1"/>
+          </a:fontRef>
+        </p:style>
+        <p:txBody>
+          <a:bodyPr vert="vert270" rtlCol="0" anchor="ctr"/>
+          <a:lstStyle/>
+          <a:p>
+            <a:pPr algn="ctr"/>
+            <a:r>
+              <a:rPr lang="en-US" sz="1400" smtClean="0">
+                <a:solidFill>
+                  <a:schemeClr val="tx1">
+                    <a:lumMod val="50000"/>
+                    <a:lumOff val="50000"/>
+                  </a:schemeClr>
+                </a:solidFill>
+              </a:rPr>
+              <a:t>API GATEWAY</a:t>
+            </a:r>
+            <a:endParaRPr lang="en-US" sz="1400" dirty="0">
+              <a:solidFill>
+                <a:schemeClr val="tx1">
+                  <a:lumMod val="50000"/>
+                  <a:lumOff val="50000"/>
+                </a:schemeClr>
+              </a:solidFill>
+            </a:endParaRPr>
+          </a:p>
+        </p:txBody>
+      </p:sp>
+      <p:sp>
+        <p:nvSpPr>
+          <p:cNvPr id="34" name="Abgerundetes Rechteck 33"/>
+          <p:cNvSpPr/>
+          <p:nvPr/>
+        </p:nvSpPr>
+        <p:spPr>
+          <a:xfrm>
+            <a:off x="7093326" y="4734073"/>
+            <a:ext cx="930477" cy="699731"/>
+          </a:xfrm>
+          <a:prstGeom prst="roundRect">
+            <a:avLst>
+              <a:gd name="adj" fmla="val 5119"/>
+            </a:avLst>
+          </a:prstGeom>
+          <a:ln w="19050">
+            <a:solidFill>
+              <a:schemeClr val="accent1"/>
+            </a:solidFill>
+          </a:ln>
+        </p:spPr>
+        <p:style>
+          <a:lnRef idx="2">
+            <a:schemeClr val="accent3"/>
+          </a:lnRef>
+          <a:fillRef idx="1">
+            <a:schemeClr val="lt1"/>
+          </a:fillRef>
+          <a:effectRef idx="0">
+            <a:schemeClr val="accent3"/>
+          </a:effectRef>
+          <a:fontRef idx="minor">
+            <a:schemeClr val="dk1"/>
+          </a:fontRef>
+        </p:style>
+        <p:txBody>
+          <a:bodyPr vert="horz" rtlCol="0" anchor="ctr"/>
+          <a:lstStyle/>
+          <a:p>
+            <a:pPr algn="ctr"/>
+            <a:r>
+              <a:rPr lang="en-US" sz="1400" dirty="0" smtClean="0">
+                <a:solidFill>
+                  <a:schemeClr val="tx1">
+                    <a:lumMod val="50000"/>
+                    <a:lumOff val="50000"/>
+                  </a:schemeClr>
+                </a:solidFill>
+              </a:rPr>
+              <a:t>MOBILE APP</a:t>
+            </a:r>
+            <a:endParaRPr lang="en-US" sz="1400" dirty="0">
+              <a:solidFill>
+                <a:schemeClr val="tx1">
+                  <a:lumMod val="50000"/>
+                  <a:lumOff val="50000"/>
+                </a:schemeClr>
+              </a:solidFill>
+            </a:endParaRPr>
+          </a:p>
+        </p:txBody>
+      </p:sp>
+      <p:sp>
+        <p:nvSpPr>
+          <p:cNvPr id="35" name="Abgerundetes Rechteck 34"/>
+          <p:cNvSpPr/>
+          <p:nvPr/>
+        </p:nvSpPr>
+        <p:spPr>
+          <a:xfrm>
+            <a:off x="9082623" y="4220277"/>
+            <a:ext cx="930477" cy="699731"/>
+          </a:xfrm>
+          <a:prstGeom prst="roundRect">
+            <a:avLst>
+              <a:gd name="adj" fmla="val 5119"/>
+            </a:avLst>
+          </a:prstGeom>
+          <a:ln w="19050"/>
+        </p:spPr>
+        <p:style>
+          <a:lnRef idx="2">
+            <a:schemeClr val="accent3"/>
+          </a:lnRef>
+          <a:fillRef idx="1">
+            <a:schemeClr val="lt1"/>
+          </a:fillRef>
+          <a:effectRef idx="0">
+            <a:schemeClr val="accent3"/>
+          </a:effectRef>
+          <a:fontRef idx="minor">
+            <a:schemeClr val="dk1"/>
+          </a:fontRef>
+        </p:style>
+        <p:txBody>
+          <a:bodyPr vert="horz" rtlCol="0" anchor="ctr"/>
+          <a:lstStyle/>
+          <a:p>
+            <a:pPr algn="ctr"/>
+            <a:r>
+              <a:rPr lang="en-US" sz="1400" dirty="0" smtClean="0">
+                <a:solidFill>
+                  <a:schemeClr val="tx1">
+                    <a:lumMod val="50000"/>
+                    <a:lumOff val="50000"/>
+                  </a:schemeClr>
+                </a:solidFill>
+              </a:rPr>
+              <a:t>API BACKEND</a:t>
+            </a:r>
+            <a:endParaRPr lang="en-US" sz="1400" dirty="0">
+              <a:solidFill>
+                <a:schemeClr val="tx1">
+                  <a:lumMod val="50000"/>
+                  <a:lumOff val="50000"/>
+                </a:schemeClr>
+              </a:solidFill>
+            </a:endParaRPr>
+          </a:p>
+        </p:txBody>
+      </p:sp>
+      <p:sp>
+        <p:nvSpPr>
+          <p:cNvPr id="37" name="Abgerundetes Rechteck 36"/>
+          <p:cNvSpPr/>
+          <p:nvPr/>
+        </p:nvSpPr>
+        <p:spPr>
+          <a:xfrm>
+            <a:off x="9082622" y="5247871"/>
+            <a:ext cx="930477" cy="699731"/>
+          </a:xfrm>
+          <a:prstGeom prst="roundRect">
+            <a:avLst>
+              <a:gd name="adj" fmla="val 5119"/>
+            </a:avLst>
+          </a:prstGeom>
+          <a:ln w="19050"/>
+        </p:spPr>
+        <p:style>
+          <a:lnRef idx="2">
+            <a:schemeClr val="accent3"/>
+          </a:lnRef>
+          <a:fillRef idx="1">
+            <a:schemeClr val="lt1"/>
+          </a:fillRef>
+          <a:effectRef idx="0">
+            <a:schemeClr val="accent3"/>
+          </a:effectRef>
+          <a:fontRef idx="minor">
+            <a:schemeClr val="dk1"/>
+          </a:fontRef>
+        </p:style>
+        <p:txBody>
+          <a:bodyPr vert="horz" rtlCol="0" anchor="ctr"/>
+          <a:lstStyle/>
+          <a:p>
+            <a:pPr algn="ctr"/>
+            <a:r>
+              <a:rPr lang="en-US" sz="1400" dirty="0" smtClean="0">
+                <a:solidFill>
+                  <a:schemeClr val="tx1">
+                    <a:lumMod val="50000"/>
+                    <a:lumOff val="50000"/>
+                  </a:schemeClr>
+                </a:solidFill>
+              </a:rPr>
+              <a:t>AUTHZ</a:t>
+            </a:r>
+          </a:p>
+          <a:p>
+            <a:pPr algn="ctr"/>
+            <a:r>
+              <a:rPr lang="en-US" sz="1400" dirty="0" smtClean="0">
+                <a:solidFill>
+                  <a:schemeClr val="tx1">
+                    <a:lumMod val="50000"/>
+                    <a:lumOff val="50000"/>
+                  </a:schemeClr>
+                </a:solidFill>
+              </a:rPr>
+              <a:t>SERVER</a:t>
+            </a:r>
+            <a:endParaRPr lang="en-US" sz="1400" dirty="0">
+              <a:solidFill>
+                <a:schemeClr val="tx1">
+                  <a:lumMod val="50000"/>
+                  <a:lumOff val="50000"/>
+                </a:schemeClr>
+              </a:solidFill>
+            </a:endParaRPr>
+          </a:p>
+        </p:txBody>
+      </p:sp>
+      <p:sp>
+        <p:nvSpPr>
+          <p:cNvPr id="39" name="Abgerundetes Rechteck 38"/>
+          <p:cNvSpPr/>
+          <p:nvPr/>
+        </p:nvSpPr>
+        <p:spPr>
+          <a:xfrm>
+            <a:off x="5507519" y="5243539"/>
+            <a:ext cx="930477" cy="699731"/>
+          </a:xfrm>
+          <a:prstGeom prst="roundRect">
+            <a:avLst>
+              <a:gd name="adj" fmla="val 5119"/>
+            </a:avLst>
+          </a:prstGeom>
+          <a:ln w="19050">
+            <a:solidFill>
+              <a:schemeClr val="accent4"/>
+            </a:solidFill>
+          </a:ln>
+        </p:spPr>
+        <p:style>
+          <a:lnRef idx="2">
+            <a:schemeClr val="accent3"/>
+          </a:lnRef>
+          <a:fillRef idx="1">
+            <a:schemeClr val="lt1"/>
+          </a:fillRef>
+          <a:effectRef idx="0">
+            <a:schemeClr val="accent3"/>
+          </a:effectRef>
+          <a:fontRef idx="minor">
+            <a:schemeClr val="dk1"/>
+          </a:fontRef>
+        </p:style>
+        <p:txBody>
+          <a:bodyPr vert="horz" rtlCol="0" anchor="ctr"/>
+          <a:lstStyle/>
+          <a:p>
+            <a:pPr algn="ctr"/>
+            <a:r>
+              <a:rPr lang="en-US" sz="1400" dirty="0" smtClean="0">
+                <a:solidFill>
+                  <a:schemeClr val="tx1">
+                    <a:lumMod val="50000"/>
+                    <a:lumOff val="50000"/>
+                  </a:schemeClr>
+                </a:solidFill>
+              </a:rPr>
+              <a:t>IDP</a:t>
+            </a:r>
+            <a:endParaRPr lang="en-US" sz="1400" dirty="0">
+              <a:solidFill>
+                <a:schemeClr val="tx1">
+                  <a:lumMod val="50000"/>
+                  <a:lumOff val="50000"/>
+                </a:schemeClr>
+              </a:solidFill>
+            </a:endParaRPr>
+          </a:p>
+        </p:txBody>
+      </p:sp>
+      <p:cxnSp>
+        <p:nvCxnSpPr>
+          <p:cNvPr id="40" name="Gerade Verbindung mit Pfeil 39"/>
+          <p:cNvCxnSpPr>
+            <a:stCxn id="12" idx="3"/>
+            <a:endCxn id="39" idx="1"/>
+          </p:cNvCxnSpPr>
+          <p:nvPr/>
+        </p:nvCxnSpPr>
+        <p:spPr>
+          <a:xfrm>
+            <a:off x="5224210" y="5593405"/>
+            <a:ext cx="283309" cy="0"/>
+          </a:xfrm>
+          <a:prstGeom prst="straightConnector1">
+            <a:avLst/>
+          </a:prstGeom>
+          <a:ln w="76200">
+            <a:solidFill>
+              <a:schemeClr val="accent1">
+                <a:alpha val="41000"/>
+              </a:schemeClr>
+            </a:solidFill>
+            <a:tailEnd type="triangle"/>
+          </a:ln>
+        </p:spPr>
+        <p:style>
+          <a:lnRef idx="1">
+            <a:schemeClr val="accent1"/>
+          </a:lnRef>
+          <a:fillRef idx="0">
+            <a:schemeClr val="accent1"/>
+          </a:fillRef>
+          <a:effectRef idx="0">
+            <a:schemeClr val="accent1"/>
+          </a:effectRef>
+          <a:fontRef idx="minor">
+            <a:schemeClr val="tx1"/>
+          </a:fontRef>
+        </p:style>
+      </p:cxnSp>
+      <p:sp>
+        <p:nvSpPr>
+          <p:cNvPr id="43" name="Abgerundetes Rechteck 42"/>
+          <p:cNvSpPr/>
+          <p:nvPr/>
+        </p:nvSpPr>
+        <p:spPr>
+          <a:xfrm>
+            <a:off x="10300060" y="5243539"/>
+            <a:ext cx="930477" cy="699731"/>
+          </a:xfrm>
+          <a:prstGeom prst="roundRect">
+            <a:avLst>
+              <a:gd name="adj" fmla="val 5119"/>
+            </a:avLst>
+          </a:prstGeom>
+          <a:ln w="19050">
+            <a:solidFill>
+              <a:schemeClr val="accent4"/>
+            </a:solidFill>
+          </a:ln>
+        </p:spPr>
+        <p:style>
+          <a:lnRef idx="2">
+            <a:schemeClr val="accent3"/>
+          </a:lnRef>
+          <a:fillRef idx="1">
+            <a:schemeClr val="lt1"/>
+          </a:fillRef>
+          <a:effectRef idx="0">
+            <a:schemeClr val="accent3"/>
+          </a:effectRef>
+          <a:fontRef idx="minor">
+            <a:schemeClr val="dk1"/>
+          </a:fontRef>
+        </p:style>
+        <p:txBody>
+          <a:bodyPr vert="horz" rtlCol="0" anchor="ctr"/>
+          <a:lstStyle/>
+          <a:p>
+            <a:pPr algn="ctr"/>
+            <a:r>
+              <a:rPr lang="en-US" sz="1400" dirty="0" smtClean="0">
+                <a:solidFill>
+                  <a:schemeClr val="tx1">
+                    <a:lumMod val="50000"/>
+                    <a:lumOff val="50000"/>
+                  </a:schemeClr>
+                </a:solidFill>
+              </a:rPr>
+              <a:t>IDP</a:t>
+            </a:r>
+            <a:endParaRPr lang="en-US" sz="1400" dirty="0">
+              <a:solidFill>
+                <a:schemeClr val="tx1">
+                  <a:lumMod val="50000"/>
+                  <a:lumOff val="50000"/>
+                </a:schemeClr>
+              </a:solidFill>
+            </a:endParaRPr>
+          </a:p>
+        </p:txBody>
+      </p:sp>
+      <p:cxnSp>
+        <p:nvCxnSpPr>
+          <p:cNvPr id="44" name="Gerade Verbindung mit Pfeil 43"/>
+          <p:cNvCxnSpPr>
+            <a:stCxn id="37" idx="3"/>
+            <a:endCxn id="43" idx="1"/>
+          </p:cNvCxnSpPr>
+          <p:nvPr/>
+        </p:nvCxnSpPr>
+        <p:spPr>
+          <a:xfrm flipV="1">
+            <a:off x="10013099" y="5593405"/>
+            <a:ext cx="286961" cy="4332"/>
+          </a:xfrm>
+          <a:prstGeom prst="straightConnector1">
+            <a:avLst/>
+          </a:prstGeom>
+          <a:ln w="76200">
+            <a:solidFill>
+              <a:schemeClr val="accent1">
+                <a:alpha val="41000"/>
+              </a:schemeClr>
+            </a:solidFill>
+            <a:tailEnd type="triangle"/>
+          </a:ln>
+        </p:spPr>
+        <p:style>
+          <a:lnRef idx="1">
+            <a:schemeClr val="accent1"/>
+          </a:lnRef>
+          <a:fillRef idx="0">
+            <a:schemeClr val="accent1"/>
+          </a:fillRef>
+          <a:effectRef idx="0">
+            <a:schemeClr val="accent1"/>
+          </a:effectRef>
+          <a:fontRef idx="minor">
+            <a:schemeClr val="tx1"/>
+          </a:fontRef>
+        </p:style>
+      </p:cxnSp>
+      <p:sp>
+        <p:nvSpPr>
+          <p:cNvPr id="48" name="Abgerundetes Rechteck 47"/>
+          <p:cNvSpPr/>
+          <p:nvPr/>
+        </p:nvSpPr>
+        <p:spPr>
+          <a:xfrm>
+            <a:off x="9701092" y="1783501"/>
+            <a:ext cx="930477" cy="699731"/>
+          </a:xfrm>
+          <a:prstGeom prst="roundRect">
+            <a:avLst>
+              <a:gd name="adj" fmla="val 5119"/>
+            </a:avLst>
+          </a:prstGeom>
+          <a:ln w="19050">
+            <a:solidFill>
+              <a:schemeClr val="accent4"/>
+            </a:solidFill>
+          </a:ln>
+        </p:spPr>
+        <p:style>
+          <a:lnRef idx="2">
+            <a:schemeClr val="accent3"/>
+          </a:lnRef>
+          <a:fillRef idx="1">
+            <a:schemeClr val="lt1"/>
+          </a:fillRef>
+          <a:effectRef idx="0">
+            <a:schemeClr val="accent3"/>
+          </a:effectRef>
+          <a:fontRef idx="minor">
+            <a:schemeClr val="dk1"/>
+          </a:fontRef>
+        </p:style>
+        <p:txBody>
+          <a:bodyPr vert="horz" rtlCol="0" anchor="ctr"/>
+          <a:lstStyle/>
+          <a:p>
+            <a:pPr algn="ctr"/>
+            <a:r>
+              <a:rPr lang="en-US" sz="1400" dirty="0" smtClean="0">
+                <a:solidFill>
+                  <a:schemeClr val="tx1">
+                    <a:lumMod val="50000"/>
+                    <a:lumOff val="50000"/>
+                  </a:schemeClr>
+                </a:solidFill>
+              </a:rPr>
+              <a:t>IDP</a:t>
+            </a:r>
+            <a:endParaRPr lang="en-US" sz="1400" dirty="0">
+              <a:solidFill>
+                <a:schemeClr val="tx1">
+                  <a:lumMod val="50000"/>
+                  <a:lumOff val="50000"/>
+                </a:schemeClr>
+              </a:solidFill>
+            </a:endParaRPr>
+          </a:p>
+        </p:txBody>
+      </p:sp>
+      <p:cxnSp>
+        <p:nvCxnSpPr>
+          <p:cNvPr id="49" name="Gerade Verbindung mit Pfeil 48"/>
+          <p:cNvCxnSpPr/>
+          <p:nvPr/>
+        </p:nvCxnSpPr>
+        <p:spPr>
+          <a:xfrm>
+            <a:off x="9417783" y="2133367"/>
+            <a:ext cx="283309" cy="0"/>
+          </a:xfrm>
+          <a:prstGeom prst="straightConnector1">
+            <a:avLst/>
+          </a:prstGeom>
+          <a:ln w="76200">
+            <a:solidFill>
+              <a:schemeClr val="accent1">
+                <a:alpha val="41000"/>
+              </a:schemeClr>
+            </a:solidFill>
+            <a:tailEnd type="triangle"/>
+          </a:ln>
+        </p:spPr>
+        <p:style>
+          <a:lnRef idx="1">
+            <a:schemeClr val="accent1"/>
+          </a:lnRef>
+          <a:fillRef idx="0">
+            <a:schemeClr val="accent1"/>
+          </a:fillRef>
+          <a:effectRef idx="0">
+            <a:schemeClr val="accent1"/>
+          </a:effectRef>
+          <a:fontRef idx="minor">
+            <a:schemeClr val="tx1"/>
+          </a:fontRef>
+        </p:style>
+      </p:cxnSp>
+      <p:cxnSp>
+        <p:nvCxnSpPr>
+          <p:cNvPr id="51" name="Gekrümmte Verbindung 50"/>
+          <p:cNvCxnSpPr>
+            <a:stCxn id="9" idx="3"/>
+            <a:endCxn id="12" idx="1"/>
+          </p:cNvCxnSpPr>
+          <p:nvPr/>
+        </p:nvCxnSpPr>
+        <p:spPr>
+          <a:xfrm>
+            <a:off x="3234914" y="5079607"/>
+            <a:ext cx="1058819" cy="513798"/>
+          </a:xfrm>
+          <a:prstGeom prst="curvedConnector3">
+            <a:avLst/>
+          </a:prstGeom>
+          <a:ln w="76200">
+            <a:solidFill>
+              <a:schemeClr val="accent1">
+                <a:alpha val="41000"/>
+              </a:schemeClr>
+            </a:solidFill>
+            <a:tailEnd type="triangle"/>
+          </a:ln>
+        </p:spPr>
+        <p:style>
+          <a:lnRef idx="1">
+            <a:schemeClr val="accent1"/>
+          </a:lnRef>
+          <a:fillRef idx="0">
+            <a:schemeClr val="accent1"/>
+          </a:fillRef>
+          <a:effectRef idx="0">
+            <a:schemeClr val="accent1"/>
+          </a:effectRef>
+          <a:fontRef idx="minor">
+            <a:schemeClr val="tx1"/>
+          </a:fontRef>
+        </p:style>
+      </p:cxnSp>
+      <p:cxnSp>
+        <p:nvCxnSpPr>
+          <p:cNvPr id="53" name="Gekrümmte Verbindung 52"/>
+          <p:cNvCxnSpPr>
+            <a:stCxn id="9" idx="3"/>
+            <a:endCxn id="10" idx="1"/>
+          </p:cNvCxnSpPr>
+          <p:nvPr/>
+        </p:nvCxnSpPr>
+        <p:spPr>
+          <a:xfrm flipV="1">
+            <a:off x="3234914" y="4565811"/>
+            <a:ext cx="1058820" cy="513796"/>
+          </a:xfrm>
+          <a:prstGeom prst="curvedConnector3">
+            <a:avLst/>
+          </a:prstGeom>
+          <a:ln w="76200">
+            <a:solidFill>
+              <a:schemeClr val="accent1">
+                <a:alpha val="41000"/>
+              </a:schemeClr>
+            </a:solidFill>
+            <a:tailEnd type="triangle"/>
+          </a:ln>
+        </p:spPr>
+        <p:style>
+          <a:lnRef idx="1">
+            <a:schemeClr val="accent1"/>
+          </a:lnRef>
+          <a:fillRef idx="0">
+            <a:schemeClr val="accent1"/>
+          </a:fillRef>
+          <a:effectRef idx="0">
+            <a:schemeClr val="accent1"/>
+          </a:effectRef>
+          <a:fontRef idx="minor">
+            <a:schemeClr val="tx1"/>
+          </a:fontRef>
+        </p:style>
+      </p:cxnSp>
+      <p:cxnSp>
+        <p:nvCxnSpPr>
+          <p:cNvPr id="56" name="Gekrümmte Verbindung 55"/>
+          <p:cNvCxnSpPr/>
+          <p:nvPr/>
+        </p:nvCxnSpPr>
+        <p:spPr>
+          <a:xfrm>
+            <a:off x="7403473" y="1609847"/>
+            <a:ext cx="1058819" cy="513798"/>
+          </a:xfrm>
+          <a:prstGeom prst="curvedConnector3">
+            <a:avLst/>
+          </a:prstGeom>
+          <a:ln w="76200">
+            <a:solidFill>
+              <a:schemeClr val="accent1">
+                <a:alpha val="41000"/>
+              </a:schemeClr>
+            </a:solidFill>
+            <a:tailEnd type="triangle"/>
+          </a:ln>
+        </p:spPr>
+        <p:style>
+          <a:lnRef idx="1">
+            <a:schemeClr val="accent1"/>
+          </a:lnRef>
+          <a:fillRef idx="0">
+            <a:schemeClr val="accent1"/>
+          </a:fillRef>
+          <a:effectRef idx="0">
+            <a:schemeClr val="accent1"/>
+          </a:effectRef>
+          <a:fontRef idx="minor">
+            <a:schemeClr val="tx1"/>
+          </a:fontRef>
+        </p:style>
+      </p:cxnSp>
+      <p:cxnSp>
+        <p:nvCxnSpPr>
+          <p:cNvPr id="57" name="Gekrümmte Verbindung 56"/>
+          <p:cNvCxnSpPr/>
+          <p:nvPr/>
+        </p:nvCxnSpPr>
+        <p:spPr>
+          <a:xfrm flipV="1">
+            <a:off x="7403473" y="1096051"/>
+            <a:ext cx="1058820" cy="513796"/>
+          </a:xfrm>
+          <a:prstGeom prst="curvedConnector3">
+            <a:avLst/>
+          </a:prstGeom>
+          <a:ln w="76200">
+            <a:solidFill>
+              <a:schemeClr val="accent1">
+                <a:alpha val="41000"/>
+              </a:schemeClr>
+            </a:solidFill>
+            <a:tailEnd type="triangle"/>
+          </a:ln>
+        </p:spPr>
+        <p:style>
+          <a:lnRef idx="1">
+            <a:schemeClr val="accent1"/>
+          </a:lnRef>
+          <a:fillRef idx="0">
+            <a:schemeClr val="accent1"/>
+          </a:fillRef>
+          <a:effectRef idx="0">
+            <a:schemeClr val="accent1"/>
+          </a:effectRef>
+          <a:fontRef idx="minor">
+            <a:schemeClr val="tx1"/>
+          </a:fontRef>
+        </p:style>
+      </p:cxnSp>
+      <p:cxnSp>
+        <p:nvCxnSpPr>
+          <p:cNvPr id="58" name="Gekrümmte Verbindung 57"/>
+          <p:cNvCxnSpPr/>
+          <p:nvPr/>
+        </p:nvCxnSpPr>
+        <p:spPr>
+          <a:xfrm>
+            <a:off x="8023802" y="5083939"/>
+            <a:ext cx="1058819" cy="513798"/>
+          </a:xfrm>
+          <a:prstGeom prst="curvedConnector3">
+            <a:avLst/>
+          </a:prstGeom>
+          <a:ln w="76200">
+            <a:solidFill>
+              <a:schemeClr val="accent1">
+                <a:alpha val="41000"/>
+              </a:schemeClr>
+            </a:solidFill>
+            <a:tailEnd type="triangle"/>
+          </a:ln>
+        </p:spPr>
+        <p:style>
+          <a:lnRef idx="1">
+            <a:schemeClr val="accent1"/>
+          </a:lnRef>
+          <a:fillRef idx="0">
+            <a:schemeClr val="accent1"/>
+          </a:fillRef>
+          <a:effectRef idx="0">
+            <a:schemeClr val="accent1"/>
+          </a:effectRef>
+          <a:fontRef idx="minor">
+            <a:schemeClr val="tx1"/>
+          </a:fontRef>
+        </p:style>
+      </p:cxnSp>
+      <p:cxnSp>
+        <p:nvCxnSpPr>
+          <p:cNvPr id="59" name="Gekrümmte Verbindung 58"/>
+          <p:cNvCxnSpPr/>
+          <p:nvPr/>
+        </p:nvCxnSpPr>
+        <p:spPr>
+          <a:xfrm flipV="1">
+            <a:off x="8023802" y="4570143"/>
+            <a:ext cx="1058820" cy="513796"/>
+          </a:xfrm>
+          <a:prstGeom prst="curvedConnector3">
+            <a:avLst/>
+          </a:prstGeom>
+          <a:ln w="76200">
+            <a:solidFill>
+              <a:schemeClr val="accent1">
+                <a:alpha val="41000"/>
+              </a:schemeClr>
+            </a:solidFill>
+            <a:tailEnd type="triangle"/>
+          </a:ln>
+        </p:spPr>
+        <p:style>
+          <a:lnRef idx="1">
+            <a:schemeClr val="accent1"/>
+          </a:lnRef>
+          <a:fillRef idx="0">
+            <a:schemeClr val="accent1"/>
+          </a:fillRef>
+          <a:effectRef idx="0">
+            <a:schemeClr val="accent1"/>
+          </a:effectRef>
+          <a:fontRef idx="minor">
+            <a:schemeClr val="tx1"/>
+          </a:fontRef>
+        </p:style>
+      </p:cxnSp>
+    </p:spTree>
+    <p:extLst>
+      <p:ext uri="{BB962C8B-B14F-4D97-AF65-F5344CB8AC3E}">
+        <p14:creationId xmlns:p14="http://schemas.microsoft.com/office/powerpoint/2010/main" val="1145089215"/>
+      </p:ext>
+    </p:extLst>
+  </p:cSld>
+  <p:clrMapOvr>
+    <a:masterClrMapping/>
+  </p:clrMapOvr>
 </p:sld>
 </file>
 

</xml_diff>